<commit_message>
Added hierarchy chart to Lesson 3 slides to better visualize dictionaries based on Ali's whiteboard sketch
</commit_message>
<xml_diff>
--- a/Lesson 3/Hear Me Code - File Handling and Dictionaries.pptx
+++ b/Lesson 3/Hear Me Code - File Handling and Dictionaries.pptx
@@ -73,6 +73,7 @@
     <p:sldId id="318" r:id="rId70"/>
     <p:sldId id="319" r:id="rId71"/>
     <p:sldId id="320" r:id="rId72"/>
+    <p:sldId id="321" r:id="rId73"/>
   </p:sldIdLst>
   <p:sldSz cx="9144000" cy="6858000"/>
   <p:notesSz cx="6858000" cy="9144000"/>
@@ -3617,7 +3618,7 @@
           <a:p>
             <a:pPr/>
             <a:r>
-              <a:t>Walk folks through saving the file in their Sublime Text / IDLE.</a:t>
+              <a:t>And here's that exact same dictionary, but represented in a way that might be easier for us to recognize.</a:t>
             </a:r>
           </a:p>
         </p:txBody>
@@ -3687,7 +3688,7 @@
           <a:p>
             <a:pPr/>
             <a:r>
-              <a:t>We only have her mobile phone number and a quick note we wrote to ourselves in her contact record. But that's totally okay. Dictionaries are flexible.</a:t>
+              <a:t>Walk folks through saving the file in their Sublime Text / IDLE.</a:t>
             </a:r>
           </a:p>
         </p:txBody>
@@ -3719,10 +3720,31 @@
       </p:grpSpPr>
       <p:sp>
         <p:nvSpPr>
+          <p:cNvPr id="395" name="Shape 395"/>
+          <p:cNvSpPr/>
+          <p:nvPr>
+            <p:ph type="sldImg"/>
+          </p:nvPr>
+        </p:nvSpPr>
+        <p:spPr>
+          <a:prstGeom prst="rect">
+            <a:avLst/>
+          </a:prstGeom>
+        </p:spPr>
+        <p:txBody>
+          <a:bodyPr/>
+          <a:lstStyle/>
+          <a:p>
+            <a:pPr/>
+          </a:p>
+        </p:txBody>
+      </p:sp>
+      <p:sp>
+        <p:nvSpPr>
           <p:cNvPr id="396" name="Shape 396"/>
           <p:cNvSpPr/>
           <p:nvPr>
-            <p:ph type="sldImg"/>
+            <p:ph type="body" sz="quarter" idx="1"/>
           </p:nvPr>
         </p:nvSpPr>
         <p:spPr>
@@ -3735,35 +3757,8 @@
           <a:lstStyle/>
           <a:p>
             <a:pPr/>
-          </a:p>
-        </p:txBody>
-      </p:sp>
-      <p:sp>
-        <p:nvSpPr>
-          <p:cNvPr id="397" name="Shape 397"/>
-          <p:cNvSpPr/>
-          <p:nvPr>
-            <p:ph type="body" sz="quarter" idx="1"/>
-          </p:nvPr>
-        </p:nvSpPr>
-        <p:spPr>
-          <a:prstGeom prst="rect">
-            <a:avLst/>
-          </a:prstGeom>
-        </p:spPr>
-        <p:txBody>
-          <a:bodyPr/>
-          <a:lstStyle/>
-          <a:p>
-            <a:pPr/>
-            <a:r>
-              <a:t>Which organization was she with again? Oops, we don't actually have that in our records. When we try to ask, Python tells us "KeyError: organization."</a:t>
-            </a:r>
-          </a:p>
-          <a:p>
-            <a:pPr/>
-            <a:r>
-              <a:t>Kinda like when we get an IndexError trying to slice a list using a slicing number that doesn't exist in that list, a KeyError is Python's way of saying: I don't have that information. I don't have that fact about that person.</a:t>
+            <a:r>
+              <a:t>We only have her mobile phone number and a quick note we wrote to ourselves in her contact record. But that's totally okay. Dictionaries are flexible.</a:t>
             </a:r>
           </a:p>
         </p:txBody>
@@ -3833,13 +3828,13 @@
           <a:p>
             <a:pPr/>
             <a:r>
-              <a:t>Here we have three options. We already know the first option will give us a KeyError if there isn't an organization associated with someone.</a:t>
-            </a:r>
-          </a:p>
-          <a:p>
-            <a:pPr/>
-            <a:r>
-              <a:t>But that would be pretty inconvenient if our phone's contacts app crashed whenever it didn't have data for someone. To be more flexible, we can use .get( ) to see if the key exists. If it does, it'll return the value as normal. If not, Python will continue with no error. Try this out for yourself and see what happens.</a:t>
+              <a:t>Which organization was she with again? Oops, we don't actually have that in our records. When we try to ask, Python tells us "KeyError: organization."</a:t>
+            </a:r>
+          </a:p>
+          <a:p>
+            <a:pPr/>
+            <a:r>
+              <a:t>Kinda like when we get an IndexError trying to slice a list using a slicing number that doesn't exist in that list, a KeyError is Python's way of saying: I don't have that information. I don't have that fact about that person.</a:t>
             </a:r>
           </a:p>
         </p:txBody>
@@ -3871,7 +3866,7 @@
       </p:grpSpPr>
       <p:sp>
         <p:nvSpPr>
-          <p:cNvPr id="431" name="Shape 431"/>
+          <p:cNvPr id="410" name="Shape 410"/>
           <p:cNvSpPr/>
           <p:nvPr>
             <p:ph type="sldImg"/>
@@ -3892,7 +3887,7 @@
       </p:sp>
       <p:sp>
         <p:nvSpPr>
-          <p:cNvPr id="432" name="Shape 432"/>
+          <p:cNvPr id="411" name="Shape 411"/>
           <p:cNvSpPr/>
           <p:nvPr>
             <p:ph type="body" sz="quarter" idx="1"/>
@@ -3909,13 +3904,13 @@
           <a:p>
             <a:pPr/>
             <a:r>
-              <a:t>In the previous slide, we just looped through the keys.</a:t>
-            </a:r>
-          </a:p>
-          <a:p>
-            <a:pPr/>
-            <a:r>
-              <a:t>Now let's use those keys to see what values they correspond to.</a:t>
+              <a:t>Here we have three options. We already know the first option will give us a KeyError if there isn't an organization associated with someone.</a:t>
+            </a:r>
+          </a:p>
+          <a:p>
+            <a:pPr/>
+            <a:r>
+              <a:t>But that would be pretty inconvenient if our phone's contacts app crashed whenever it didn't have data for someone. To be more flexible, we can use .get( ) to see if the key exists. If it does, it'll return the value as normal. If not, Python will continue with no error. Try this out for yourself and see what happens.</a:t>
             </a:r>
           </a:p>
         </p:txBody>
@@ -3985,7 +3980,13 @@
           <a:p>
             <a:pPr/>
             <a:r>
-              <a:t>Re-emphasize that you cannot rely on the ordering of a dictionary, you can only order lists of its keys.</a:t>
+              <a:t>In the previous slide, we just looped through the keys.</a:t>
+            </a:r>
+          </a:p>
+          <a:p>
+            <a:pPr/>
+            <a:r>
+              <a:t>Now let's use those keys to see what values they correspond to.</a:t>
             </a:r>
           </a:p>
         </p:txBody>
@@ -4055,7 +4056,7 @@
           <a:p>
             <a:pPr/>
             <a:r>
-              <a:t>Remind everyone that dictionaries are unordered, so you might see things in a different order and that's okay.</a:t>
+              <a:t>Re-emphasize that you cannot rely on the ordering of a dictionary, you can only order lists of its keys.</a:t>
             </a:r>
           </a:p>
         </p:txBody>
@@ -4125,13 +4126,7 @@
           <a:p>
             <a:pPr/>
             <a:r>
-              <a:t>Here, I've named my variables "key" and "value" to illustrate that dictionaries use a key: value pair for the dictionary items.</a:t>
-            </a:r>
-          </a:p>
-          <a:p>
-            <a:pPr/>
-            <a:r>
-              <a:t>I wanted to illustrate that for teaching purposes, but let's use meaningful variable names instead.</a:t>
+              <a:t>Remind everyone that dictionaries are unordered, so you might see things in a different order and that's okay.</a:t>
             </a:r>
           </a:p>
         </p:txBody>
@@ -4271,13 +4266,13 @@
           <a:p>
             <a:pPr/>
             <a:r>
-              <a:t>Now I'm using the variables "name" because that's the name of the contact and "details" because that's the information I know about that contact.</a:t>
-            </a:r>
-          </a:p>
-          <a:p>
-            <a:pPr/>
-            <a:r>
-              <a:t>Remind everyone that dictionaries are unordered, so you might see things in a different order and that's okay</a:t>
+              <a:t>Here, I've named my variables "key" and "value" to illustrate that dictionaries use a key: value pair for the dictionary items.</a:t>
+            </a:r>
+          </a:p>
+          <a:p>
+            <a:pPr/>
+            <a:r>
+              <a:t>I wanted to illustrate that for teaching purposes, but let's use meaningful variable names instead.</a:t>
             </a:r>
           </a:p>
         </p:txBody>
@@ -4347,13 +4342,13 @@
           <a:p>
             <a:pPr/>
             <a:r>
-              <a:t>As a hint, think through how you'll go about looping through a nested dictionary. If it makes it easier, step back and think about how you loop through a nested list.</a:t>
-            </a:r>
-          </a:p>
-          <a:p>
-            <a:pPr/>
-            <a:r>
-              <a:t>Make sure you're looping through your dictionary rather than assuming everyone will have a Twitter handle, a GitHub link, and nothing else. Maybe some people in your contact list will have more details. Maybe some will have fewer, or entirely different ones.</a:t>
+              <a:t>Now I'm using the variables "name" because that's the name of the contact and "details" because that's the information I know about that contact.</a:t>
+            </a:r>
+          </a:p>
+          <a:p>
+            <a:pPr/>
+            <a:r>
+              <a:t>Remind everyone that dictionaries are unordered, so you might see things in a different order and that's okay</a:t>
             </a:r>
           </a:p>
         </p:txBody>
@@ -4385,7 +4380,7 @@
       </p:grpSpPr>
       <p:sp>
         <p:nvSpPr>
-          <p:cNvPr id="476" name="Shape 476"/>
+          <p:cNvPr id="473" name="Shape 473"/>
           <p:cNvSpPr/>
           <p:nvPr>
             <p:ph type="sldImg"/>
@@ -4406,7 +4401,83 @@
       </p:sp>
       <p:sp>
         <p:nvSpPr>
-          <p:cNvPr id="477" name="Shape 477"/>
+          <p:cNvPr id="474" name="Shape 474"/>
+          <p:cNvSpPr/>
+          <p:nvPr>
+            <p:ph type="body" sz="quarter" idx="1"/>
+          </p:nvPr>
+        </p:nvSpPr>
+        <p:spPr>
+          <a:prstGeom prst="rect">
+            <a:avLst/>
+          </a:prstGeom>
+        </p:spPr>
+        <p:txBody>
+          <a:bodyPr/>
+          <a:lstStyle/>
+          <a:p>
+            <a:pPr/>
+            <a:r>
+              <a:t>As a hint, think through how you'll go about looping through a nested dictionary. If it makes it easier, step back and think about how you loop through a nested list.</a:t>
+            </a:r>
+          </a:p>
+          <a:p>
+            <a:pPr/>
+            <a:r>
+              <a:t>Make sure you're looping through your dictionary rather than assuming everyone will have a Twitter handle, a GitHub link, and nothing else. Maybe some people in your contact list will have more details. Maybe some will have fewer, or entirely different ones.</a:t>
+            </a:r>
+          </a:p>
+        </p:txBody>
+      </p:sp>
+    </p:spTree>
+  </p:cSld>
+  <p:clrMapOvr>
+    <a:masterClrMapping/>
+  </p:clrMapOvr>
+</p:notes>
+</file>
+
+<file path=ppt/notesSlides/notesSlide53.xml><?xml version="1.0" encoding="utf-8"?>
+<p:notes xmlns:a="http://schemas.openxmlformats.org/drawingml/2006/main" xmlns:r="http://schemas.openxmlformats.org/officeDocument/2006/relationships" xmlns:p="http://schemas.openxmlformats.org/presentationml/2006/main" showMasterSp="1" showMasterPhAnim="1">
+  <p:cSld>
+    <p:spTree>
+      <p:nvGrpSpPr>
+        <p:cNvPr id="1" name=""/>
+        <p:cNvGrpSpPr/>
+        <p:nvPr/>
+      </p:nvGrpSpPr>
+      <p:grpSpPr>
+        <a:xfrm>
+          <a:off x="0" y="0"/>
+          <a:ext cx="0" cy="0"/>
+          <a:chOff x="0" y="0"/>
+          <a:chExt cx="0" cy="0"/>
+        </a:xfrm>
+      </p:grpSpPr>
+      <p:sp>
+        <p:nvSpPr>
+          <p:cNvPr id="483" name="Shape 483"/>
+          <p:cNvSpPr/>
+          <p:nvPr>
+            <p:ph type="sldImg"/>
+          </p:nvPr>
+        </p:nvSpPr>
+        <p:spPr>
+          <a:prstGeom prst="rect">
+            <a:avLst/>
+          </a:prstGeom>
+        </p:spPr>
+        <p:txBody>
+          <a:bodyPr/>
+          <a:lstStyle/>
+          <a:p>
+            <a:pPr/>
+          </a:p>
+        </p:txBody>
+      </p:sp>
+      <p:sp>
+        <p:nvSpPr>
+          <p:cNvPr id="484" name="Shape 484"/>
           <p:cNvSpPr/>
           <p:nvPr>
             <p:ph type="body" sz="quarter" idx="1"/>
@@ -16904,13 +16975,17 @@
       </p:grpSpPr>
       <p:sp>
         <p:nvSpPr>
-          <p:cNvPr id="377" name="Save these exercise instructions to your computer, open it in Sublime/IDLE and work from there!"/>
+          <p:cNvPr id="377" name="Body"/>
           <p:cNvSpPr txBox="1"/>
           <p:nvPr>
             <p:ph type="body" idx="1"/>
           </p:nvPr>
         </p:nvSpPr>
         <p:spPr>
+          <a:xfrm>
+            <a:off x="457200" y="1521081"/>
+            <a:ext cx="8229600" cy="4394211"/>
+          </a:xfrm>
           <a:prstGeom prst="rect">
             <a:avLst/>
           </a:prstGeom>
@@ -16921,137 +16996,106 @@
           </a:bodyPr>
           <a:lstStyle/>
           <a:p>
-            <a:pPr marL="0" indent="0" defTabSz="374904">
-              <a:spcBef>
-                <a:spcPts val="500"/>
+            <a:pPr marL="0" indent="0">
+              <a:spcBef>
+                <a:spcPts val="1200"/>
               </a:spcBef>
               <a:buSzTx/>
               <a:buFontTx/>
               <a:buNone/>
-              <a:defRPr sz="2624"/>
-            </a:pPr>
-            <a:r>
-              <a:t>Save these </a:t>
-            </a:r>
-            <a:r>
-              <a:rPr b="1" u="sng">
-                <a:solidFill>
-                  <a:srgbClr val="0000FF"/>
-                </a:solidFill>
-                <a:uFill>
-                  <a:solidFill>
-                    <a:srgbClr val="0000FF"/>
-                  </a:solidFill>
-                </a:uFill>
-                <a:hlinkClick r:id="rId3" invalidUrl="" action="" tgtFrame="" tooltip="" history="1" highlightClick="0" endSnd="0"/>
-              </a:rPr>
-              <a:t>exercise instructions</a:t>
-            </a:r>
-            <a:r>
-              <a:t> to your computer, open it in Sublime/IDLE and work from there!</a:t>
-            </a:r>
-          </a:p>
-          <a:p>
-            <a:pPr marL="0" indent="0" defTabSz="374904">
-              <a:spcBef>
-                <a:spcPts val="500"/>
+              <a:defRPr b="1">
+                <a:latin typeface="Courier New"/>
+                <a:ea typeface="Courier New"/>
+                <a:cs typeface="Courier New"/>
+                <a:sym typeface="Courier New"/>
+              </a:defRPr>
+            </a:pPr>
+          </a:p>
+          <a:p>
+            <a:pPr marL="0" indent="0">
+              <a:spcBef>
+                <a:spcPts val="1200"/>
               </a:spcBef>
               <a:buSzTx/>
               <a:buFontTx/>
               <a:buNone/>
-              <a:defRPr sz="2624">
-                <a:latin typeface="Gill Sans Light"/>
-                <a:ea typeface="Gill Sans Light"/>
-                <a:cs typeface="Gill Sans Light"/>
-                <a:sym typeface="Gill Sans Light"/>
+              <a:defRPr b="1">
+                <a:latin typeface="Courier New"/>
+                <a:ea typeface="Courier New"/>
+                <a:cs typeface="Courier New"/>
+                <a:sym typeface="Courier New"/>
               </a:defRPr>
             </a:pPr>
           </a:p>
           <a:p>
-            <a:pPr marL="0" indent="0" defTabSz="374904">
-              <a:spcBef>
-                <a:spcPts val="500"/>
+            <a:pPr marL="0" indent="0">
+              <a:spcBef>
+                <a:spcPts val="1200"/>
               </a:spcBef>
               <a:buSzTx/>
               <a:buFontTx/>
               <a:buNone/>
-              <a:defRPr sz="2624">
-                <a:latin typeface="Gill Sans Light"/>
-                <a:ea typeface="Gill Sans Light"/>
-                <a:cs typeface="Gill Sans Light"/>
-                <a:sym typeface="Gill Sans Light"/>
+              <a:defRPr b="1">
+                <a:latin typeface="Courier New"/>
+                <a:ea typeface="Courier New"/>
+                <a:cs typeface="Courier New"/>
+                <a:sym typeface="Courier New"/>
               </a:defRPr>
             </a:pPr>
           </a:p>
           <a:p>
-            <a:pPr marL="0" indent="0" defTabSz="374904">
-              <a:spcBef>
-                <a:spcPts val="500"/>
+            <a:pPr marL="0" indent="0">
+              <a:spcBef>
+                <a:spcPts val="1200"/>
               </a:spcBef>
               <a:buSzTx/>
               <a:buFontTx/>
               <a:buNone/>
-              <a:defRPr sz="2624">
-                <a:latin typeface="Gill Sans Light"/>
-                <a:ea typeface="Gill Sans Light"/>
-                <a:cs typeface="Gill Sans Light"/>
-                <a:sym typeface="Gill Sans Light"/>
+              <a:defRPr b="1">
+                <a:latin typeface="Courier New"/>
+                <a:ea typeface="Courier New"/>
+                <a:cs typeface="Courier New"/>
+                <a:sym typeface="Courier New"/>
               </a:defRPr>
             </a:pPr>
           </a:p>
           <a:p>
-            <a:pPr marL="0" indent="0" defTabSz="374904">
-              <a:spcBef>
-                <a:spcPts val="500"/>
+            <a:pPr marL="0" indent="0">
+              <a:spcBef>
+                <a:spcPts val="1200"/>
               </a:spcBef>
               <a:buSzTx/>
               <a:buFontTx/>
               <a:buNone/>
-              <a:defRPr sz="2624">
-                <a:latin typeface="Gill Sans Light"/>
-                <a:ea typeface="Gill Sans Light"/>
-                <a:cs typeface="Gill Sans Light"/>
-                <a:sym typeface="Gill Sans Light"/>
+              <a:defRPr b="1">
+                <a:latin typeface="Courier New"/>
+                <a:ea typeface="Courier New"/>
+                <a:cs typeface="Courier New"/>
+                <a:sym typeface="Courier New"/>
               </a:defRPr>
             </a:pPr>
           </a:p>
           <a:p>
-            <a:pPr marL="0" indent="0" defTabSz="374904">
-              <a:spcBef>
-                <a:spcPts val="500"/>
+            <a:pPr marL="0" indent="0">
+              <a:spcBef>
+                <a:spcPts val="1200"/>
               </a:spcBef>
               <a:buSzTx/>
               <a:buFontTx/>
               <a:buNone/>
-              <a:defRPr sz="2624">
-                <a:latin typeface="Gill Sans Light"/>
-                <a:ea typeface="Gill Sans Light"/>
-                <a:cs typeface="Gill Sans Light"/>
-                <a:sym typeface="Gill Sans Light"/>
+              <a:defRPr b="1">
+                <a:latin typeface="Courier New"/>
+                <a:ea typeface="Courier New"/>
+                <a:cs typeface="Courier New"/>
+                <a:sym typeface="Courier New"/>
               </a:defRPr>
             </a:pPr>
           </a:p>
-          <a:p>
-            <a:pPr marL="0" indent="0" defTabSz="374904">
-              <a:spcBef>
-                <a:spcPts val="500"/>
-              </a:spcBef>
-              <a:buSzTx/>
-              <a:buFontTx/>
-              <a:buNone/>
-              <a:defRPr sz="2624">
-                <a:latin typeface="Gill Sans Light"/>
-                <a:ea typeface="Gill Sans Light"/>
-                <a:cs typeface="Gill Sans Light"/>
-                <a:sym typeface="Gill Sans Light"/>
-              </a:defRPr>
-            </a:pPr>
-          </a:p>
-        </p:txBody>
-      </p:sp>
-      <p:sp>
-        <p:nvSpPr>
-          <p:cNvPr id="378" name="exercise"/>
+        </p:txBody>
+      </p:sp>
+      <p:sp>
+        <p:nvSpPr>
+          <p:cNvPr id="378" name="Let's visualize it differently"/>
           <p:cNvSpPr/>
           <p:nvPr/>
         </p:nvSpPr>
@@ -17097,7 +17141,7 @@
           <a:p>
             <a:pPr/>
             <a:r>
-              <a:t>exercise</a:t>
+              <a:t>Let's visualize it differently</a:t>
             </a:r>
           </a:p>
         </p:txBody>
@@ -17135,14 +17179,14 @@
       </p:sp>
       <p:pic>
         <p:nvPicPr>
-          <p:cNvPr id="380" name="dict-nested.png" descr="dict-nested.png"/>
+          <p:cNvPr id="380" name="Lesson 3 Dictionary Chart.png" descr="Lesson 3 Dictionary Chart.png"/>
           <p:cNvPicPr>
             <a:picLocks noChangeAspect="1"/>
           </p:cNvPicPr>
           <p:nvPr/>
         </p:nvPicPr>
         <p:blipFill>
-          <a:blip r:embed="rId4">
+          <a:blip r:embed="rId3">
             <a:extLst/>
           </a:blip>
           <a:stretch>
@@ -17151,8 +17195,8 @@
         </p:blipFill>
         <p:spPr>
           <a:xfrm>
-            <a:off x="1143732" y="2329274"/>
-            <a:ext cx="6399336" cy="3339141"/>
+            <a:off x="-148013" y="1693625"/>
+            <a:ext cx="9144001" cy="3132752"/>
           </a:xfrm>
           <a:prstGeom prst="rect">
             <a:avLst/>
@@ -17190,7 +17234,7 @@
       </p:grpSpPr>
       <p:sp>
         <p:nvSpPr>
-          <p:cNvPr id="384" name="We just met Carla, so we don't have as many details about her in our phonebook as we do for Shannon."/>
+          <p:cNvPr id="384" name="Save these exercise instructions to your computer, open it in Sublime/IDLE and work from there!"/>
           <p:cNvSpPr txBox="1"/>
           <p:nvPr>
             <p:ph type="body" idx="1"/>
@@ -17205,27 +17249,139 @@
           <a:bodyPr>
             <a:normAutofit fontScale="100000" lnSpcReduction="0"/>
           </a:bodyPr>
-          <a:lstStyle>
-            <a:lvl1pPr marL="0" indent="0">
-              <a:spcBef>
-                <a:spcPts val="600"/>
+          <a:lstStyle/>
+          <a:p>
+            <a:pPr marL="0" indent="0" defTabSz="374904">
+              <a:spcBef>
+                <a:spcPts val="500"/>
               </a:spcBef>
               <a:buSzTx/>
               <a:buFontTx/>
               <a:buNone/>
-            </a:lvl1pPr>
-          </a:lstStyle>
-          <a:p>
-            <a:pPr/>
-            <a:r>
-              <a:t>We just met Carla, so we don't have as many details about her in our phonebook as we do for Shannon.</a:t>
-            </a:r>
-          </a:p>
-        </p:txBody>
-      </p:sp>
-      <p:sp>
-        <p:nvSpPr>
-          <p:cNvPr id="385" name="Dictionaries are flexible"/>
+              <a:defRPr sz="2624"/>
+            </a:pPr>
+            <a:r>
+              <a:t>Save these </a:t>
+            </a:r>
+            <a:r>
+              <a:rPr b="1" u="sng">
+                <a:solidFill>
+                  <a:srgbClr val="0000FF"/>
+                </a:solidFill>
+                <a:uFill>
+                  <a:solidFill>
+                    <a:srgbClr val="0000FF"/>
+                  </a:solidFill>
+                </a:uFill>
+                <a:hlinkClick r:id="rId3" invalidUrl="" action="" tgtFrame="" tooltip="" history="1" highlightClick="0" endSnd="0"/>
+              </a:rPr>
+              <a:t>exercise instructions</a:t>
+            </a:r>
+            <a:r>
+              <a:t> to your computer, open it in Sublime/IDLE and work from there!</a:t>
+            </a:r>
+          </a:p>
+          <a:p>
+            <a:pPr marL="0" indent="0" defTabSz="374904">
+              <a:spcBef>
+                <a:spcPts val="500"/>
+              </a:spcBef>
+              <a:buSzTx/>
+              <a:buFontTx/>
+              <a:buNone/>
+              <a:defRPr sz="2624">
+                <a:latin typeface="Gill Sans Light"/>
+                <a:ea typeface="Gill Sans Light"/>
+                <a:cs typeface="Gill Sans Light"/>
+                <a:sym typeface="Gill Sans Light"/>
+              </a:defRPr>
+            </a:pPr>
+          </a:p>
+          <a:p>
+            <a:pPr marL="0" indent="0" defTabSz="374904">
+              <a:spcBef>
+                <a:spcPts val="500"/>
+              </a:spcBef>
+              <a:buSzTx/>
+              <a:buFontTx/>
+              <a:buNone/>
+              <a:defRPr sz="2624">
+                <a:latin typeface="Gill Sans Light"/>
+                <a:ea typeface="Gill Sans Light"/>
+                <a:cs typeface="Gill Sans Light"/>
+                <a:sym typeface="Gill Sans Light"/>
+              </a:defRPr>
+            </a:pPr>
+          </a:p>
+          <a:p>
+            <a:pPr marL="0" indent="0" defTabSz="374904">
+              <a:spcBef>
+                <a:spcPts val="500"/>
+              </a:spcBef>
+              <a:buSzTx/>
+              <a:buFontTx/>
+              <a:buNone/>
+              <a:defRPr sz="2624">
+                <a:latin typeface="Gill Sans Light"/>
+                <a:ea typeface="Gill Sans Light"/>
+                <a:cs typeface="Gill Sans Light"/>
+                <a:sym typeface="Gill Sans Light"/>
+              </a:defRPr>
+            </a:pPr>
+          </a:p>
+          <a:p>
+            <a:pPr marL="0" indent="0" defTabSz="374904">
+              <a:spcBef>
+                <a:spcPts val="500"/>
+              </a:spcBef>
+              <a:buSzTx/>
+              <a:buFontTx/>
+              <a:buNone/>
+              <a:defRPr sz="2624">
+                <a:latin typeface="Gill Sans Light"/>
+                <a:ea typeface="Gill Sans Light"/>
+                <a:cs typeface="Gill Sans Light"/>
+                <a:sym typeface="Gill Sans Light"/>
+              </a:defRPr>
+            </a:pPr>
+          </a:p>
+          <a:p>
+            <a:pPr marL="0" indent="0" defTabSz="374904">
+              <a:spcBef>
+                <a:spcPts val="500"/>
+              </a:spcBef>
+              <a:buSzTx/>
+              <a:buFontTx/>
+              <a:buNone/>
+              <a:defRPr sz="2624">
+                <a:latin typeface="Gill Sans Light"/>
+                <a:ea typeface="Gill Sans Light"/>
+                <a:cs typeface="Gill Sans Light"/>
+                <a:sym typeface="Gill Sans Light"/>
+              </a:defRPr>
+            </a:pPr>
+          </a:p>
+          <a:p>
+            <a:pPr marL="0" indent="0" defTabSz="374904">
+              <a:spcBef>
+                <a:spcPts val="500"/>
+              </a:spcBef>
+              <a:buSzTx/>
+              <a:buFontTx/>
+              <a:buNone/>
+              <a:defRPr sz="2624">
+                <a:latin typeface="Gill Sans Light"/>
+                <a:ea typeface="Gill Sans Light"/>
+                <a:cs typeface="Gill Sans Light"/>
+                <a:sym typeface="Gill Sans Light"/>
+              </a:defRPr>
+            </a:pPr>
+          </a:p>
+        </p:txBody>
+      </p:sp>
+      <p:sp>
+        <p:nvSpPr>
+          <p:cNvPr id="385" name="exercise"/>
           <p:cNvSpPr/>
           <p:nvPr/>
         </p:nvSpPr>
@@ -17271,7 +17427,7 @@
           <a:p>
             <a:pPr/>
             <a:r>
-              <a:t>Dictionaries are flexible</a:t>
+              <a:t>exercise</a:t>
             </a:r>
           </a:p>
         </p:txBody>
@@ -17309,14 +17465,14 @@
       </p:sp>
       <p:pic>
         <p:nvPicPr>
-          <p:cNvPr id="387" name="contacts-3.png" descr="contacts-3.png"/>
+          <p:cNvPr id="387" name="dict-nested.png" descr="dict-nested.png"/>
           <p:cNvPicPr>
             <a:picLocks noChangeAspect="1"/>
           </p:cNvPicPr>
           <p:nvPr/>
         </p:nvPicPr>
         <p:blipFill>
-          <a:blip r:embed="rId3">
+          <a:blip r:embed="rId4">
             <a:extLst/>
           </a:blip>
           <a:stretch>
@@ -17325,8 +17481,8 @@
         </p:blipFill>
         <p:spPr>
           <a:xfrm>
-            <a:off x="425450" y="3069020"/>
-            <a:ext cx="8293101" cy="2552701"/>
+            <a:off x="1143732" y="2329274"/>
+            <a:ext cx="6399336" cy="3339141"/>
           </a:xfrm>
           <a:prstGeom prst="rect">
             <a:avLst/>
@@ -17364,7 +17520,7 @@
       </p:grpSpPr>
       <p:sp>
         <p:nvSpPr>
-          <p:cNvPr id="391" name="Body"/>
+          <p:cNvPr id="391" name="We just met Carla, so we don't have as many details about her in our phonebook as we do for Shannon."/>
           <p:cNvSpPr txBox="1"/>
           <p:nvPr>
             <p:ph type="body" idx="1"/>
@@ -17379,22 +17535,27 @@
           <a:bodyPr>
             <a:normAutofit fontScale="100000" lnSpcReduction="0"/>
           </a:bodyPr>
-          <a:lstStyle/>
-          <a:p>
-            <a:pPr marL="0" indent="0">
+          <a:lstStyle>
+            <a:lvl1pPr marL="0" indent="0">
               <a:spcBef>
                 <a:spcPts val="600"/>
               </a:spcBef>
               <a:buSzTx/>
               <a:buFontTx/>
               <a:buNone/>
-            </a:pPr>
-          </a:p>
-        </p:txBody>
-      </p:sp>
-      <p:sp>
-        <p:nvSpPr>
-          <p:cNvPr id="392" name="I don't have that key"/>
+            </a:lvl1pPr>
+          </a:lstStyle>
+          <a:p>
+            <a:pPr/>
+            <a:r>
+              <a:t>We just met Carla, so we don't have as many details about her in our phonebook as we do for Shannon.</a:t>
+            </a:r>
+          </a:p>
+        </p:txBody>
+      </p:sp>
+      <p:sp>
+        <p:nvSpPr>
+          <p:cNvPr id="392" name="Dictionaries are flexible"/>
           <p:cNvSpPr/>
           <p:nvPr/>
         </p:nvSpPr>
@@ -17440,7 +17601,7 @@
           <a:p>
             <a:pPr/>
             <a:r>
-              <a:t>I don't have that key</a:t>
+              <a:t>Dictionaries are flexible</a:t>
             </a:r>
           </a:p>
         </p:txBody>
@@ -17494,37 +17655,8 @@
         </p:blipFill>
         <p:spPr>
           <a:xfrm>
-            <a:off x="425449" y="1280619"/>
-            <a:ext cx="8293101" cy="2552701"/>
-          </a:xfrm>
-          <a:prstGeom prst="rect">
-            <a:avLst/>
-          </a:prstGeom>
-          <a:ln w="12700">
-            <a:miter lim="400000"/>
-          </a:ln>
-        </p:spPr>
-      </p:pic>
-      <p:pic>
-        <p:nvPicPr>
-          <p:cNvPr id="395" name="contacts-4-keyerror.png" descr="contacts-4-keyerror.png"/>
-          <p:cNvPicPr>
-            <a:picLocks noChangeAspect="1"/>
-          </p:cNvPicPr>
-          <p:nvPr/>
-        </p:nvPicPr>
-        <p:blipFill>
-          <a:blip r:embed="rId4">
-            <a:extLst/>
-          </a:blip>
-          <a:stretch>
-            <a:fillRect/>
-          </a:stretch>
-        </p:blipFill>
-        <p:spPr>
-          <a:xfrm>
-            <a:off x="10409" y="4213840"/>
-            <a:ext cx="9144001" cy="1379221"/>
+            <a:off x="425450" y="3069020"/>
+            <a:ext cx="8293100" cy="2552701"/>
           </a:xfrm>
           <a:prstGeom prst="rect">
             <a:avLst/>
@@ -17562,7 +17694,7 @@
       </p:grpSpPr>
       <p:sp>
         <p:nvSpPr>
-          <p:cNvPr id="399" name="When you get a KeyError, your program stops. That's not always what you want."/>
+          <p:cNvPr id="398" name="Body"/>
           <p:cNvSpPr txBox="1"/>
           <p:nvPr>
             <p:ph type="body" idx="1"/>
@@ -17577,27 +17709,22 @@
           <a:bodyPr>
             <a:normAutofit fontScale="100000" lnSpcReduction="0"/>
           </a:bodyPr>
-          <a:lstStyle>
-            <a:lvl1pPr marL="0" indent="0">
+          <a:lstStyle/>
+          <a:p>
+            <a:pPr marL="0" indent="0">
               <a:spcBef>
                 <a:spcPts val="600"/>
               </a:spcBef>
               <a:buSzTx/>
               <a:buFontTx/>
               <a:buNone/>
-            </a:lvl1pPr>
-          </a:lstStyle>
-          <a:p>
-            <a:pPr/>
-            <a:r>
-              <a:t>When you get a KeyError, your program stops. That's not always what you want.</a:t>
-            </a:r>
-          </a:p>
-        </p:txBody>
-      </p:sp>
-      <p:sp>
-        <p:nvSpPr>
-          <p:cNvPr id="400" name="use .get( ) to keep going"/>
+            </a:pPr>
+          </a:p>
+        </p:txBody>
+      </p:sp>
+      <p:sp>
+        <p:nvSpPr>
+          <p:cNvPr id="399" name="I don't have that key"/>
           <p:cNvSpPr/>
           <p:nvPr/>
         </p:nvSpPr>
@@ -17643,14 +17770,14 @@
           <a:p>
             <a:pPr/>
             <a:r>
-              <a:t>use .get( ) to keep going</a:t>
-            </a:r>
-          </a:p>
-        </p:txBody>
-      </p:sp>
-      <p:sp>
-        <p:nvSpPr>
-          <p:cNvPr id="401" name="Slide Number"/>
+              <a:t>I don't have that key</a:t>
+            </a:r>
+          </a:p>
+        </p:txBody>
+      </p:sp>
+      <p:sp>
+        <p:nvSpPr>
+          <p:cNvPr id="400" name="Slide Number"/>
           <p:cNvSpPr txBox="1"/>
           <p:nvPr>
             <p:ph type="sldNum" sz="quarter" idx="2"/>
@@ -17681,7 +17808,7 @@
       </p:sp>
       <p:pic>
         <p:nvPicPr>
-          <p:cNvPr id="402" name="contacts-5.png" descr="contacts-5.png"/>
+          <p:cNvPr id="401" name="contacts-3.png" descr="contacts-3.png"/>
           <p:cNvPicPr>
             <a:picLocks noChangeAspect="1"/>
           </p:cNvPicPr>
@@ -17697,8 +17824,37 @@
         </p:blipFill>
         <p:spPr>
           <a:xfrm>
-            <a:off x="-1" y="2735641"/>
-            <a:ext cx="9144001" cy="2539571"/>
+            <a:off x="425450" y="1280619"/>
+            <a:ext cx="8293100" cy="2552701"/>
+          </a:xfrm>
+          <a:prstGeom prst="rect">
+            <a:avLst/>
+          </a:prstGeom>
+          <a:ln w="12700">
+            <a:miter lim="400000"/>
+          </a:ln>
+        </p:spPr>
+      </p:pic>
+      <p:pic>
+        <p:nvPicPr>
+          <p:cNvPr id="402" name="contacts-4-keyerror.png" descr="contacts-4-keyerror.png"/>
+          <p:cNvPicPr>
+            <a:picLocks noChangeAspect="1"/>
+          </p:cNvPicPr>
+          <p:nvPr/>
+        </p:nvPicPr>
+        <p:blipFill>
+          <a:blip r:embed="rId4">
+            <a:extLst/>
+          </a:blip>
+          <a:stretch>
+            <a:fillRect/>
+          </a:stretch>
+        </p:blipFill>
+        <p:spPr>
+          <a:xfrm>
+            <a:off x="10409" y="4213840"/>
+            <a:ext cx="9144001" cy="1379221"/>
           </a:xfrm>
           <a:prstGeom prst="rect">
             <a:avLst/>
@@ -17736,7 +17892,7 @@
       </p:grpSpPr>
       <p:sp>
         <p:nvSpPr>
-          <p:cNvPr id="406" name="Save these exercise instructions to your computer,  open it in Sublime/IDLE and work from there!…"/>
+          <p:cNvPr id="406" name="When you get a KeyError, your program stops. That's not always what you want."/>
           <p:cNvSpPr txBox="1"/>
           <p:nvPr>
             <p:ph type="body" idx="1"/>
@@ -17751,136 +17907,27 @@
           <a:bodyPr>
             <a:normAutofit fontScale="100000" lnSpcReduction="0"/>
           </a:bodyPr>
-          <a:lstStyle/>
-          <a:p>
-            <a:pPr marL="0" indent="0" defTabSz="315468">
-              <a:spcBef>
-                <a:spcPts val="400"/>
+          <a:lstStyle>
+            <a:lvl1pPr marL="0" indent="0">
+              <a:spcBef>
+                <a:spcPts val="600"/>
               </a:spcBef>
               <a:buSzTx/>
               <a:buFontTx/>
               <a:buNone/>
-              <a:defRPr sz="2208"/>
-            </a:pPr>
-            <a:r>
-              <a:t>Save these </a:t>
-            </a:r>
-            <a:r>
-              <a:rPr b="1" u="sng">
-                <a:solidFill>
-                  <a:srgbClr val="0000FF"/>
-                </a:solidFill>
-                <a:uFill>
-                  <a:solidFill>
-                    <a:srgbClr val="0000FF"/>
-                  </a:solidFill>
-                </a:uFill>
-                <a:hlinkClick r:id="rId2" invalidUrl="" action="" tgtFrame="" tooltip="" history="1" highlightClick="0" endSnd="0"/>
-              </a:rPr>
-              <a:t>exercise instructions</a:t>
-            </a:r>
-            <a:r>
-              <a:t> to your computer,  open it in Sublime/IDLE and work from there!</a:t>
-            </a:r>
-          </a:p>
-          <a:p>
-            <a:pPr marL="0" indent="0" defTabSz="315468">
-              <a:spcBef>
-                <a:spcPts val="400"/>
-              </a:spcBef>
-              <a:buSzTx/>
-              <a:buFontTx/>
-              <a:buNone/>
-              <a:defRPr sz="2208"/>
-            </a:pPr>
-          </a:p>
-          <a:p>
-            <a:pPr marL="0" indent="0" defTabSz="315468">
-              <a:spcBef>
-                <a:spcPts val="400"/>
-              </a:spcBef>
-              <a:buSzTx/>
-              <a:buFontTx/>
-              <a:buNone/>
-              <a:defRPr sz="2208"/>
-            </a:pPr>
-            <a:r>
-              <a:rPr b="1"/>
-              <a:t>Just do #1 for now.</a:t>
-            </a:r>
-            <a:r>
-              <a:t> Once we've added items to our dictionary, we'll see how to loop through it in the next slides.</a:t>
-            </a:r>
-          </a:p>
-          <a:p>
-            <a:pPr marL="0" indent="0" defTabSz="315468">
-              <a:spcBef>
-                <a:spcPts val="800"/>
-              </a:spcBef>
-              <a:buSzTx/>
-              <a:buFontTx/>
-              <a:buNone/>
-              <a:defRPr b="1" sz="2208">
-                <a:latin typeface="Courier New"/>
-                <a:ea typeface="Courier New"/>
-                <a:cs typeface="Courier New"/>
-                <a:sym typeface="Courier New"/>
-              </a:defRPr>
-            </a:pPr>
-          </a:p>
-          <a:p>
-            <a:pPr marL="0" indent="0" defTabSz="315468">
-              <a:spcBef>
-                <a:spcPts val="800"/>
-              </a:spcBef>
-              <a:buSzTx/>
-              <a:buFontTx/>
-              <a:buNone/>
-              <a:defRPr b="1" sz="2208">
-                <a:latin typeface="Courier New"/>
-                <a:ea typeface="Courier New"/>
-                <a:cs typeface="Courier New"/>
-                <a:sym typeface="Courier New"/>
-              </a:defRPr>
-            </a:pPr>
-          </a:p>
-          <a:p>
-            <a:pPr marL="0" indent="0" defTabSz="315468">
-              <a:spcBef>
-                <a:spcPts val="800"/>
-              </a:spcBef>
-              <a:buSzTx/>
-              <a:buFontTx/>
-              <a:buNone/>
-              <a:defRPr b="1" sz="2208">
-                <a:latin typeface="Courier New"/>
-                <a:ea typeface="Courier New"/>
-                <a:cs typeface="Courier New"/>
-                <a:sym typeface="Courier New"/>
-              </a:defRPr>
-            </a:pPr>
-          </a:p>
-          <a:p>
-            <a:pPr marL="0" indent="0" defTabSz="315468">
-              <a:spcBef>
-                <a:spcPts val="800"/>
-              </a:spcBef>
-              <a:buSzTx/>
-              <a:buFontTx/>
-              <a:buNone/>
-              <a:defRPr b="1" sz="2208">
-                <a:latin typeface="Courier New"/>
-                <a:ea typeface="Courier New"/>
-                <a:cs typeface="Courier New"/>
-                <a:sym typeface="Courier New"/>
-              </a:defRPr>
-            </a:pPr>
-          </a:p>
-        </p:txBody>
-      </p:sp>
-      <p:sp>
-        <p:nvSpPr>
-          <p:cNvPr id="407" name="exercise"/>
+            </a:lvl1pPr>
+          </a:lstStyle>
+          <a:p>
+            <a:pPr/>
+            <a:r>
+              <a:t>When you get a KeyError, your program stops. That's not always what you want.</a:t>
+            </a:r>
+          </a:p>
+        </p:txBody>
+      </p:sp>
+      <p:sp>
+        <p:nvSpPr>
+          <p:cNvPr id="407" name="use .get( ) to keep going"/>
           <p:cNvSpPr/>
           <p:nvPr/>
         </p:nvSpPr>
@@ -17926,7 +17973,7 @@
           <a:p>
             <a:pPr/>
             <a:r>
-              <a:t>exercise</a:t>
+              <a:t>use .get( ) to keep going</a:t>
             </a:r>
           </a:p>
         </p:txBody>
@@ -17964,7 +18011,7 @@
       </p:sp>
       <p:pic>
         <p:nvPicPr>
-          <p:cNvPr id="409" name="contacts-6.png" descr="contacts-6.png"/>
+          <p:cNvPr id="409" name="contacts-5.png" descr="contacts-5.png"/>
           <p:cNvPicPr>
             <a:picLocks noChangeAspect="1"/>
           </p:cNvPicPr>
@@ -17980,8 +18027,8 @@
         </p:blipFill>
         <p:spPr>
           <a:xfrm>
-            <a:off x="1352339" y="3350729"/>
-            <a:ext cx="6439322" cy="2359615"/>
+            <a:off x="-1" y="2735641"/>
+            <a:ext cx="9144001" cy="2539571"/>
           </a:xfrm>
           <a:prstGeom prst="rect">
             <a:avLst/>
@@ -18019,7 +18066,7 @@
       </p:grpSpPr>
       <p:sp>
         <p:nvSpPr>
-          <p:cNvPr id="411" name="Let's loop through the contacts list we just created.  We have a handful of ways to do this.…"/>
+          <p:cNvPr id="413" name="Save these exercise instructions to your computer,  open it in Sublime/IDLE and work from there!…"/>
           <p:cNvSpPr txBox="1"/>
           <p:nvPr>
             <p:ph type="body" idx="1"/>
@@ -18036,56 +18083,134 @@
           </a:bodyPr>
           <a:lstStyle/>
           <a:p>
-            <a:pPr marL="0" indent="0">
-              <a:spcBef>
-                <a:spcPts val="600"/>
+            <a:pPr marL="0" indent="0" defTabSz="315468">
+              <a:spcBef>
+                <a:spcPts val="400"/>
               </a:spcBef>
               <a:buSzTx/>
               <a:buFontTx/>
               <a:buNone/>
-            </a:pPr>
-            <a:r>
-              <a:t>Let's loop through the contacts list we just created.  We have a handful of ways to do this.</a:t>
-            </a:r>
-          </a:p>
-          <a:p>
-            <a:pPr marL="0" indent="0">
-              <a:spcBef>
-                <a:spcPts val="600"/>
+              <a:defRPr sz="2208"/>
+            </a:pPr>
+            <a:r>
+              <a:t>Save these </a:t>
+            </a:r>
+            <a:r>
+              <a:rPr b="1" u="sng">
+                <a:solidFill>
+                  <a:srgbClr val="0000FF"/>
+                </a:solidFill>
+                <a:uFill>
+                  <a:solidFill>
+                    <a:srgbClr val="0000FF"/>
+                  </a:solidFill>
+                </a:uFill>
+                <a:hlinkClick r:id="rId2" invalidUrl="" action="" tgtFrame="" tooltip="" history="1" highlightClick="0" endSnd="0"/>
+              </a:rPr>
+              <a:t>exercise instructions</a:t>
+            </a:r>
+            <a:r>
+              <a:t> to your computer,  open it in Sublime/IDLE and work from there!</a:t>
+            </a:r>
+          </a:p>
+          <a:p>
+            <a:pPr marL="0" indent="0" defTabSz="315468">
+              <a:spcBef>
+                <a:spcPts val="400"/>
               </a:spcBef>
               <a:buSzTx/>
               <a:buFontTx/>
               <a:buNone/>
-            </a:pPr>
-          </a:p>
-          <a:p>
-            <a:pPr marL="228600" indent="-228600">
-              <a:spcBef>
-                <a:spcPts val="600"/>
-              </a:spcBef>
-              <a:buAutoNum type="arabicPeriod" startAt="1"/>
-            </a:pPr>
-            <a:r>
-              <a:t>  Looping by keys (Shannon, Hear Me Code, everyone else at your table…)</a:t>
-            </a:r>
-            <a:br/>
-          </a:p>
-          <a:p>
-            <a:pPr marL="228600" indent="-228600">
-              <a:spcBef>
-                <a:spcPts val="600"/>
-              </a:spcBef>
-              <a:buAutoNum type="arabicPeriod" startAt="1"/>
-            </a:pPr>
-            <a:r>
-              <a:t> Looping by key / value pairs together</a:t>
-            </a:r>
-          </a:p>
-        </p:txBody>
-      </p:sp>
-      <p:sp>
-        <p:nvSpPr>
-          <p:cNvPr id="412" name="looping through a dictionary"/>
+              <a:defRPr sz="2208"/>
+            </a:pPr>
+          </a:p>
+          <a:p>
+            <a:pPr marL="0" indent="0" defTabSz="315468">
+              <a:spcBef>
+                <a:spcPts val="400"/>
+              </a:spcBef>
+              <a:buSzTx/>
+              <a:buFontTx/>
+              <a:buNone/>
+              <a:defRPr sz="2208"/>
+            </a:pPr>
+            <a:r>
+              <a:rPr b="1"/>
+              <a:t>Just do #1 for now.</a:t>
+            </a:r>
+            <a:r>
+              <a:t> Once we've added items to our dictionary, we'll see how to loop through it in the next slides.</a:t>
+            </a:r>
+          </a:p>
+          <a:p>
+            <a:pPr marL="0" indent="0" defTabSz="315468">
+              <a:spcBef>
+                <a:spcPts val="800"/>
+              </a:spcBef>
+              <a:buSzTx/>
+              <a:buFontTx/>
+              <a:buNone/>
+              <a:defRPr b="1" sz="2208">
+                <a:latin typeface="Courier New"/>
+                <a:ea typeface="Courier New"/>
+                <a:cs typeface="Courier New"/>
+                <a:sym typeface="Courier New"/>
+              </a:defRPr>
+            </a:pPr>
+          </a:p>
+          <a:p>
+            <a:pPr marL="0" indent="0" defTabSz="315468">
+              <a:spcBef>
+                <a:spcPts val="800"/>
+              </a:spcBef>
+              <a:buSzTx/>
+              <a:buFontTx/>
+              <a:buNone/>
+              <a:defRPr b="1" sz="2208">
+                <a:latin typeface="Courier New"/>
+                <a:ea typeface="Courier New"/>
+                <a:cs typeface="Courier New"/>
+                <a:sym typeface="Courier New"/>
+              </a:defRPr>
+            </a:pPr>
+          </a:p>
+          <a:p>
+            <a:pPr marL="0" indent="0" defTabSz="315468">
+              <a:spcBef>
+                <a:spcPts val="800"/>
+              </a:spcBef>
+              <a:buSzTx/>
+              <a:buFontTx/>
+              <a:buNone/>
+              <a:defRPr b="1" sz="2208">
+                <a:latin typeface="Courier New"/>
+                <a:ea typeface="Courier New"/>
+                <a:cs typeface="Courier New"/>
+                <a:sym typeface="Courier New"/>
+              </a:defRPr>
+            </a:pPr>
+          </a:p>
+          <a:p>
+            <a:pPr marL="0" indent="0" defTabSz="315468">
+              <a:spcBef>
+                <a:spcPts val="800"/>
+              </a:spcBef>
+              <a:buSzTx/>
+              <a:buFontTx/>
+              <a:buNone/>
+              <a:defRPr b="1" sz="2208">
+                <a:latin typeface="Courier New"/>
+                <a:ea typeface="Courier New"/>
+                <a:cs typeface="Courier New"/>
+                <a:sym typeface="Courier New"/>
+              </a:defRPr>
+            </a:pPr>
+          </a:p>
+        </p:txBody>
+      </p:sp>
+      <p:sp>
+        <p:nvSpPr>
+          <p:cNvPr id="414" name="exercise"/>
           <p:cNvSpPr/>
           <p:nvPr/>
         </p:nvSpPr>
@@ -18116,11 +18241,11 @@
             <a:normAutofit fontScale="100000" lnSpcReduction="0"/>
           </a:bodyPr>
           <a:lstStyle>
-            <a:lvl1pPr defTabSz="448055">
+            <a:lvl1pPr>
               <a:spcBef>
                 <a:spcPts val="900"/>
               </a:spcBef>
-              <a:defRPr cap="all" sz="3920">
+              <a:defRPr cap="all" sz="4000">
                 <a:latin typeface="+mn-lt"/>
                 <a:ea typeface="+mn-ea"/>
                 <a:cs typeface="+mn-cs"/>
@@ -18131,14 +18256,14 @@
           <a:p>
             <a:pPr/>
             <a:r>
-              <a:t>looping through a dictionary</a:t>
-            </a:r>
-          </a:p>
-        </p:txBody>
-      </p:sp>
-      <p:sp>
-        <p:nvSpPr>
-          <p:cNvPr id="413" name="Slide Number"/>
+              <a:t>exercise</a:t>
+            </a:r>
+          </a:p>
+        </p:txBody>
+      </p:sp>
+      <p:sp>
+        <p:nvSpPr>
+          <p:cNvPr id="415" name="Slide Number"/>
           <p:cNvSpPr txBox="1"/>
           <p:nvPr>
             <p:ph type="sldNum" sz="quarter" idx="2"/>
@@ -18167,6 +18292,35 @@
           </a:p>
         </p:txBody>
       </p:sp>
+      <p:pic>
+        <p:nvPicPr>
+          <p:cNvPr id="416" name="contacts-6.png" descr="contacts-6.png"/>
+          <p:cNvPicPr>
+            <a:picLocks noChangeAspect="1"/>
+          </p:cNvPicPr>
+          <p:nvPr/>
+        </p:nvPicPr>
+        <p:blipFill>
+          <a:blip r:embed="rId3">
+            <a:extLst/>
+          </a:blip>
+          <a:stretch>
+            <a:fillRect/>
+          </a:stretch>
+        </p:blipFill>
+        <p:spPr>
+          <a:xfrm>
+            <a:off x="1352339" y="3350729"/>
+            <a:ext cx="6439322" cy="2359615"/>
+          </a:xfrm>
+          <a:prstGeom prst="rect">
+            <a:avLst/>
+          </a:prstGeom>
+          <a:ln w="12700">
+            <a:miter lim="400000"/>
+          </a:ln>
+        </p:spPr>
+      </p:pic>
     </p:spTree>
   </p:cSld>
   <p:clrMapOvr>
@@ -18195,7 +18349,7 @@
       </p:grpSpPr>
       <p:sp>
         <p:nvSpPr>
-          <p:cNvPr id="415" name=".keys() creates a list of all of the keys in your dictionary.…"/>
+          <p:cNvPr id="418" name="Let's loop through the contacts list we just created.  We have a handful of ways to do this.…"/>
           <p:cNvSpPr txBox="1"/>
           <p:nvPr>
             <p:ph type="body" idx="1"/>
@@ -18219,40 +18373,10 @@
               <a:buSzTx/>
               <a:buFontTx/>
               <a:buNone/>
-              <a:defRPr>
-                <a:latin typeface="Gill Sans Light"/>
-                <a:ea typeface="Gill Sans Light"/>
-                <a:cs typeface="Gill Sans Light"/>
-                <a:sym typeface="Gill Sans Light"/>
-              </a:defRPr>
-            </a:pPr>
-            <a:r>
-              <a:rPr b="1">
-                <a:latin typeface="Courier New"/>
-                <a:ea typeface="Courier New"/>
-                <a:cs typeface="Courier New"/>
-                <a:sym typeface="Courier New"/>
-              </a:rPr>
-              <a:t>.keys()</a:t>
-            </a:r>
-            <a:r>
-              <a:t> </a:t>
-            </a:r>
-            <a:r>
-              <a:rPr>
-                <a:latin typeface="+mn-lt"/>
-                <a:ea typeface="+mn-ea"/>
-                <a:cs typeface="+mn-cs"/>
-                <a:sym typeface="Century Gothic"/>
-              </a:rPr>
-              <a:t>creates a list of all of the keys in your dictionary.</a:t>
-            </a:r>
-            <a:endParaRPr>
-              <a:latin typeface="+mn-lt"/>
-              <a:ea typeface="+mn-ea"/>
-              <a:cs typeface="+mn-cs"/>
-              <a:sym typeface="Century Gothic"/>
-            </a:endParaRPr>
+            </a:pPr>
+            <a:r>
+              <a:t>Let's loop through the contacts list we just created.  We have a handful of ways to do this.</a:t>
+            </a:r>
           </a:p>
           <a:p>
             <a:pPr marL="0" indent="0">
@@ -18265,40 +18389,33 @@
             </a:pPr>
           </a:p>
           <a:p>
-            <a:pPr marL="0" indent="0">
+            <a:pPr marL="228600" indent="-228600">
               <a:spcBef>
                 <a:spcPts val="600"/>
               </a:spcBef>
-              <a:buSzTx/>
-              <a:buFontTx/>
-              <a:buNone/>
-            </a:pPr>
-          </a:p>
-          <a:p>
-            <a:pPr marL="0" indent="0">
+              <a:buAutoNum type="arabicPeriod" startAt="1"/>
+            </a:pPr>
+            <a:r>
+              <a:t>  Looping by keys (Shannon, Hear Me Code, everyone else at your table…)</a:t>
+            </a:r>
+            <a:br/>
+          </a:p>
+          <a:p>
+            <a:pPr marL="228600" indent="-228600">
               <a:spcBef>
                 <a:spcPts val="600"/>
               </a:spcBef>
-              <a:buSzTx/>
-              <a:buFontTx/>
-              <a:buNone/>
-            </a:pPr>
-            <a:r>
-              <a:t>Because </a:t>
-            </a:r>
-            <a:r>
-              <a:rPr b="1"/>
-              <a:t>dictionaries are unordered,</a:t>
-            </a:r>
-            <a:r>
-              <a:t> you might get keys in a different order than you see below, or a different order than you put them in.  That's okay.</a:t>
-            </a:r>
-          </a:p>
-        </p:txBody>
-      </p:sp>
-      <p:sp>
-        <p:nvSpPr>
-          <p:cNvPr id="416" name=".keys( ) creates a list"/>
+              <a:buAutoNum type="arabicPeriod" startAt="1"/>
+            </a:pPr>
+            <a:r>
+              <a:t> Looping by key / value pairs together</a:t>
+            </a:r>
+          </a:p>
+        </p:txBody>
+      </p:sp>
+      <p:sp>
+        <p:nvSpPr>
+          <p:cNvPr id="419" name="looping through a dictionary"/>
           <p:cNvSpPr/>
           <p:nvPr/>
         </p:nvSpPr>
@@ -18329,11 +18446,11 @@
             <a:normAutofit fontScale="100000" lnSpcReduction="0"/>
           </a:bodyPr>
           <a:lstStyle>
-            <a:lvl1pPr>
+            <a:lvl1pPr defTabSz="448055">
               <a:spcBef>
                 <a:spcPts val="900"/>
               </a:spcBef>
-              <a:defRPr cap="all" sz="4000">
+              <a:defRPr cap="all" sz="3920">
                 <a:latin typeface="+mn-lt"/>
                 <a:ea typeface="+mn-ea"/>
                 <a:cs typeface="+mn-cs"/>
@@ -18344,14 +18461,14 @@
           <a:p>
             <a:pPr/>
             <a:r>
-              <a:t>.keys( ) creates a list</a:t>
-            </a:r>
-          </a:p>
-        </p:txBody>
-      </p:sp>
-      <p:sp>
-        <p:nvSpPr>
-          <p:cNvPr id="417" name="Slide Number"/>
+              <a:t>looping through a dictionary</a:t>
+            </a:r>
+          </a:p>
+        </p:txBody>
+      </p:sp>
+      <p:sp>
+        <p:nvSpPr>
+          <p:cNvPr id="420" name="Slide Number"/>
           <p:cNvSpPr txBox="1"/>
           <p:nvPr>
             <p:ph type="sldNum" sz="quarter" idx="2"/>
@@ -18380,35 +18497,6 @@
           </a:p>
         </p:txBody>
       </p:sp>
-      <p:pic>
-        <p:nvPicPr>
-          <p:cNvPr id="418" name="contacts-7.png" descr="contacts-7.png"/>
-          <p:cNvPicPr>
-            <a:picLocks noChangeAspect="1"/>
-          </p:cNvPicPr>
-          <p:nvPr/>
-        </p:nvPicPr>
-        <p:blipFill>
-          <a:blip r:embed="rId2">
-            <a:extLst/>
-          </a:blip>
-          <a:stretch>
-            <a:fillRect/>
-          </a:stretch>
-        </p:blipFill>
-        <p:spPr>
-          <a:xfrm>
-            <a:off x="1117600" y="2534635"/>
-            <a:ext cx="6908800" cy="990601"/>
-          </a:xfrm>
-          <a:prstGeom prst="rect">
-            <a:avLst/>
-          </a:prstGeom>
-          <a:ln w="12700">
-            <a:miter lim="400000"/>
-          </a:ln>
-        </p:spPr>
-      </p:pic>
     </p:spTree>
   </p:cSld>
   <p:clrMapOvr>
@@ -18437,7 +18525,7 @@
       </p:grpSpPr>
       <p:sp>
         <p:nvSpPr>
-          <p:cNvPr id="420" name=".keys() will create a list of all of the keys in your dictionary.…"/>
+          <p:cNvPr id="422" name=".keys() creates a list of all of the keys in your dictionary.…"/>
           <p:cNvSpPr txBox="1"/>
           <p:nvPr>
             <p:ph type="body" idx="1"/>
@@ -18487,7 +18575,7 @@
                 <a:cs typeface="+mn-cs"/>
                 <a:sym typeface="Century Gothic"/>
               </a:rPr>
-              <a:t>will create a list of all of the keys in your dictionary.</a:t>
+              <a:t>creates a list of all of the keys in your dictionary.</a:t>
             </a:r>
             <a:endParaRPr>
               <a:latin typeface="+mn-lt"/>
@@ -18526,14 +18614,21 @@
               <a:buNone/>
             </a:pPr>
             <a:r>
-              <a:t>If you have a list, you can loop over it!</a:t>
-            </a:r>
-          </a:p>
-        </p:txBody>
-      </p:sp>
-      <p:sp>
-        <p:nvSpPr>
-          <p:cNvPr id="421" name="we can loop over a list!"/>
+              <a:t>Because </a:t>
+            </a:r>
+            <a:r>
+              <a:rPr b="1"/>
+              <a:t>dictionaries are unordered,</a:t>
+            </a:r>
+            <a:r>
+              <a:t> you might get keys in a different order than you see below, or a different order than you put them in.  That's okay.</a:t>
+            </a:r>
+          </a:p>
+        </p:txBody>
+      </p:sp>
+      <p:sp>
+        <p:nvSpPr>
+          <p:cNvPr id="423" name=".keys( ) creates a list"/>
           <p:cNvSpPr/>
           <p:nvPr/>
         </p:nvSpPr>
@@ -18579,14 +18674,14 @@
           <a:p>
             <a:pPr/>
             <a:r>
-              <a:t>we can loop over a list!</a:t>
-            </a:r>
-          </a:p>
-        </p:txBody>
-      </p:sp>
-      <p:sp>
-        <p:nvSpPr>
-          <p:cNvPr id="422" name="Slide Number"/>
+              <a:t>.keys( ) creates a list</a:t>
+            </a:r>
+          </a:p>
+        </p:txBody>
+      </p:sp>
+      <p:sp>
+        <p:nvSpPr>
+          <p:cNvPr id="424" name="Slide Number"/>
           <p:cNvSpPr txBox="1"/>
           <p:nvPr>
             <p:ph type="sldNum" sz="quarter" idx="2"/>
@@ -18617,7 +18712,7 @@
       </p:sp>
       <p:pic>
         <p:nvPicPr>
-          <p:cNvPr id="423" name="contacts-7.png" descr="contacts-7.png"/>
+          <p:cNvPr id="425" name="contacts-7.png" descr="contacts-7.png"/>
           <p:cNvPicPr>
             <a:picLocks noChangeAspect="1"/>
           </p:cNvPicPr>
@@ -18633,37 +18728,8 @@
         </p:blipFill>
         <p:spPr>
           <a:xfrm>
-            <a:off x="1117599" y="2561162"/>
-            <a:ext cx="6908801" cy="990601"/>
-          </a:xfrm>
-          <a:prstGeom prst="rect">
-            <a:avLst/>
-          </a:prstGeom>
-          <a:ln w="12700">
-            <a:miter lim="400000"/>
-          </a:ln>
-        </p:spPr>
-      </p:pic>
-      <p:pic>
-        <p:nvPicPr>
-          <p:cNvPr id="424" name="contacts-8.png" descr="contacts-8.png"/>
-          <p:cNvPicPr>
-            <a:picLocks noChangeAspect="1"/>
-          </p:cNvPicPr>
-          <p:nvPr/>
-        </p:nvPicPr>
-        <p:blipFill>
-          <a:blip r:embed="rId3">
-            <a:extLst/>
-          </a:blip>
-          <a:stretch>
-            <a:fillRect/>
-          </a:stretch>
-        </p:blipFill>
-        <p:spPr>
-          <a:xfrm>
-            <a:off x="1653318" y="4196934"/>
-            <a:ext cx="5837364" cy="1677278"/>
+            <a:off x="1117600" y="2534635"/>
+            <a:ext cx="6908800" cy="990601"/>
           </a:xfrm>
           <a:prstGeom prst="rect">
             <a:avLst/>
@@ -18701,7 +18767,7 @@
       </p:grpSpPr>
       <p:sp>
         <p:nvSpPr>
-          <p:cNvPr id="426" name=".keys() will create a list of all of the keys in your dictionary.…"/>
+          <p:cNvPr id="427" name=".keys() will create a list of all of the keys in your dictionary.…"/>
           <p:cNvSpPr txBox="1"/>
           <p:nvPr>
             <p:ph type="body" idx="1"/>
@@ -18797,7 +18863,7 @@
       </p:sp>
       <p:sp>
         <p:nvSpPr>
-          <p:cNvPr id="427" name="we can loop over a list!"/>
+          <p:cNvPr id="428" name="we can loop over a list!"/>
           <p:cNvSpPr/>
           <p:nvPr/>
         </p:nvSpPr>
@@ -18850,7 +18916,7 @@
       </p:sp>
       <p:sp>
         <p:nvSpPr>
-          <p:cNvPr id="428" name="Slide Number"/>
+          <p:cNvPr id="429" name="Slide Number"/>
           <p:cNvSpPr txBox="1"/>
           <p:nvPr>
             <p:ph type="sldNum" sz="quarter" idx="2"/>
@@ -18881,7 +18947,36 @@
       </p:sp>
       <p:pic>
         <p:nvPicPr>
-          <p:cNvPr id="429" name="contacts-7.png" descr="contacts-7.png"/>
+          <p:cNvPr id="430" name="contacts-7.png" descr="contacts-7.png"/>
+          <p:cNvPicPr>
+            <a:picLocks noChangeAspect="1"/>
+          </p:cNvPicPr>
+          <p:nvPr/>
+        </p:nvPicPr>
+        <p:blipFill>
+          <a:blip r:embed="rId2">
+            <a:extLst/>
+          </a:blip>
+          <a:stretch>
+            <a:fillRect/>
+          </a:stretch>
+        </p:blipFill>
+        <p:spPr>
+          <a:xfrm>
+            <a:off x="1117600" y="2561162"/>
+            <a:ext cx="6908800" cy="990601"/>
+          </a:xfrm>
+          <a:prstGeom prst="rect">
+            <a:avLst/>
+          </a:prstGeom>
+          <a:ln w="12700">
+            <a:miter lim="400000"/>
+          </a:ln>
+        </p:spPr>
+      </p:pic>
+      <p:pic>
+        <p:nvPicPr>
+          <p:cNvPr id="431" name="contacts-8.png" descr="contacts-8.png"/>
           <p:cNvPicPr>
             <a:picLocks noChangeAspect="1"/>
           </p:cNvPicPr>
@@ -18897,37 +18992,8 @@
         </p:blipFill>
         <p:spPr>
           <a:xfrm>
-            <a:off x="1117600" y="2561162"/>
-            <a:ext cx="6908800" cy="990601"/>
-          </a:xfrm>
-          <a:prstGeom prst="rect">
-            <a:avLst/>
-          </a:prstGeom>
-          <a:ln w="12700">
-            <a:miter lim="400000"/>
-          </a:ln>
-        </p:spPr>
-      </p:pic>
-      <p:pic>
-        <p:nvPicPr>
-          <p:cNvPr id="430" name="contacts-9.png" descr="contacts-9.png"/>
-          <p:cNvPicPr>
-            <a:picLocks noChangeAspect="1"/>
-          </p:cNvPicPr>
-          <p:nvPr/>
-        </p:nvPicPr>
-        <p:blipFill>
-          <a:blip r:embed="rId4">
-            <a:extLst/>
-          </a:blip>
-          <a:stretch>
-            <a:fillRect/>
-          </a:stretch>
-        </p:blipFill>
-        <p:spPr>
-          <a:xfrm>
-            <a:off x="-1" y="4382647"/>
-            <a:ext cx="9144001" cy="1204252"/>
+            <a:off x="1653318" y="4196934"/>
+            <a:ext cx="5837364" cy="1677278"/>
           </a:xfrm>
           <a:prstGeom prst="rect">
             <a:avLst/>
@@ -18965,7 +19031,7 @@
       </p:grpSpPr>
       <p:sp>
         <p:nvSpPr>
-          <p:cNvPr id="434" name="Dictionaries themselves have no ordering, but we can order their keys:…"/>
+          <p:cNvPr id="433" name=".keys() will create a list of all of the keys in your dictionary.…"/>
           <p:cNvSpPr txBox="1"/>
           <p:nvPr>
             <p:ph type="body" idx="1"/>
@@ -18982,120 +19048,86 @@
           </a:bodyPr>
           <a:lstStyle/>
           <a:p>
-            <a:pPr marL="0" indent="0" defTabSz="429768">
+            <a:pPr marL="0" indent="0">
               <a:spcBef>
                 <a:spcPts val="600"/>
               </a:spcBef>
               <a:buSzTx/>
               <a:buFontTx/>
               <a:buNone/>
-              <a:defRPr sz="3008"/>
-            </a:pPr>
-            <a:r>
-              <a:rPr b="1"/>
-              <a:t>Dictionaries themselves have no ordering</a:t>
-            </a:r>
-            <a:r>
-              <a:t>, but we can order their keys:</a:t>
-            </a:r>
-          </a:p>
-          <a:p>
-            <a:pPr marL="0" indent="0" defTabSz="429768">
-              <a:spcBef>
-                <a:spcPts val="1100"/>
-              </a:spcBef>
-              <a:buSzTx/>
-              <a:buFontTx/>
-              <a:buNone/>
-              <a:defRPr b="1" sz="3008">
+              <a:defRPr>
+                <a:latin typeface="Gill Sans Light"/>
+                <a:ea typeface="Gill Sans Light"/>
+                <a:cs typeface="Gill Sans Light"/>
+                <a:sym typeface="Gill Sans Light"/>
+              </a:defRPr>
+            </a:pPr>
+            <a:r>
+              <a:rPr b="1">
                 <a:latin typeface="Courier New"/>
                 <a:ea typeface="Courier New"/>
                 <a:cs typeface="Courier New"/>
                 <a:sym typeface="Courier New"/>
-              </a:defRPr>
-            </a:pPr>
-          </a:p>
-          <a:p>
-            <a:pPr marL="0" indent="0" defTabSz="429768">
-              <a:spcBef>
-                <a:spcPts val="1100"/>
-              </a:spcBef>
-              <a:buSzTx/>
-              <a:buFontTx/>
-              <a:buNone/>
-              <a:defRPr b="1" sz="3008">
-                <a:latin typeface="Courier New"/>
-                <a:ea typeface="Courier New"/>
-                <a:cs typeface="Courier New"/>
-                <a:sym typeface="Courier New"/>
-              </a:defRPr>
-            </a:pPr>
-          </a:p>
-          <a:p>
-            <a:pPr marL="0" indent="0" defTabSz="429768">
-              <a:spcBef>
-                <a:spcPts val="1100"/>
-              </a:spcBef>
-              <a:buSzTx/>
-              <a:buFontTx/>
-              <a:buNone/>
-              <a:defRPr b="1" sz="3008">
-                <a:latin typeface="Courier New"/>
-                <a:ea typeface="Courier New"/>
-                <a:cs typeface="Courier New"/>
-                <a:sym typeface="Courier New"/>
-              </a:defRPr>
-            </a:pPr>
-          </a:p>
-          <a:p>
-            <a:pPr marL="0" indent="0" defTabSz="429768">
-              <a:spcBef>
-                <a:spcPts val="1100"/>
-              </a:spcBef>
-              <a:buSzTx/>
-              <a:buFontTx/>
-              <a:buNone/>
-              <a:defRPr b="1" sz="3008">
-                <a:latin typeface="Courier New"/>
-                <a:ea typeface="Courier New"/>
-                <a:cs typeface="Courier New"/>
-                <a:sym typeface="Courier New"/>
-              </a:defRPr>
-            </a:pPr>
-          </a:p>
-          <a:p>
-            <a:pPr marL="0" indent="0" defTabSz="429768">
-              <a:spcBef>
-                <a:spcPts val="1100"/>
-              </a:spcBef>
-              <a:buSzTx/>
-              <a:buFontTx/>
-              <a:buNone/>
-              <a:defRPr b="1" sz="3008">
-                <a:latin typeface="Courier New"/>
-                <a:ea typeface="Courier New"/>
-                <a:cs typeface="Courier New"/>
-                <a:sym typeface="Courier New"/>
-              </a:defRPr>
-            </a:pPr>
-            <a:r>
-              <a:t>sorted()</a:t>
-            </a:r>
-            <a:r>
-              <a:rPr b="0">
+              </a:rPr>
+              <a:t>.keys()</a:t>
+            </a:r>
+            <a:r>
+              <a:t> </a:t>
+            </a:r>
+            <a:r>
+              <a:rPr>
                 <a:latin typeface="+mn-lt"/>
                 <a:ea typeface="+mn-ea"/>
                 <a:cs typeface="+mn-cs"/>
                 <a:sym typeface="Century Gothic"/>
               </a:rPr>
-              <a:t>is a built-in function that sorts a list.</a:t>
-            </a:r>
-          </a:p>
-        </p:txBody>
-      </p:sp>
-      <p:sp>
-        <p:nvSpPr>
-          <p:cNvPr id="435" name="dictionaries are unordered"/>
+              <a:t>will create a list of all of the keys in your dictionary.</a:t>
+            </a:r>
+            <a:endParaRPr>
+              <a:latin typeface="+mn-lt"/>
+              <a:ea typeface="+mn-ea"/>
+              <a:cs typeface="+mn-cs"/>
+              <a:sym typeface="Century Gothic"/>
+            </a:endParaRPr>
+          </a:p>
+          <a:p>
+            <a:pPr marL="0" indent="0">
+              <a:spcBef>
+                <a:spcPts val="600"/>
+              </a:spcBef>
+              <a:buSzTx/>
+              <a:buFontTx/>
+              <a:buNone/>
+            </a:pPr>
+          </a:p>
+          <a:p>
+            <a:pPr marL="0" indent="0">
+              <a:spcBef>
+                <a:spcPts val="600"/>
+              </a:spcBef>
+              <a:buSzTx/>
+              <a:buFontTx/>
+              <a:buNone/>
+            </a:pPr>
+          </a:p>
+          <a:p>
+            <a:pPr marL="0" indent="0">
+              <a:spcBef>
+                <a:spcPts val="600"/>
+              </a:spcBef>
+              <a:buSzTx/>
+              <a:buFontTx/>
+              <a:buNone/>
+            </a:pPr>
+            <a:r>
+              <a:t>If you have a list, you can loop over it!</a:t>
+            </a:r>
+          </a:p>
+        </p:txBody>
+      </p:sp>
+      <p:sp>
+        <p:nvSpPr>
+          <p:cNvPr id="434" name="we can loop over a list!"/>
           <p:cNvSpPr/>
           <p:nvPr/>
         </p:nvSpPr>
@@ -19141,14 +19173,14 @@
           <a:p>
             <a:pPr/>
             <a:r>
-              <a:t>dictionaries are unordered</a:t>
-            </a:r>
-          </a:p>
-        </p:txBody>
-      </p:sp>
-      <p:sp>
-        <p:nvSpPr>
-          <p:cNvPr id="436" name="Slide Number"/>
+              <a:t>we can loop over a list!</a:t>
+            </a:r>
+          </a:p>
+        </p:txBody>
+      </p:sp>
+      <p:sp>
+        <p:nvSpPr>
+          <p:cNvPr id="435" name="Slide Number"/>
           <p:cNvSpPr txBox="1"/>
           <p:nvPr>
             <p:ph type="sldNum" sz="quarter" idx="2"/>
@@ -19179,7 +19211,7 @@
       </p:sp>
       <p:pic>
         <p:nvPicPr>
-          <p:cNvPr id="437" name="contacts-10.png" descr="contacts-10.png"/>
+          <p:cNvPr id="436" name="contacts-7.png" descr="contacts-7.png"/>
           <p:cNvPicPr>
             <a:picLocks noChangeAspect="1"/>
           </p:cNvPicPr>
@@ -19195,8 +19227,37 @@
         </p:blipFill>
         <p:spPr>
           <a:xfrm>
-            <a:off x="889000" y="2965450"/>
-            <a:ext cx="7366000" cy="927100"/>
+            <a:off x="1117600" y="2561162"/>
+            <a:ext cx="6908800" cy="990601"/>
+          </a:xfrm>
+          <a:prstGeom prst="rect">
+            <a:avLst/>
+          </a:prstGeom>
+          <a:ln w="12700">
+            <a:miter lim="400000"/>
+          </a:ln>
+        </p:spPr>
+      </p:pic>
+      <p:pic>
+        <p:nvPicPr>
+          <p:cNvPr id="437" name="contacts-9.png" descr="contacts-9.png"/>
+          <p:cNvPicPr>
+            <a:picLocks noChangeAspect="1"/>
+          </p:cNvPicPr>
+          <p:nvPr/>
+        </p:nvPicPr>
+        <p:blipFill>
+          <a:blip r:embed="rId4">
+            <a:extLst/>
+          </a:blip>
+          <a:stretch>
+            <a:fillRect/>
+          </a:stretch>
+        </p:blipFill>
+        <p:spPr>
+          <a:xfrm>
+            <a:off x="-1" y="4382647"/>
+            <a:ext cx="9144001" cy="1204252"/>
           </a:xfrm>
           <a:prstGeom prst="rect">
             <a:avLst/>
@@ -19419,7 +19480,7 @@
       </p:grpSpPr>
       <p:sp>
         <p:nvSpPr>
-          <p:cNvPr id="441" name=".items() will create a list of all of the key/value pairs in your dictionary.…"/>
+          <p:cNvPr id="441" name="Dictionaries themselves have no ordering, but we can order their keys:…"/>
           <p:cNvSpPr txBox="1"/>
           <p:nvPr>
             <p:ph type="body" idx="1"/>
@@ -19443,122 +19504,113 @@
               <a:buSzTx/>
               <a:buFontTx/>
               <a:buNone/>
-              <a:defRPr sz="3008">
-                <a:latin typeface="Gill Sans Light"/>
-                <a:ea typeface="Gill Sans Light"/>
-                <a:cs typeface="Gill Sans Light"/>
-                <a:sym typeface="Gill Sans Light"/>
-              </a:defRPr>
-            </a:pPr>
-            <a:r>
-              <a:rPr b="1">
+              <a:defRPr sz="3008"/>
+            </a:pPr>
+            <a:r>
+              <a:rPr b="1"/>
+              <a:t>Dictionaries themselves have no ordering</a:t>
+            </a:r>
+            <a:r>
+              <a:t>, but we can order their keys:</a:t>
+            </a:r>
+          </a:p>
+          <a:p>
+            <a:pPr marL="0" indent="0" defTabSz="429768">
+              <a:spcBef>
+                <a:spcPts val="1100"/>
+              </a:spcBef>
+              <a:buSzTx/>
+              <a:buFontTx/>
+              <a:buNone/>
+              <a:defRPr b="1" sz="3008">
                 <a:latin typeface="Courier New"/>
                 <a:ea typeface="Courier New"/>
                 <a:cs typeface="Courier New"/>
                 <a:sym typeface="Courier New"/>
-              </a:rPr>
-              <a:t>.items()</a:t>
-            </a:r>
-            <a:r>
-              <a:t> will create a list of all of the key/value pairs in your dictionary.</a:t>
-            </a:r>
+              </a:defRPr>
+            </a:pPr>
           </a:p>
           <a:p>
             <a:pPr marL="0" indent="0" defTabSz="429768">
               <a:spcBef>
-                <a:spcPts val="600"/>
+                <a:spcPts val="1100"/>
               </a:spcBef>
               <a:buSzTx/>
               <a:buFontTx/>
               <a:buNone/>
-              <a:defRPr sz="3008">
-                <a:latin typeface="Gill Sans Light"/>
-                <a:ea typeface="Gill Sans Light"/>
-                <a:cs typeface="Gill Sans Light"/>
-                <a:sym typeface="Gill Sans Light"/>
-              </a:defRPr>
-            </a:pPr>
-          </a:p>
-          <a:p>
-            <a:pPr marL="0" indent="0" defTabSz="429768">
-              <a:spcBef>
-                <a:spcPts val="600"/>
-              </a:spcBef>
-              <a:buSzTx/>
-              <a:buFontTx/>
-              <a:buNone/>
-              <a:defRPr sz="3008">
-                <a:latin typeface="Gill Sans Light"/>
-                <a:ea typeface="Gill Sans Light"/>
-                <a:cs typeface="Gill Sans Light"/>
-                <a:sym typeface="Gill Sans Light"/>
-              </a:defRPr>
-            </a:pPr>
-          </a:p>
-          <a:p>
-            <a:pPr marL="0" indent="0" defTabSz="429768">
-              <a:spcBef>
-                <a:spcPts val="600"/>
-              </a:spcBef>
-              <a:buSzTx/>
-              <a:buFontTx/>
-              <a:buNone/>
-              <a:defRPr sz="3008">
-                <a:latin typeface="Gill Sans Light"/>
-                <a:ea typeface="Gill Sans Light"/>
-                <a:cs typeface="Gill Sans Light"/>
-                <a:sym typeface="Gill Sans Light"/>
-              </a:defRPr>
-            </a:pPr>
-          </a:p>
-          <a:p>
-            <a:pPr marL="0" indent="0" defTabSz="429768">
-              <a:spcBef>
-                <a:spcPts val="600"/>
-              </a:spcBef>
-              <a:buSzTx/>
-              <a:buFontTx/>
-              <a:buNone/>
-              <a:defRPr sz="3008">
-                <a:latin typeface="Gill Sans Light"/>
-                <a:ea typeface="Gill Sans Light"/>
-                <a:cs typeface="Gill Sans Light"/>
-                <a:sym typeface="Gill Sans Light"/>
-              </a:defRPr>
-            </a:pPr>
-            <a:r>
-              <a:t>As with </a:t>
-            </a:r>
-            <a:r>
-              <a:rPr b="1">
+              <a:defRPr b="1" sz="3008">
                 <a:latin typeface="Courier New"/>
                 <a:ea typeface="Courier New"/>
                 <a:cs typeface="Courier New"/>
                 <a:sym typeface="Courier New"/>
-              </a:rPr>
-              <a:t>.keys()</a:t>
-            </a:r>
-            <a:r>
-              <a:t>, if we have a list, we can loop over it.  </a:t>
-            </a:r>
-            <a:r>
-              <a:rPr b="1">
+              </a:defRPr>
+            </a:pPr>
+          </a:p>
+          <a:p>
+            <a:pPr marL="0" indent="0" defTabSz="429768">
+              <a:spcBef>
+                <a:spcPts val="1100"/>
+              </a:spcBef>
+              <a:buSzTx/>
+              <a:buFontTx/>
+              <a:buNone/>
+              <a:defRPr b="1" sz="3008">
                 <a:latin typeface="Courier New"/>
                 <a:ea typeface="Courier New"/>
                 <a:cs typeface="Courier New"/>
                 <a:sym typeface="Courier New"/>
+              </a:defRPr>
+            </a:pPr>
+          </a:p>
+          <a:p>
+            <a:pPr marL="0" indent="0" defTabSz="429768">
+              <a:spcBef>
+                <a:spcPts val="1100"/>
+              </a:spcBef>
+              <a:buSzTx/>
+              <a:buFontTx/>
+              <a:buNone/>
+              <a:defRPr b="1" sz="3008">
+                <a:latin typeface="Courier New"/>
+                <a:ea typeface="Courier New"/>
+                <a:cs typeface="Courier New"/>
+                <a:sym typeface="Courier New"/>
+              </a:defRPr>
+            </a:pPr>
+          </a:p>
+          <a:p>
+            <a:pPr marL="0" indent="0" defTabSz="429768">
+              <a:spcBef>
+                <a:spcPts val="1100"/>
+              </a:spcBef>
+              <a:buSzTx/>
+              <a:buFontTx/>
+              <a:buNone/>
+              <a:defRPr b="1" sz="3008">
+                <a:latin typeface="Courier New"/>
+                <a:ea typeface="Courier New"/>
+                <a:cs typeface="Courier New"/>
+                <a:sym typeface="Courier New"/>
+              </a:defRPr>
+            </a:pPr>
+            <a:r>
+              <a:t>sorted()</a:t>
+            </a:r>
+            <a:r>
+              <a:rPr b="0">
+                <a:latin typeface="+mn-lt"/>
+                <a:ea typeface="+mn-ea"/>
+                <a:cs typeface="+mn-cs"/>
+                <a:sym typeface="Century Gothic"/>
               </a:rPr>
-              <a:t>.items()</a:t>
-            </a:r>
-            <a:r>
-              <a:t> gives us a list of lists!</a:t>
-            </a:r>
-          </a:p>
-        </p:txBody>
-      </p:sp>
-      <p:sp>
-        <p:nvSpPr>
-          <p:cNvPr id="442" name=".items( ) creates a list of key/value pairs"/>
+              <a:t>is a built-in function that sorts a list.</a:t>
+            </a:r>
+          </a:p>
+        </p:txBody>
+      </p:sp>
+      <p:sp>
+        <p:nvSpPr>
+          <p:cNvPr id="442" name="dictionaries are unordered"/>
           <p:cNvSpPr/>
           <p:nvPr/>
         </p:nvSpPr>
@@ -19589,11 +19641,11 @@
             <a:normAutofit fontScale="100000" lnSpcReduction="0"/>
           </a:bodyPr>
           <a:lstStyle>
-            <a:lvl1pPr defTabSz="361188">
-              <a:spcBef>
-                <a:spcPts val="700"/>
-              </a:spcBef>
-              <a:defRPr cap="all" sz="3160">
+            <a:lvl1pPr>
+              <a:spcBef>
+                <a:spcPts val="900"/>
+              </a:spcBef>
+              <a:defRPr cap="all" sz="4000">
                 <a:latin typeface="+mn-lt"/>
                 <a:ea typeface="+mn-ea"/>
                 <a:cs typeface="+mn-cs"/>
@@ -19604,7 +19656,7 @@
           <a:p>
             <a:pPr/>
             <a:r>
-              <a:t>.items( ) creates a list of key/value pairs</a:t>
+              <a:t>dictionaries are unordered</a:t>
             </a:r>
           </a:p>
         </p:txBody>
@@ -19642,7 +19694,7 @@
       </p:sp>
       <p:pic>
         <p:nvPicPr>
-          <p:cNvPr id="444" name="contacts-11.png" descr="contacts-11.png"/>
+          <p:cNvPr id="444" name="contacts-10.png" descr="contacts-10.png"/>
           <p:cNvPicPr>
             <a:picLocks noChangeAspect="1"/>
           </p:cNvPicPr>
@@ -19658,8 +19710,8 @@
         </p:blipFill>
         <p:spPr>
           <a:xfrm>
-            <a:off x="-1" y="2651472"/>
-            <a:ext cx="9144001" cy="1145809"/>
+            <a:off x="889000" y="2965450"/>
+            <a:ext cx="7366000" cy="927100"/>
           </a:xfrm>
           <a:prstGeom prst="rect">
             <a:avLst/>
@@ -19697,7 +19749,7 @@
       </p:grpSpPr>
       <p:sp>
         <p:nvSpPr>
-          <p:cNvPr id="448" name=".items() will create a list of all of the key/value pairs in your dictionary."/>
+          <p:cNvPr id="448" name=".items() will create a list of all of the key/value pairs in your dictionary.…"/>
           <p:cNvSpPr txBox="1"/>
           <p:nvPr>
             <p:ph type="body" idx="1"/>
@@ -19738,23 +19790,8 @@
               <a:t>.items()</a:t>
             </a:r>
             <a:r>
-              <a:t> </a:t>
-            </a:r>
-            <a:r>
-              <a:rPr>
-                <a:latin typeface="+mn-lt"/>
-                <a:ea typeface="+mn-ea"/>
-                <a:cs typeface="+mn-cs"/>
-                <a:sym typeface="Century Gothic"/>
-              </a:rPr>
-              <a:t>will create a list of all of the key/value pairs in your dictionary.</a:t>
-            </a:r>
-            <a:endParaRPr>
-              <a:latin typeface="+mn-lt"/>
-              <a:ea typeface="+mn-ea"/>
-              <a:cs typeface="+mn-cs"/>
-              <a:sym typeface="Century Gothic"/>
-            </a:endParaRPr>
+              <a:t> will create a list of all of the key/value pairs in your dictionary.</a:t>
+            </a:r>
           </a:p>
           <a:p>
             <a:pPr marL="0" indent="0" defTabSz="429768">
@@ -19764,7 +19801,12 @@
               <a:buSzTx/>
               <a:buFontTx/>
               <a:buNone/>
-              <a:defRPr sz="3008"/>
+              <a:defRPr sz="3008">
+                <a:latin typeface="Gill Sans Light"/>
+                <a:ea typeface="Gill Sans Light"/>
+                <a:cs typeface="Gill Sans Light"/>
+                <a:sym typeface="Gill Sans Light"/>
+              </a:defRPr>
             </a:pPr>
           </a:p>
           <a:p>
@@ -19775,7 +19817,12 @@
               <a:buSzTx/>
               <a:buFontTx/>
               <a:buNone/>
-              <a:defRPr sz="3008"/>
+              <a:defRPr sz="3008">
+                <a:latin typeface="Gill Sans Light"/>
+                <a:ea typeface="Gill Sans Light"/>
+                <a:cs typeface="Gill Sans Light"/>
+                <a:sym typeface="Gill Sans Light"/>
+              </a:defRPr>
             </a:pPr>
           </a:p>
           <a:p>
@@ -19786,7 +19833,12 @@
               <a:buSzTx/>
               <a:buFontTx/>
               <a:buNone/>
-              <a:defRPr sz="3008"/>
+              <a:defRPr sz="3008">
+                <a:latin typeface="Gill Sans Light"/>
+                <a:ea typeface="Gill Sans Light"/>
+                <a:cs typeface="Gill Sans Light"/>
+                <a:sym typeface="Gill Sans Light"/>
+              </a:defRPr>
             </a:pPr>
           </a:p>
           <a:p>
@@ -19797,25 +19849,46 @@
               <a:buSzTx/>
               <a:buFontTx/>
               <a:buNone/>
-              <a:defRPr sz="3008"/>
-            </a:pPr>
-          </a:p>
-          <a:p>
-            <a:pPr marL="0" indent="0" defTabSz="429768">
-              <a:spcBef>
-                <a:spcPts val="600"/>
-              </a:spcBef>
-              <a:buSzTx/>
-              <a:buFontTx/>
-              <a:buNone/>
-              <a:defRPr sz="3008"/>
-            </a:pPr>
-          </a:p>
-        </p:txBody>
-      </p:sp>
-      <p:sp>
-        <p:nvSpPr>
-          <p:cNvPr id="449" name=".items( ) creates a nested list"/>
+              <a:defRPr sz="3008">
+                <a:latin typeface="Gill Sans Light"/>
+                <a:ea typeface="Gill Sans Light"/>
+                <a:cs typeface="Gill Sans Light"/>
+                <a:sym typeface="Gill Sans Light"/>
+              </a:defRPr>
+            </a:pPr>
+            <a:r>
+              <a:t>As with </a:t>
+            </a:r>
+            <a:r>
+              <a:rPr b="1">
+                <a:latin typeface="Courier New"/>
+                <a:ea typeface="Courier New"/>
+                <a:cs typeface="Courier New"/>
+                <a:sym typeface="Courier New"/>
+              </a:rPr>
+              <a:t>.keys()</a:t>
+            </a:r>
+            <a:r>
+              <a:t>, if we have a list, we can loop over it.  </a:t>
+            </a:r>
+            <a:r>
+              <a:rPr b="1">
+                <a:latin typeface="Courier New"/>
+                <a:ea typeface="Courier New"/>
+                <a:cs typeface="Courier New"/>
+                <a:sym typeface="Courier New"/>
+              </a:rPr>
+              <a:t>.items()</a:t>
+            </a:r>
+            <a:r>
+              <a:t> gives us a list of lists!</a:t>
+            </a:r>
+          </a:p>
+        </p:txBody>
+      </p:sp>
+      <p:sp>
+        <p:nvSpPr>
+          <p:cNvPr id="449" name=".items( ) creates a list of key/value pairs"/>
           <p:cNvSpPr/>
           <p:nvPr/>
         </p:nvSpPr>
@@ -19846,11 +19919,11 @@
             <a:normAutofit fontScale="100000" lnSpcReduction="0"/>
           </a:bodyPr>
           <a:lstStyle>
-            <a:lvl1pPr>
-              <a:spcBef>
-                <a:spcPts val="900"/>
-              </a:spcBef>
-              <a:defRPr cap="all" sz="4000">
+            <a:lvl1pPr defTabSz="361188">
+              <a:spcBef>
+                <a:spcPts val="700"/>
+              </a:spcBef>
+              <a:defRPr cap="all" sz="3160">
                 <a:latin typeface="+mn-lt"/>
                 <a:ea typeface="+mn-ea"/>
                 <a:cs typeface="+mn-cs"/>
@@ -19861,7 +19934,7 @@
           <a:p>
             <a:pPr/>
             <a:r>
-              <a:t>.items( ) creates a nested list</a:t>
+              <a:t>.items( ) creates a list of key/value pairs</a:t>
             </a:r>
           </a:p>
         </p:txBody>
@@ -19899,7 +19972,7 @@
       </p:sp>
       <p:pic>
         <p:nvPicPr>
-          <p:cNvPr id="451" name="contacts-12.png" descr="contacts-12.png"/>
+          <p:cNvPr id="451" name="contacts-11.png" descr="contacts-11.png"/>
           <p:cNvPicPr>
             <a:picLocks noChangeAspect="1"/>
           </p:cNvPicPr>
@@ -19915,8 +19988,8 @@
         </p:blipFill>
         <p:spPr>
           <a:xfrm>
-            <a:off x="-1" y="3112449"/>
-            <a:ext cx="9144001" cy="1726835"/>
+            <a:off x="-1" y="2651472"/>
+            <a:ext cx="9144001" cy="1145809"/>
           </a:xfrm>
           <a:prstGeom prst="rect">
             <a:avLst/>
@@ -20156,7 +20229,7 @@
       </p:sp>
       <p:pic>
         <p:nvPicPr>
-          <p:cNvPr id="458" name="contacts-13.png" descr="contacts-13.png"/>
+          <p:cNvPr id="458" name="contacts-12.png" descr="contacts-12.png"/>
           <p:cNvPicPr>
             <a:picLocks noChangeAspect="1"/>
           </p:cNvPicPr>
@@ -20172,8 +20245,8 @@
         </p:blipFill>
         <p:spPr>
           <a:xfrm>
-            <a:off x="-1" y="3115635"/>
-            <a:ext cx="9144001" cy="1690902"/>
+            <a:off x="-1" y="3112449"/>
+            <a:ext cx="9144001" cy="1726835"/>
           </a:xfrm>
           <a:prstGeom prst="rect">
             <a:avLst/>
@@ -20211,7 +20284,7 @@
       </p:grpSpPr>
       <p:sp>
         <p:nvSpPr>
-          <p:cNvPr id="462" name="Loop through the contacts dictionary to display everyone's contact information, like this:"/>
+          <p:cNvPr id="462" name=".items() will create a list of all of the key/value pairs in your dictionary."/>
           <p:cNvSpPr txBox="1"/>
           <p:nvPr>
             <p:ph type="body" idx="1"/>
@@ -20228,63 +20301,108 @@
           </a:bodyPr>
           <a:lstStyle/>
           <a:p>
-            <a:pPr marL="0" indent="0">
+            <a:pPr marL="0" indent="0" defTabSz="429768">
               <a:spcBef>
                 <a:spcPts val="600"/>
               </a:spcBef>
               <a:buSzTx/>
               <a:buFontTx/>
               <a:buNone/>
-            </a:pPr>
-            <a:r>
-              <a:t>Loop through the </a:t>
-            </a:r>
-            <a:r>
-              <a:rPr b="1"/>
-              <a:t>contacts</a:t>
-            </a:r>
-            <a:r>
-              <a:t> dictionary to display everyone's contact information, like this:</a:t>
-            </a:r>
-          </a:p>
-          <a:p>
-            <a:pPr marL="0" indent="0">
-              <a:spcBef>
-                <a:spcPts val="1200"/>
-              </a:spcBef>
-              <a:buSzTx/>
-              <a:buFontTx/>
-              <a:buNone/>
-              <a:defRPr b="1">
+              <a:defRPr sz="3008">
+                <a:latin typeface="Gill Sans Light"/>
+                <a:ea typeface="Gill Sans Light"/>
+                <a:cs typeface="Gill Sans Light"/>
+                <a:sym typeface="Gill Sans Light"/>
+              </a:defRPr>
+            </a:pPr>
+            <a:r>
+              <a:rPr b="1">
                 <a:latin typeface="Courier New"/>
                 <a:ea typeface="Courier New"/>
                 <a:cs typeface="Courier New"/>
                 <a:sym typeface="Courier New"/>
-              </a:defRPr>
-            </a:pPr>
-          </a:p>
-          <a:p>
-            <a:pPr marL="0" indent="0">
-              <a:spcBef>
-                <a:spcPts val="1200"/>
+              </a:rPr>
+              <a:t>.items()</a:t>
+            </a:r>
+            <a:r>
+              <a:t> </a:t>
+            </a:r>
+            <a:r>
+              <a:rPr>
+                <a:latin typeface="+mn-lt"/>
+                <a:ea typeface="+mn-ea"/>
+                <a:cs typeface="+mn-cs"/>
+                <a:sym typeface="Century Gothic"/>
+              </a:rPr>
+              <a:t>will create a list of all of the key/value pairs in your dictionary.</a:t>
+            </a:r>
+            <a:endParaRPr>
+              <a:latin typeface="+mn-lt"/>
+              <a:ea typeface="+mn-ea"/>
+              <a:cs typeface="+mn-cs"/>
+              <a:sym typeface="Century Gothic"/>
+            </a:endParaRPr>
+          </a:p>
+          <a:p>
+            <a:pPr marL="0" indent="0" defTabSz="429768">
+              <a:spcBef>
+                <a:spcPts val="600"/>
               </a:spcBef>
               <a:buSzTx/>
               <a:buFontTx/>
               <a:buNone/>
-              <a:defRPr b="1">
-                <a:latin typeface="Courier New"/>
-                <a:ea typeface="Courier New"/>
-                <a:cs typeface="Courier New"/>
-                <a:sym typeface="Courier New"/>
-              </a:defRPr>
-            </a:pPr>
-            <a:br/>
-          </a:p>
-        </p:txBody>
-      </p:sp>
-      <p:sp>
-        <p:nvSpPr>
-          <p:cNvPr id="463" name="Exercise: part 2"/>
+              <a:defRPr sz="3008"/>
+            </a:pPr>
+          </a:p>
+          <a:p>
+            <a:pPr marL="0" indent="0" defTabSz="429768">
+              <a:spcBef>
+                <a:spcPts val="600"/>
+              </a:spcBef>
+              <a:buSzTx/>
+              <a:buFontTx/>
+              <a:buNone/>
+              <a:defRPr sz="3008"/>
+            </a:pPr>
+          </a:p>
+          <a:p>
+            <a:pPr marL="0" indent="0" defTabSz="429768">
+              <a:spcBef>
+                <a:spcPts val="600"/>
+              </a:spcBef>
+              <a:buSzTx/>
+              <a:buFontTx/>
+              <a:buNone/>
+              <a:defRPr sz="3008"/>
+            </a:pPr>
+          </a:p>
+          <a:p>
+            <a:pPr marL="0" indent="0" defTabSz="429768">
+              <a:spcBef>
+                <a:spcPts val="600"/>
+              </a:spcBef>
+              <a:buSzTx/>
+              <a:buFontTx/>
+              <a:buNone/>
+              <a:defRPr sz="3008"/>
+            </a:pPr>
+          </a:p>
+          <a:p>
+            <a:pPr marL="0" indent="0" defTabSz="429768">
+              <a:spcBef>
+                <a:spcPts val="600"/>
+              </a:spcBef>
+              <a:buSzTx/>
+              <a:buFontTx/>
+              <a:buNone/>
+              <a:defRPr sz="3008"/>
+            </a:pPr>
+          </a:p>
+        </p:txBody>
+      </p:sp>
+      <p:sp>
+        <p:nvSpPr>
+          <p:cNvPr id="463" name=".items( ) creates a nested list"/>
           <p:cNvSpPr/>
           <p:nvPr/>
         </p:nvSpPr>
@@ -20330,7 +20448,7 @@
           <a:p>
             <a:pPr/>
             <a:r>
-              <a:t>Exercise: part 2</a:t>
+              <a:t>.items( ) creates a nested list</a:t>
             </a:r>
           </a:p>
         </p:txBody>
@@ -20368,7 +20486,7 @@
       </p:sp>
       <p:pic>
         <p:nvPicPr>
-          <p:cNvPr id="465" name="conatcts-14.png" descr="conatcts-14.png"/>
+          <p:cNvPr id="465" name="contacts-13.png" descr="contacts-13.png"/>
           <p:cNvPicPr>
             <a:picLocks noChangeAspect="1"/>
           </p:cNvPicPr>
@@ -20384,8 +20502,8 @@
         </p:blipFill>
         <p:spPr>
           <a:xfrm>
-            <a:off x="133350" y="3143031"/>
-            <a:ext cx="8877300" cy="2463801"/>
+            <a:off x="-1" y="3115635"/>
+            <a:ext cx="9144001" cy="1690902"/>
           </a:xfrm>
           <a:prstGeom prst="rect">
             <a:avLst/>
@@ -20423,7 +20541,7 @@
       </p:grpSpPr>
       <p:sp>
         <p:nvSpPr>
-          <p:cNvPr id="469" name="Check out the Hear Me Code slides repo for practical examples, code samples, and more!…"/>
+          <p:cNvPr id="469" name="Loop through the contacts dictionary to display everyone's contact information, like this:"/>
           <p:cNvSpPr txBox="1"/>
           <p:nvPr>
             <p:ph type="body" idx="1"/>
@@ -20447,123 +20565,56 @@
               <a:buSzTx/>
               <a:buFontTx/>
               <a:buNone/>
-              <a:defRPr sz="2800"/>
-            </a:pPr>
-            <a:r>
-              <a:t>Check out the </a:t>
-            </a:r>
-            <a:r>
-              <a:rPr b="1" u="sng">
-                <a:solidFill>
-                  <a:srgbClr val="0000FF"/>
-                </a:solidFill>
-                <a:uFill>
-                  <a:solidFill>
-                    <a:srgbClr val="0000FF"/>
-                  </a:solidFill>
-                </a:uFill>
-                <a:hlinkClick r:id="rId2" invalidUrl="" action="" tgtFrame="" tooltip="" history="1" highlightClick="0" endSnd="0"/>
-              </a:rPr>
-              <a:t>Hear Me Code slides</a:t>
-            </a:r>
-            <a:r>
-              <a:t> repo for practical examples, code samples, and more!</a:t>
+            </a:pPr>
+            <a:r>
+              <a:t>Loop through the </a:t>
+            </a:r>
+            <a:r>
+              <a:rPr b="1"/>
+              <a:t>contacts</a:t>
+            </a:r>
+            <a:r>
+              <a:t> dictionary to display everyone's contact information, like this:</a:t>
             </a:r>
           </a:p>
           <a:p>
             <a:pPr marL="0" indent="0">
               <a:spcBef>
-                <a:spcPts val="600"/>
+                <a:spcPts val="1200"/>
               </a:spcBef>
               <a:buSzTx/>
               <a:buFontTx/>
               <a:buNone/>
-              <a:defRPr b="1" sz="2800"/>
-            </a:pPr>
-          </a:p>
-          <a:p>
-            <a:pPr lvl="1" marL="661736" indent="-280736">
-              <a:spcBef>
-                <a:spcPts val="600"/>
-              </a:spcBef>
-              <a:buChar char="•"/>
-              <a:defRPr sz="2800"/>
-            </a:pPr>
-            <a:r>
-              <a:t>Beginner: </a:t>
-            </a:r>
-            <a:r>
-              <a:rPr u="sng">
-                <a:solidFill>
-                  <a:srgbClr val="0000FF"/>
-                </a:solidFill>
-                <a:uFill>
-                  <a:solidFill>
-                    <a:srgbClr val="0000FF"/>
-                  </a:solidFill>
-                </a:uFill>
-                <a:hlinkClick r:id="rId3" invalidUrl="" action="" tgtFrame="" tooltip="" history="1" highlightClick="0" endSnd="0"/>
-              </a:rPr>
-              <a:t>US States tables</a:t>
-            </a:r>
-          </a:p>
-          <a:p>
-            <a:pPr lvl="1" marL="661736" indent="-280736">
-              <a:spcBef>
-                <a:spcPts val="600"/>
-              </a:spcBef>
-              <a:buChar char="•"/>
-              <a:defRPr sz="2800"/>
-            </a:pPr>
-            <a:r>
-              <a:t>Beginner: </a:t>
-            </a:r>
-            <a:r>
-              <a:rPr u="sng">
-                <a:solidFill>
-                  <a:srgbClr val="0000FF"/>
-                </a:solidFill>
-                <a:uFill>
-                  <a:solidFill>
-                    <a:srgbClr val="0000FF"/>
-                  </a:solidFill>
-                </a:uFill>
-                <a:hlinkClick r:id="rId4" invalidUrl="" action="" tgtFrame="" tooltip="" history="1" highlightClick="0" endSnd="0"/>
-              </a:rPr>
-              <a:t>Contacts list</a:t>
-            </a:r>
-          </a:p>
-          <a:p>
-            <a:pPr lvl="1" marL="661736" indent="-280736">
-              <a:spcBef>
-                <a:spcPts val="600"/>
-              </a:spcBef>
-              <a:buChar char="•"/>
-              <a:defRPr sz="2800"/>
-            </a:pPr>
-            <a:r>
-              <a:t>Advanced: </a:t>
-            </a:r>
-            <a:r>
-              <a:rPr u="sng">
-                <a:solidFill>
-                  <a:srgbClr val="0000FF"/>
-                </a:solidFill>
-                <a:uFill>
-                  <a:solidFill>
-                    <a:srgbClr val="0000FF"/>
-                  </a:solidFill>
-                </a:uFill>
-                <a:hlinkClick r:id="rId5" invalidUrl="" action="" tgtFrame="" tooltip="" history="1" highlightClick="0" endSnd="0"/>
-              </a:rPr>
-              <a:t>Comparing two CSVs</a:t>
-            </a:r>
-          </a:p>
-        </p:txBody>
-      </p:sp>
-      <p:sp>
-        <p:nvSpPr>
-          <p:cNvPr id="470" name="playtime!"/>
+              <a:defRPr b="1">
+                <a:latin typeface="Courier New"/>
+                <a:ea typeface="Courier New"/>
+                <a:cs typeface="Courier New"/>
+                <a:sym typeface="Courier New"/>
+              </a:defRPr>
+            </a:pPr>
+          </a:p>
+          <a:p>
+            <a:pPr marL="0" indent="0">
+              <a:spcBef>
+                <a:spcPts val="1200"/>
+              </a:spcBef>
+              <a:buSzTx/>
+              <a:buFontTx/>
+              <a:buNone/>
+              <a:defRPr b="1">
+                <a:latin typeface="Courier New"/>
+                <a:ea typeface="Courier New"/>
+                <a:cs typeface="Courier New"/>
+                <a:sym typeface="Courier New"/>
+              </a:defRPr>
+            </a:pPr>
+            <a:br/>
+          </a:p>
+        </p:txBody>
+      </p:sp>
+      <p:sp>
+        <p:nvSpPr>
+          <p:cNvPr id="470" name="Exercise: part 2"/>
           <p:cNvSpPr/>
           <p:nvPr/>
         </p:nvSpPr>
@@ -20609,7 +20660,7 @@
           <a:p>
             <a:pPr/>
             <a:r>
-              <a:t>playtime!</a:t>
+              <a:t>Exercise: part 2</a:t>
             </a:r>
           </a:p>
         </p:txBody>
@@ -20645,6 +20696,35 @@
           </a:p>
         </p:txBody>
       </p:sp>
+      <p:pic>
+        <p:nvPicPr>
+          <p:cNvPr id="472" name="conatcts-14.png" descr="conatcts-14.png"/>
+          <p:cNvPicPr>
+            <a:picLocks noChangeAspect="1"/>
+          </p:cNvPicPr>
+          <p:nvPr/>
+        </p:nvPicPr>
+        <p:blipFill>
+          <a:blip r:embed="rId3">
+            <a:extLst/>
+          </a:blip>
+          <a:stretch>
+            <a:fillRect/>
+          </a:stretch>
+        </p:blipFill>
+        <p:spPr>
+          <a:xfrm>
+            <a:off x="133350" y="3143031"/>
+            <a:ext cx="8877300" cy="2463801"/>
+          </a:xfrm>
+          <a:prstGeom prst="rect">
+            <a:avLst/>
+          </a:prstGeom>
+          <a:ln w="12700">
+            <a:miter lim="400000"/>
+          </a:ln>
+        </p:spPr>
+      </p:pic>
     </p:spTree>
   </p:cSld>
   <p:clrMapOvr>
@@ -20673,7 +20753,7 @@
       </p:grpSpPr>
       <p:sp>
         <p:nvSpPr>
-          <p:cNvPr id="473" name="Lessons 4 &amp; 5…"/>
+          <p:cNvPr id="476" name="Check out the Hear Me Code slides repo for practical examples, code samples, and more!…"/>
           <p:cNvSpPr txBox="1"/>
           <p:nvPr>
             <p:ph type="body" idx="1"/>
@@ -20690,15 +20770,58 @@
           </a:bodyPr>
           <a:lstStyle/>
           <a:p>
-            <a:pPr marL="332613" indent="-332613" defTabSz="443484">
-              <a:spcBef>
-                <a:spcPts val="1100"/>
-              </a:spcBef>
-              <a:buClr>
-                <a:srgbClr val="000000"/>
-              </a:buClr>
-              <a:defRPr sz="3104"/>
-            </a:pPr>
+            <a:pPr marL="0" indent="0">
+              <a:spcBef>
+                <a:spcPts val="600"/>
+              </a:spcBef>
+              <a:buSzTx/>
+              <a:buFontTx/>
+              <a:buNone/>
+              <a:defRPr sz="2800"/>
+            </a:pPr>
+            <a:r>
+              <a:t>Check out the </a:t>
+            </a:r>
+            <a:r>
+              <a:rPr b="1" u="sng">
+                <a:solidFill>
+                  <a:srgbClr val="0000FF"/>
+                </a:solidFill>
+                <a:uFill>
+                  <a:solidFill>
+                    <a:srgbClr val="0000FF"/>
+                  </a:solidFill>
+                </a:uFill>
+                <a:hlinkClick r:id="rId2" invalidUrl="" action="" tgtFrame="" tooltip="" history="1" highlightClick="0" endSnd="0"/>
+              </a:rPr>
+              <a:t>Hear Me Code slides</a:t>
+            </a:r>
+            <a:r>
+              <a:t> repo for practical examples, code samples, and more!</a:t>
+            </a:r>
+          </a:p>
+          <a:p>
+            <a:pPr marL="0" indent="0">
+              <a:spcBef>
+                <a:spcPts val="600"/>
+              </a:spcBef>
+              <a:buSzTx/>
+              <a:buFontTx/>
+              <a:buNone/>
+              <a:defRPr b="1" sz="2800"/>
+            </a:pPr>
+          </a:p>
+          <a:p>
+            <a:pPr lvl="1" marL="661736" indent="-280736">
+              <a:spcBef>
+                <a:spcPts val="600"/>
+              </a:spcBef>
+              <a:buChar char="•"/>
+              <a:defRPr sz="2800"/>
+            </a:pPr>
+            <a:r>
+              <a:t>Beginner: </a:t>
+            </a:r>
             <a:r>
               <a:rPr u="sng">
                 <a:solidFill>
@@ -20711,89 +20834,66 @@
                 </a:uFill>
                 <a:hlinkClick r:id="rId3" invalidUrl="" action="" tgtFrame="" tooltip="" history="1" highlightClick="0" endSnd="0"/>
               </a:rPr>
-              <a:t>Lessons 4 &amp; 5</a:t>
-            </a:r>
-          </a:p>
-          <a:p>
-            <a:pPr marL="332613" indent="-332613" defTabSz="443484">
-              <a:spcBef>
-                <a:spcPts val="1100"/>
-              </a:spcBef>
-              <a:buClr>
-                <a:srgbClr val="000000"/>
-              </a:buClr>
-              <a:defRPr sz="3104"/>
-            </a:pPr>
-          </a:p>
-          <a:p>
-            <a:pPr marL="332613" indent="-332613" defTabSz="443484">
-              <a:spcBef>
-                <a:spcPts val="1100"/>
-              </a:spcBef>
-              <a:buClr>
-                <a:srgbClr val="000000"/>
-              </a:buClr>
-              <a:defRPr sz="3104"/>
-            </a:pPr>
-            <a:r>
-              <a:t>Organize a study group on the listserv</a:t>
-            </a:r>
-          </a:p>
-          <a:p>
-            <a:pPr marL="332613" indent="-332613" defTabSz="443484">
-              <a:spcBef>
-                <a:spcPts val="1100"/>
-              </a:spcBef>
-              <a:buClr>
-                <a:srgbClr val="000000"/>
-              </a:buClr>
-              <a:defRPr sz="3104"/>
-            </a:pPr>
-          </a:p>
-          <a:p>
-            <a:pPr marL="332613" indent="-332613" defTabSz="443484">
-              <a:spcBef>
-                <a:spcPts val="1100"/>
-              </a:spcBef>
-              <a:buClr>
-                <a:srgbClr val="000000"/>
-              </a:buClr>
-              <a:defRPr sz="3104"/>
-            </a:pPr>
-            <a:r>
-              <a:t>Come be a teaching assistant</a:t>
-            </a:r>
-          </a:p>
-          <a:p>
-            <a:pPr marL="332613" indent="-332613" defTabSz="443484">
-              <a:spcBef>
-                <a:spcPts val="1100"/>
-              </a:spcBef>
-              <a:buClr>
-                <a:srgbClr val="000000"/>
-              </a:buClr>
-              <a:defRPr sz="3104"/>
-            </a:pPr>
-          </a:p>
-          <a:p>
-            <a:pPr marL="332613" indent="-332613" defTabSz="443484">
-              <a:spcBef>
-                <a:spcPts val="1100"/>
-              </a:spcBef>
-              <a:buClr>
-                <a:srgbClr val="000000"/>
-              </a:buClr>
-              <a:defRPr sz="3104"/>
-            </a:pPr>
-            <a:r>
-              <a:t>Practice, practice, practice</a:t>
-            </a:r>
-          </a:p>
-        </p:txBody>
-      </p:sp>
-      <p:sp>
-        <p:nvSpPr>
-          <p:cNvPr id="474" name="What now?"/>
+              <a:t>US States tables</a:t>
+            </a:r>
+          </a:p>
+          <a:p>
+            <a:pPr lvl="1" marL="661736" indent="-280736">
+              <a:spcBef>
+                <a:spcPts val="600"/>
+              </a:spcBef>
+              <a:buChar char="•"/>
+              <a:defRPr sz="2800"/>
+            </a:pPr>
+            <a:r>
+              <a:t>Beginner: </a:t>
+            </a:r>
+            <a:r>
+              <a:rPr u="sng">
+                <a:solidFill>
+                  <a:srgbClr val="0000FF"/>
+                </a:solidFill>
+                <a:uFill>
+                  <a:solidFill>
+                    <a:srgbClr val="0000FF"/>
+                  </a:solidFill>
+                </a:uFill>
+                <a:hlinkClick r:id="rId4" invalidUrl="" action="" tgtFrame="" tooltip="" history="1" highlightClick="0" endSnd="0"/>
+              </a:rPr>
+              <a:t>Contacts list</a:t>
+            </a:r>
+          </a:p>
+          <a:p>
+            <a:pPr lvl="1" marL="661736" indent="-280736">
+              <a:spcBef>
+                <a:spcPts val="600"/>
+              </a:spcBef>
+              <a:buChar char="•"/>
+              <a:defRPr sz="2800"/>
+            </a:pPr>
+            <a:r>
+              <a:t>Advanced: </a:t>
+            </a:r>
+            <a:r>
+              <a:rPr u="sng">
+                <a:solidFill>
+                  <a:srgbClr val="0000FF"/>
+                </a:solidFill>
+                <a:uFill>
+                  <a:solidFill>
+                    <a:srgbClr val="0000FF"/>
+                  </a:solidFill>
+                </a:uFill>
+                <a:hlinkClick r:id="rId5" invalidUrl="" action="" tgtFrame="" tooltip="" history="1" highlightClick="0" endSnd="0"/>
+              </a:rPr>
+              <a:t>Comparing two CSVs</a:t>
+            </a:r>
+          </a:p>
+        </p:txBody>
+      </p:sp>
+      <p:sp>
+        <p:nvSpPr>
+          <p:cNvPr id="477" name="playtime!"/>
           <p:cNvSpPr/>
           <p:nvPr/>
         </p:nvSpPr>
@@ -20839,6 +20939,236 @@
           <a:p>
             <a:pPr/>
             <a:r>
+              <a:t>playtime!</a:t>
+            </a:r>
+          </a:p>
+        </p:txBody>
+      </p:sp>
+      <p:sp>
+        <p:nvSpPr>
+          <p:cNvPr id="478" name="Slide Number"/>
+          <p:cNvSpPr txBox="1"/>
+          <p:nvPr>
+            <p:ph type="sldNum" sz="quarter" idx="2"/>
+          </p:nvPr>
+        </p:nvSpPr>
+        <p:spPr>
+          <a:xfrm>
+            <a:off x="5638800" y="6419053"/>
+            <a:ext cx="2133600" cy="368301"/>
+          </a:xfrm>
+          <a:prstGeom prst="rect">
+            <a:avLst/>
+          </a:prstGeom>
+          <a:extLst>
+            <a:ext uri="{C572A759-6A51-4108-AA02-DFA0A04FC94B}">
+              <ma14:wrappingTextBoxFlag xmlns:ma14="http://schemas.microsoft.com/office/mac/drawingml/2011/main" val="1"/>
+            </a:ext>
+          </a:extLst>
+        </p:spPr>
+        <p:txBody>
+          <a:bodyPr/>
+          <a:lstStyle/>
+          <a:p>
+            <a:pPr/>
+            <a:fld id="{86CB4B4D-7CA3-9044-876B-883B54F8677D}" type="slidenum"/>
+          </a:p>
+        </p:txBody>
+      </p:sp>
+    </p:spTree>
+  </p:cSld>
+  <p:clrMapOvr>
+    <a:masterClrMapping/>
+  </p:clrMapOvr>
+  <p:transition xmlns:p14="http://schemas.microsoft.com/office/powerpoint/2010/main" spd="med" advClick="1"/>
+</p:sld>
+</file>
+
+<file path=ppt/slides/slide66.xml><?xml version="1.0" encoding="utf-8"?>
+<p:sld xmlns:a="http://schemas.openxmlformats.org/drawingml/2006/main" xmlns:r="http://schemas.openxmlformats.org/officeDocument/2006/relationships" xmlns:p="http://schemas.openxmlformats.org/presentationml/2006/main" showMasterSp="1" showMasterPhAnim="1">
+  <p:cSld>
+    <p:spTree>
+      <p:nvGrpSpPr>
+        <p:cNvPr id="1" name=""/>
+        <p:cNvGrpSpPr/>
+        <p:nvPr/>
+      </p:nvGrpSpPr>
+      <p:grpSpPr>
+        <a:xfrm>
+          <a:off x="0" y="0"/>
+          <a:ext cx="0" cy="0"/>
+          <a:chOff x="0" y="0"/>
+          <a:chExt cx="0" cy="0"/>
+        </a:xfrm>
+      </p:grpSpPr>
+      <p:sp>
+        <p:nvSpPr>
+          <p:cNvPr id="480" name="Lessons 4 &amp; 5…"/>
+          <p:cNvSpPr txBox="1"/>
+          <p:nvPr>
+            <p:ph type="body" idx="1"/>
+          </p:nvPr>
+        </p:nvSpPr>
+        <p:spPr>
+          <a:prstGeom prst="rect">
+            <a:avLst/>
+          </a:prstGeom>
+        </p:spPr>
+        <p:txBody>
+          <a:bodyPr>
+            <a:normAutofit fontScale="100000" lnSpcReduction="0"/>
+          </a:bodyPr>
+          <a:lstStyle/>
+          <a:p>
+            <a:pPr marL="332613" indent="-332613" defTabSz="443484">
+              <a:spcBef>
+                <a:spcPts val="1100"/>
+              </a:spcBef>
+              <a:buClr>
+                <a:srgbClr val="000000"/>
+              </a:buClr>
+              <a:defRPr sz="3104"/>
+            </a:pPr>
+            <a:r>
+              <a:rPr u="sng">
+                <a:solidFill>
+                  <a:srgbClr val="0000FF"/>
+                </a:solidFill>
+                <a:uFill>
+                  <a:solidFill>
+                    <a:srgbClr val="0000FF"/>
+                  </a:solidFill>
+                </a:uFill>
+                <a:hlinkClick r:id="rId3" invalidUrl="" action="" tgtFrame="" tooltip="" history="1" highlightClick="0" endSnd="0"/>
+              </a:rPr>
+              <a:t>Lessons 4 &amp; 5</a:t>
+            </a:r>
+          </a:p>
+          <a:p>
+            <a:pPr marL="332613" indent="-332613" defTabSz="443484">
+              <a:spcBef>
+                <a:spcPts val="1100"/>
+              </a:spcBef>
+              <a:buClr>
+                <a:srgbClr val="000000"/>
+              </a:buClr>
+              <a:defRPr sz="3104"/>
+            </a:pPr>
+          </a:p>
+          <a:p>
+            <a:pPr marL="332613" indent="-332613" defTabSz="443484">
+              <a:spcBef>
+                <a:spcPts val="1100"/>
+              </a:spcBef>
+              <a:buClr>
+                <a:srgbClr val="000000"/>
+              </a:buClr>
+              <a:defRPr sz="3104"/>
+            </a:pPr>
+            <a:r>
+              <a:t>Organize a study group on the listserv</a:t>
+            </a:r>
+          </a:p>
+          <a:p>
+            <a:pPr marL="332613" indent="-332613" defTabSz="443484">
+              <a:spcBef>
+                <a:spcPts val="1100"/>
+              </a:spcBef>
+              <a:buClr>
+                <a:srgbClr val="000000"/>
+              </a:buClr>
+              <a:defRPr sz="3104"/>
+            </a:pPr>
+          </a:p>
+          <a:p>
+            <a:pPr marL="332613" indent="-332613" defTabSz="443484">
+              <a:spcBef>
+                <a:spcPts val="1100"/>
+              </a:spcBef>
+              <a:buClr>
+                <a:srgbClr val="000000"/>
+              </a:buClr>
+              <a:defRPr sz="3104"/>
+            </a:pPr>
+            <a:r>
+              <a:t>Come be a teaching assistant</a:t>
+            </a:r>
+          </a:p>
+          <a:p>
+            <a:pPr marL="332613" indent="-332613" defTabSz="443484">
+              <a:spcBef>
+                <a:spcPts val="1100"/>
+              </a:spcBef>
+              <a:buClr>
+                <a:srgbClr val="000000"/>
+              </a:buClr>
+              <a:defRPr sz="3104"/>
+            </a:pPr>
+          </a:p>
+          <a:p>
+            <a:pPr marL="332613" indent="-332613" defTabSz="443484">
+              <a:spcBef>
+                <a:spcPts val="1100"/>
+              </a:spcBef>
+              <a:buClr>
+                <a:srgbClr val="000000"/>
+              </a:buClr>
+              <a:defRPr sz="3104"/>
+            </a:pPr>
+            <a:r>
+              <a:t>Practice, practice, practice</a:t>
+            </a:r>
+          </a:p>
+        </p:txBody>
+      </p:sp>
+      <p:sp>
+        <p:nvSpPr>
+          <p:cNvPr id="481" name="What now?"/>
+          <p:cNvSpPr/>
+          <p:nvPr/>
+        </p:nvSpPr>
+        <p:spPr>
+          <a:xfrm>
+            <a:off x="0" y="206107"/>
+            <a:ext cx="8686800" cy="812483"/>
+          </a:xfrm>
+          <a:prstGeom prst="rect">
+            <a:avLst/>
+          </a:prstGeom>
+          <a:solidFill>
+            <a:srgbClr val="FFFFFF">
+              <a:alpha val="70000"/>
+            </a:srgbClr>
+          </a:solidFill>
+          <a:ln w="12700">
+            <a:miter lim="400000"/>
+          </a:ln>
+          <a:extLst>
+            <a:ext uri="{C572A759-6A51-4108-AA02-DFA0A04FC94B}">
+              <ma14:wrappingTextBoxFlag xmlns:ma14="http://schemas.microsoft.com/office/mac/drawingml/2011/main" val="1"/>
+            </a:ext>
+          </a:extLst>
+        </p:spPr>
+        <p:txBody>
+          <a:bodyPr tIns="91439" bIns="91439" anchor="ctr">
+            <a:normAutofit fontScale="100000" lnSpcReduction="0"/>
+          </a:bodyPr>
+          <a:lstStyle>
+            <a:lvl1pPr>
+              <a:spcBef>
+                <a:spcPts val="900"/>
+              </a:spcBef>
+              <a:defRPr cap="all" sz="4000">
+                <a:latin typeface="+mn-lt"/>
+                <a:ea typeface="+mn-ea"/>
+                <a:cs typeface="+mn-cs"/>
+                <a:sym typeface="Century Gothic"/>
+              </a:defRPr>
+            </a:lvl1pPr>
+          </a:lstStyle>
+          <a:p>
+            <a:pPr/>
+            <a:r>
               <a:t>What now?</a:t>
             </a:r>
           </a:p>
@@ -20846,7 +21176,7 @@
       </p:sp>
       <p:sp>
         <p:nvSpPr>
-          <p:cNvPr id="475" name="Slide Number"/>
+          <p:cNvPr id="482" name="Slide Number"/>
           <p:cNvSpPr txBox="1"/>
           <p:nvPr>
             <p:ph type="sldNum" sz="quarter" idx="2"/>

</xml_diff>

<commit_message>
Added additional hierarchy chart visualization to lesson 3
</commit_message>
<xml_diff>
--- a/Lesson 3/Hear Me Code - File Handling and Dictionaries.pptx
+++ b/Lesson 3/Hear Me Code - File Handling and Dictionaries.pptx
@@ -74,6 +74,7 @@
     <p:sldId id="319" r:id="rId71"/>
     <p:sldId id="320" r:id="rId72"/>
     <p:sldId id="321" r:id="rId73"/>
+    <p:sldId id="322" r:id="rId74"/>
   </p:sldIdLst>
   <p:sldSz cx="9144000" cy="6858000"/>
   <p:notesSz cx="6858000" cy="9144000"/>
@@ -3434,10 +3435,31 @@
       </p:grpSpPr>
       <p:sp>
         <p:nvSpPr>
+          <p:cNvPr id="366" name="Shape 366"/>
+          <p:cNvSpPr/>
+          <p:nvPr>
+            <p:ph type="sldImg"/>
+          </p:nvPr>
+        </p:nvSpPr>
+        <p:spPr>
+          <a:prstGeom prst="rect">
+            <a:avLst/>
+          </a:prstGeom>
+        </p:spPr>
+        <p:txBody>
+          <a:bodyPr/>
+          <a:lstStyle/>
+          <a:p>
+            <a:pPr/>
+          </a:p>
+        </p:txBody>
+      </p:sp>
+      <p:sp>
+        <p:nvSpPr>
           <p:cNvPr id="367" name="Shape 367"/>
           <p:cNvSpPr/>
           <p:nvPr>
-            <p:ph type="sldImg"/>
+            <p:ph type="body" sz="quarter" idx="1"/>
           </p:nvPr>
         </p:nvSpPr>
         <p:spPr>
@@ -3450,35 +3472,8 @@
           <a:lstStyle/>
           <a:p>
             <a:pPr/>
-          </a:p>
-        </p:txBody>
-      </p:sp>
-      <p:sp>
-        <p:nvSpPr>
-          <p:cNvPr id="368" name="Shape 368"/>
-          <p:cNvSpPr/>
-          <p:nvPr>
-            <p:ph type="body" sz="quarter" idx="1"/>
-          </p:nvPr>
-        </p:nvSpPr>
-        <p:spPr>
-          <a:prstGeom prst="rect">
-            <a:avLst/>
-          </a:prstGeom>
-        </p:spPr>
-        <p:txBody>
-          <a:bodyPr/>
-          <a:lstStyle/>
-          <a:p>
-            <a:pPr/>
-            <a:r>
-              <a:t>How might we slice the dictionary to get my phone number?</a:t>
-            </a:r>
-          </a:p>
-          <a:p>
-            <a:pPr/>
-            <a:r>
-              <a:t>How might we slice the dictionary to get my apartment number?</a:t>
+            <a:r>
+              <a:t>And here's that exact same dictionary, but represented in a way that might be easier for us to recognize.</a:t>
             </a:r>
           </a:p>
         </p:txBody>
@@ -3548,7 +3543,13 @@
           <a:p>
             <a:pPr/>
             <a:r>
-              <a:t>Walk through each key / value pair and point out every single thing in this dictionary.</a:t>
+              <a:t>How might we slice the dictionary to get my phone number?</a:t>
+            </a:r>
+          </a:p>
+          <a:p>
+            <a:pPr/>
+            <a:r>
+              <a:t>How might we slice the dictionary to get my apartment number?</a:t>
             </a:r>
           </a:p>
         </p:txBody>
@@ -3618,7 +3619,7 @@
           <a:p>
             <a:pPr/>
             <a:r>
-              <a:t>And here's that exact same dictionary, but represented in a way that might be easier for us to recognize.</a:t>
+              <a:t>Walk through each key / value pair and point out every single thing in this dictionary.</a:t>
             </a:r>
           </a:p>
         </p:txBody>
@@ -3688,7 +3689,7 @@
           <a:p>
             <a:pPr/>
             <a:r>
-              <a:t>Walk folks through saving the file in their Sublime Text / IDLE.</a:t>
+              <a:t>And here's that exact same dictionary, but represented in a way that might be easier for us to recognize.</a:t>
             </a:r>
           </a:p>
         </p:txBody>
@@ -3758,7 +3759,7 @@
           <a:p>
             <a:pPr/>
             <a:r>
-              <a:t>We only have her mobile phone number and a quick note we wrote to ourselves in her contact record. But that's totally okay. Dictionaries are flexible.</a:t>
+              <a:t>Walk folks through saving the file in their Sublime Text / IDLE.</a:t>
             </a:r>
           </a:p>
         </p:txBody>
@@ -3790,10 +3791,31 @@
       </p:grpSpPr>
       <p:sp>
         <p:nvSpPr>
+          <p:cNvPr id="402" name="Shape 402"/>
+          <p:cNvSpPr/>
+          <p:nvPr>
+            <p:ph type="sldImg"/>
+          </p:nvPr>
+        </p:nvSpPr>
+        <p:spPr>
+          <a:prstGeom prst="rect">
+            <a:avLst/>
+          </a:prstGeom>
+        </p:spPr>
+        <p:txBody>
+          <a:bodyPr/>
+          <a:lstStyle/>
+          <a:p>
+            <a:pPr/>
+          </a:p>
+        </p:txBody>
+      </p:sp>
+      <p:sp>
+        <p:nvSpPr>
           <p:cNvPr id="403" name="Shape 403"/>
           <p:cNvSpPr/>
           <p:nvPr>
-            <p:ph type="sldImg"/>
+            <p:ph type="body" sz="quarter" idx="1"/>
           </p:nvPr>
         </p:nvSpPr>
         <p:spPr>
@@ -3806,35 +3828,8 @@
           <a:lstStyle/>
           <a:p>
             <a:pPr/>
-          </a:p>
-        </p:txBody>
-      </p:sp>
-      <p:sp>
-        <p:nvSpPr>
-          <p:cNvPr id="404" name="Shape 404"/>
-          <p:cNvSpPr/>
-          <p:nvPr>
-            <p:ph type="body" sz="quarter" idx="1"/>
-          </p:nvPr>
-        </p:nvSpPr>
-        <p:spPr>
-          <a:prstGeom prst="rect">
-            <a:avLst/>
-          </a:prstGeom>
-        </p:spPr>
-        <p:txBody>
-          <a:bodyPr/>
-          <a:lstStyle/>
-          <a:p>
-            <a:pPr/>
-            <a:r>
-              <a:t>Which organization was she with again? Oops, we don't actually have that in our records. When we try to ask, Python tells us "KeyError: organization."</a:t>
-            </a:r>
-          </a:p>
-          <a:p>
-            <a:pPr/>
-            <a:r>
-              <a:t>Kinda like when we get an IndexError trying to slice a list using a slicing number that doesn't exist in that list, a KeyError is Python's way of saying: I don't have that information. I don't have that fact about that person.</a:t>
+            <a:r>
+              <a:t>We only have her mobile phone number and a quick note we wrote to ourselves in her contact record. But that's totally okay. Dictionaries are flexible.</a:t>
             </a:r>
           </a:p>
         </p:txBody>
@@ -3904,13 +3899,13 @@
           <a:p>
             <a:pPr/>
             <a:r>
-              <a:t>Here we have three options. We already know the first option will give us a KeyError if there isn't an organization associated with someone.</a:t>
-            </a:r>
-          </a:p>
-          <a:p>
-            <a:pPr/>
-            <a:r>
-              <a:t>But that would be pretty inconvenient if our phone's contacts app crashed whenever it didn't have data for someone. To be more flexible, we can use .get( ) to see if the key exists. If it does, it'll return the value as normal. If not, Python will continue with no error. Try this out for yourself and see what happens.</a:t>
+              <a:t>Which organization was she with again? Oops, we don't actually have that in our records. When we try to ask, Python tells us "KeyError: organization."</a:t>
+            </a:r>
+          </a:p>
+          <a:p>
+            <a:pPr/>
+            <a:r>
+              <a:t>Kinda like when we get an IndexError trying to slice a list using a slicing number that doesn't exist in that list, a KeyError is Python's way of saying: I don't have that information. I don't have that fact about that person.</a:t>
             </a:r>
           </a:p>
         </p:txBody>
@@ -3942,7 +3937,7 @@
       </p:grpSpPr>
       <p:sp>
         <p:nvSpPr>
-          <p:cNvPr id="438" name="Shape 438"/>
+          <p:cNvPr id="417" name="Shape 417"/>
           <p:cNvSpPr/>
           <p:nvPr>
             <p:ph type="sldImg"/>
@@ -3963,7 +3958,7 @@
       </p:sp>
       <p:sp>
         <p:nvSpPr>
-          <p:cNvPr id="439" name="Shape 439"/>
+          <p:cNvPr id="418" name="Shape 418"/>
           <p:cNvSpPr/>
           <p:nvPr>
             <p:ph type="body" sz="quarter" idx="1"/>
@@ -3980,13 +3975,13 @@
           <a:p>
             <a:pPr/>
             <a:r>
-              <a:t>In the previous slide, we just looped through the keys.</a:t>
-            </a:r>
-          </a:p>
-          <a:p>
-            <a:pPr/>
-            <a:r>
-              <a:t>Now let's use those keys to see what values they correspond to.</a:t>
+              <a:t>Here we have three options. We already know the first option will give us a KeyError if there isn't an organization associated with someone.</a:t>
+            </a:r>
+          </a:p>
+          <a:p>
+            <a:pPr/>
+            <a:r>
+              <a:t>But that would be pretty inconvenient if our phone's contacts app crashed whenever it didn't have data for someone. To be more flexible, we can use .get( ) to see if the key exists. If it does, it'll return the value as normal. If not, Python will continue with no error. Try this out for yourself and see what happens.</a:t>
             </a:r>
           </a:p>
         </p:txBody>
@@ -4056,7 +4051,13 @@
           <a:p>
             <a:pPr/>
             <a:r>
-              <a:t>Re-emphasize that you cannot rely on the ordering of a dictionary, you can only order lists of its keys.</a:t>
+              <a:t>In the previous slide, we just looped through the keys.</a:t>
+            </a:r>
+          </a:p>
+          <a:p>
+            <a:pPr/>
+            <a:r>
+              <a:t>Now let's use those keys to see what values they correspond to.</a:t>
             </a:r>
           </a:p>
         </p:txBody>
@@ -4126,7 +4127,7 @@
           <a:p>
             <a:pPr/>
             <a:r>
-              <a:t>Remind everyone that dictionaries are unordered, so you might see things in a different order and that's okay.</a:t>
+              <a:t>Re-emphasize that you cannot rely on the ordering of a dictionary, you can only order lists of its keys.</a:t>
             </a:r>
           </a:p>
         </p:txBody>
@@ -4266,13 +4267,7 @@
           <a:p>
             <a:pPr/>
             <a:r>
-              <a:t>Here, I've named my variables "key" and "value" to illustrate that dictionaries use a key: value pair for the dictionary items.</a:t>
-            </a:r>
-          </a:p>
-          <a:p>
-            <a:pPr/>
-            <a:r>
-              <a:t>I wanted to illustrate that for teaching purposes, but let's use meaningful variable names instead.</a:t>
+              <a:t>Remind everyone that dictionaries are unordered, so you might see things in a different order and that's okay.</a:t>
             </a:r>
           </a:p>
         </p:txBody>
@@ -4342,13 +4337,13 @@
           <a:p>
             <a:pPr/>
             <a:r>
-              <a:t>Now I'm using the variables "name" because that's the name of the contact and "details" because that's the information I know about that contact.</a:t>
-            </a:r>
-          </a:p>
-          <a:p>
-            <a:pPr/>
-            <a:r>
-              <a:t>Remind everyone that dictionaries are unordered, so you might see things in a different order and that's okay</a:t>
+              <a:t>Here, I've named my variables "key" and "value" to illustrate that dictionaries use a key: value pair for the dictionary items.</a:t>
+            </a:r>
+          </a:p>
+          <a:p>
+            <a:pPr/>
+            <a:r>
+              <a:t>I wanted to illustrate that for teaching purposes, but let's use meaningful variable names instead.</a:t>
             </a:r>
           </a:p>
         </p:txBody>
@@ -4418,13 +4413,13 @@
           <a:p>
             <a:pPr/>
             <a:r>
-              <a:t>As a hint, think through how you'll go about looping through a nested dictionary. If it makes it easier, step back and think about how you loop through a nested list.</a:t>
-            </a:r>
-          </a:p>
-          <a:p>
-            <a:pPr/>
-            <a:r>
-              <a:t>Make sure you're looping through your dictionary rather than assuming everyone will have a Twitter handle, a GitHub link, and nothing else. Maybe some people in your contact list will have more details. Maybe some will have fewer, or entirely different ones.</a:t>
+              <a:t>Now I'm using the variables "name" because that's the name of the contact and "details" because that's the information I know about that contact.</a:t>
+            </a:r>
+          </a:p>
+          <a:p>
+            <a:pPr/>
+            <a:r>
+              <a:t>Remind everyone that dictionaries are unordered, so you might see things in a different order and that's okay</a:t>
             </a:r>
           </a:p>
         </p:txBody>
@@ -4456,7 +4451,7 @@
       </p:grpSpPr>
       <p:sp>
         <p:nvSpPr>
-          <p:cNvPr id="483" name="Shape 483"/>
+          <p:cNvPr id="480" name="Shape 480"/>
           <p:cNvSpPr/>
           <p:nvPr>
             <p:ph type="sldImg"/>
@@ -4477,7 +4472,83 @@
       </p:sp>
       <p:sp>
         <p:nvSpPr>
-          <p:cNvPr id="484" name="Shape 484"/>
+          <p:cNvPr id="481" name="Shape 481"/>
+          <p:cNvSpPr/>
+          <p:nvPr>
+            <p:ph type="body" sz="quarter" idx="1"/>
+          </p:nvPr>
+        </p:nvSpPr>
+        <p:spPr>
+          <a:prstGeom prst="rect">
+            <a:avLst/>
+          </a:prstGeom>
+        </p:spPr>
+        <p:txBody>
+          <a:bodyPr/>
+          <a:lstStyle/>
+          <a:p>
+            <a:pPr/>
+            <a:r>
+              <a:t>As a hint, think through how you'll go about looping through a nested dictionary. If it makes it easier, step back and think about how you loop through a nested list.</a:t>
+            </a:r>
+          </a:p>
+          <a:p>
+            <a:pPr/>
+            <a:r>
+              <a:t>Make sure you're looping through your dictionary rather than assuming everyone will have a Twitter handle, a GitHub link, and nothing else. Maybe some people in your contact list will have more details. Maybe some will have fewer, or entirely different ones.</a:t>
+            </a:r>
+          </a:p>
+        </p:txBody>
+      </p:sp>
+    </p:spTree>
+  </p:cSld>
+  <p:clrMapOvr>
+    <a:masterClrMapping/>
+  </p:clrMapOvr>
+</p:notes>
+</file>
+
+<file path=ppt/notesSlides/notesSlide54.xml><?xml version="1.0" encoding="utf-8"?>
+<p:notes xmlns:a="http://schemas.openxmlformats.org/drawingml/2006/main" xmlns:r="http://schemas.openxmlformats.org/officeDocument/2006/relationships" xmlns:p="http://schemas.openxmlformats.org/presentationml/2006/main" showMasterSp="1" showMasterPhAnim="1">
+  <p:cSld>
+    <p:spTree>
+      <p:nvGrpSpPr>
+        <p:cNvPr id="1" name=""/>
+        <p:cNvGrpSpPr/>
+        <p:nvPr/>
+      </p:nvGrpSpPr>
+      <p:grpSpPr>
+        <a:xfrm>
+          <a:off x="0" y="0"/>
+          <a:ext cx="0" cy="0"/>
+          <a:chOff x="0" y="0"/>
+          <a:chExt cx="0" cy="0"/>
+        </a:xfrm>
+      </p:grpSpPr>
+      <p:sp>
+        <p:nvSpPr>
+          <p:cNvPr id="490" name="Shape 490"/>
+          <p:cNvSpPr/>
+          <p:nvPr>
+            <p:ph type="sldImg"/>
+          </p:nvPr>
+        </p:nvSpPr>
+        <p:spPr>
+          <a:prstGeom prst="rect">
+            <a:avLst/>
+          </a:prstGeom>
+        </p:spPr>
+        <p:txBody>
+          <a:bodyPr/>
+          <a:lstStyle/>
+          <a:p>
+            <a:pPr/>
+          </a:p>
+        </p:txBody>
+      </p:sp>
+      <p:sp>
+        <p:nvSpPr>
+          <p:cNvPr id="491" name="Shape 491"/>
           <p:cNvSpPr/>
           <p:nvPr>
             <p:ph type="body" sz="quarter" idx="1"/>
@@ -16249,13 +16320,17 @@
       </p:grpSpPr>
       <p:sp>
         <p:nvSpPr>
-          <p:cNvPr id="362" name="We have a dictionary within a dictionary:…"/>
+          <p:cNvPr id="362" name="Body"/>
           <p:cNvSpPr txBox="1"/>
           <p:nvPr>
             <p:ph type="body" idx="1"/>
           </p:nvPr>
         </p:nvSpPr>
         <p:spPr>
+          <a:xfrm>
+            <a:off x="457200" y="1521081"/>
+            <a:ext cx="8229600" cy="4394211"/>
+          </a:xfrm>
           <a:prstGeom prst="rect">
             <a:avLst/>
           </a:prstGeom>
@@ -16268,64 +16343,104 @@
           <a:p>
             <a:pPr marL="0" indent="0">
               <a:spcBef>
-                <a:spcPts val="600"/>
+                <a:spcPts val="1200"/>
               </a:spcBef>
               <a:buSzTx/>
               <a:buFontTx/>
               <a:buNone/>
-            </a:pPr>
-            <a:r>
-              <a:t>We have a dictionary within a dictionary:</a:t>
-            </a:r>
+              <a:defRPr b="1">
+                <a:latin typeface="Courier New"/>
+                <a:ea typeface="Courier New"/>
+                <a:cs typeface="Courier New"/>
+                <a:sym typeface="Courier New"/>
+              </a:defRPr>
+            </a:pPr>
           </a:p>
           <a:p>
             <a:pPr marL="0" indent="0">
               <a:spcBef>
-                <a:spcPts val="600"/>
+                <a:spcPts val="1200"/>
               </a:spcBef>
               <a:buSzTx/>
               <a:buFontTx/>
               <a:buNone/>
+              <a:defRPr b="1">
+                <a:latin typeface="Courier New"/>
+                <a:ea typeface="Courier New"/>
+                <a:cs typeface="Courier New"/>
+                <a:sym typeface="Courier New"/>
+              </a:defRPr>
             </a:pPr>
           </a:p>
           <a:p>
             <a:pPr marL="0" indent="0">
               <a:spcBef>
-                <a:spcPts val="600"/>
+                <a:spcPts val="1200"/>
               </a:spcBef>
               <a:buSzTx/>
               <a:buFontTx/>
               <a:buNone/>
+              <a:defRPr b="1">
+                <a:latin typeface="Courier New"/>
+                <a:ea typeface="Courier New"/>
+                <a:cs typeface="Courier New"/>
+                <a:sym typeface="Courier New"/>
+              </a:defRPr>
             </a:pPr>
           </a:p>
           <a:p>
             <a:pPr marL="0" indent="0">
               <a:spcBef>
-                <a:spcPts val="600"/>
+                <a:spcPts val="1200"/>
               </a:spcBef>
               <a:buSzTx/>
               <a:buFontTx/>
               <a:buNone/>
+              <a:defRPr b="1">
+                <a:latin typeface="Courier New"/>
+                <a:ea typeface="Courier New"/>
+                <a:cs typeface="Courier New"/>
+                <a:sym typeface="Courier New"/>
+              </a:defRPr>
             </a:pPr>
           </a:p>
           <a:p>
             <a:pPr marL="0" indent="0">
               <a:spcBef>
-                <a:spcPts val="600"/>
+                <a:spcPts val="1200"/>
               </a:spcBef>
               <a:buSzTx/>
               <a:buFontTx/>
               <a:buNone/>
-            </a:pPr>
-            <a:r>
-              <a:t>Just keep slicing:</a:t>
-            </a:r>
-          </a:p>
-        </p:txBody>
-      </p:sp>
-      <p:sp>
-        <p:nvSpPr>
-          <p:cNvPr id="363" name="&quot;Slice&quot; it like a nested list"/>
+              <a:defRPr b="1">
+                <a:latin typeface="Courier New"/>
+                <a:ea typeface="Courier New"/>
+                <a:cs typeface="Courier New"/>
+                <a:sym typeface="Courier New"/>
+              </a:defRPr>
+            </a:pPr>
+          </a:p>
+          <a:p>
+            <a:pPr marL="0" indent="0">
+              <a:spcBef>
+                <a:spcPts val="1200"/>
+              </a:spcBef>
+              <a:buSzTx/>
+              <a:buFontTx/>
+              <a:buNone/>
+              <a:defRPr b="1">
+                <a:latin typeface="Courier New"/>
+                <a:ea typeface="Courier New"/>
+                <a:cs typeface="Courier New"/>
+                <a:sym typeface="Courier New"/>
+              </a:defRPr>
+            </a:pPr>
+          </a:p>
+        </p:txBody>
+      </p:sp>
+      <p:sp>
+        <p:nvSpPr>
+          <p:cNvPr id="363" name="Let's visualize it differently"/>
           <p:cNvSpPr/>
           <p:nvPr/>
         </p:nvSpPr>
@@ -16371,7 +16486,7 @@
           <a:p>
             <a:pPr/>
             <a:r>
-              <a:t>"Slice" it like a nested list</a:t>
+              <a:t>Let's visualize it differently</a:t>
             </a:r>
           </a:p>
         </p:txBody>
@@ -16409,7 +16524,7 @@
       </p:sp>
       <p:pic>
         <p:nvPicPr>
-          <p:cNvPr id="365" name="contacts-1.png" descr="contacts-1.png"/>
+          <p:cNvPr id="365" name="Created-With-Draw-dot-io-Lesson 3 Dictionary Chart Contacts (1).png" descr="Created-With-Draw-dot-io-Lesson 3 Dictionary Chart Contacts (1).png"/>
           <p:cNvPicPr>
             <a:picLocks noChangeAspect="1"/>
           </p:cNvPicPr>
@@ -16425,37 +16540,8 @@
         </p:blipFill>
         <p:spPr>
           <a:xfrm>
-            <a:off x="-1" y="2079803"/>
-            <a:ext cx="9144001" cy="1459069"/>
-          </a:xfrm>
-          <a:prstGeom prst="rect">
-            <a:avLst/>
-          </a:prstGeom>
-          <a:ln w="12700">
-            <a:miter lim="400000"/>
-          </a:ln>
-        </p:spPr>
-      </p:pic>
-      <p:pic>
-        <p:nvPicPr>
-          <p:cNvPr id="366" name="contacts-2.png" descr="contacts-2.png"/>
-          <p:cNvPicPr>
-            <a:picLocks noChangeAspect="1"/>
-          </p:cNvPicPr>
-          <p:nvPr/>
-        </p:nvPicPr>
-        <p:blipFill>
-          <a:blip r:embed="rId4">
-            <a:extLst/>
-          </a:blip>
-          <a:stretch>
-            <a:fillRect/>
-          </a:stretch>
-        </p:blipFill>
-        <p:spPr>
-          <a:xfrm>
-            <a:off x="10409" y="4512356"/>
-            <a:ext cx="9144001" cy="931943"/>
+            <a:off x="0" y="1056735"/>
+            <a:ext cx="9144000" cy="4744530"/>
           </a:xfrm>
           <a:prstGeom prst="rect">
             <a:avLst/>
@@ -16493,7 +16579,7 @@
       </p:grpSpPr>
       <p:sp>
         <p:nvSpPr>
-          <p:cNvPr id="370" name="... strings, lists, even other dictionaries!"/>
+          <p:cNvPr id="369" name="We have a dictionary within a dictionary:…"/>
           <p:cNvSpPr txBox="1"/>
           <p:nvPr>
             <p:ph type="body" idx="1"/>
@@ -16510,120 +16596,66 @@
           </a:bodyPr>
           <a:lstStyle/>
           <a:p>
-            <a:pPr marL="0" indent="0" defTabSz="416052">
+            <a:pPr marL="0" indent="0">
               <a:spcBef>
                 <a:spcPts val="600"/>
               </a:spcBef>
               <a:buSzTx/>
               <a:buFontTx/>
               <a:buNone/>
-              <a:defRPr sz="2912"/>
-            </a:pPr>
-            <a:r>
-              <a:t>... strings, lists, even other dictionaries!</a:t>
-            </a:r>
-          </a:p>
-          <a:p>
-            <a:pPr marL="0" indent="0" defTabSz="416052">
-              <a:spcBef>
-                <a:spcPts val="1000"/>
+            </a:pPr>
+            <a:r>
+              <a:t>We have a dictionary within a dictionary:</a:t>
+            </a:r>
+          </a:p>
+          <a:p>
+            <a:pPr marL="0" indent="0">
+              <a:spcBef>
+                <a:spcPts val="600"/>
               </a:spcBef>
               <a:buSzTx/>
               <a:buFontTx/>
               <a:buNone/>
-              <a:defRPr b="1" sz="2912">
-                <a:latin typeface="Courier New"/>
-                <a:ea typeface="Courier New"/>
-                <a:cs typeface="Courier New"/>
-                <a:sym typeface="Courier New"/>
-              </a:defRPr>
-            </a:pPr>
-          </a:p>
-          <a:p>
-            <a:pPr marL="0" indent="0" defTabSz="416052">
-              <a:spcBef>
-                <a:spcPts val="1000"/>
+            </a:pPr>
+          </a:p>
+          <a:p>
+            <a:pPr marL="0" indent="0">
+              <a:spcBef>
+                <a:spcPts val="600"/>
               </a:spcBef>
               <a:buSzTx/>
               <a:buFontTx/>
               <a:buNone/>
-              <a:defRPr b="1" sz="2912">
-                <a:latin typeface="Courier New"/>
-                <a:ea typeface="Courier New"/>
-                <a:cs typeface="Courier New"/>
-                <a:sym typeface="Courier New"/>
-              </a:defRPr>
-            </a:pPr>
-          </a:p>
-          <a:p>
-            <a:pPr marL="0" indent="0" defTabSz="416052">
-              <a:spcBef>
-                <a:spcPts val="1000"/>
+            </a:pPr>
+          </a:p>
+          <a:p>
+            <a:pPr marL="0" indent="0">
+              <a:spcBef>
+                <a:spcPts val="600"/>
               </a:spcBef>
               <a:buSzTx/>
               <a:buFontTx/>
               <a:buNone/>
-              <a:defRPr b="1" sz="2912">
-                <a:latin typeface="Courier New"/>
-                <a:ea typeface="Courier New"/>
-                <a:cs typeface="Courier New"/>
-                <a:sym typeface="Courier New"/>
-              </a:defRPr>
-            </a:pPr>
-          </a:p>
-          <a:p>
-            <a:pPr marL="0" indent="0" defTabSz="416052">
-              <a:spcBef>
-                <a:spcPts val="1000"/>
+            </a:pPr>
+          </a:p>
+          <a:p>
+            <a:pPr marL="0" indent="0">
+              <a:spcBef>
+                <a:spcPts val="600"/>
               </a:spcBef>
               <a:buSzTx/>
               <a:buFontTx/>
               <a:buNone/>
-              <a:defRPr b="1" sz="2912">
-                <a:latin typeface="Courier New"/>
-                <a:ea typeface="Courier New"/>
-                <a:cs typeface="Courier New"/>
-                <a:sym typeface="Courier New"/>
-              </a:defRPr>
-            </a:pPr>
-          </a:p>
-          <a:p>
-            <a:pPr marL="0" indent="0" defTabSz="416052">
-              <a:spcBef>
-                <a:spcPts val="1000"/>
-              </a:spcBef>
-              <a:buSzTx/>
-              <a:buFontTx/>
-              <a:buNone/>
-              <a:defRPr b="1" sz="2912">
-                <a:latin typeface="Courier New"/>
-                <a:ea typeface="Courier New"/>
-                <a:cs typeface="Courier New"/>
-                <a:sym typeface="Courier New"/>
-              </a:defRPr>
-            </a:pPr>
-          </a:p>
-          <a:p>
-            <a:pPr marL="0" indent="0" defTabSz="416052">
-              <a:spcBef>
-                <a:spcPts val="1000"/>
-              </a:spcBef>
-              <a:buSzTx/>
-              <a:buFontTx/>
-              <a:buNone/>
-              <a:defRPr b="1" sz="2912">
-                <a:latin typeface="Courier New"/>
-                <a:ea typeface="Courier New"/>
-                <a:cs typeface="Courier New"/>
-                <a:sym typeface="Courier New"/>
-              </a:defRPr>
-            </a:pPr>
-          </a:p>
-        </p:txBody>
-      </p:sp>
-      <p:sp>
-        <p:nvSpPr>
-          <p:cNvPr id="371" name="dictionaries can contain ..."/>
+            </a:pPr>
+            <a:r>
+              <a:t>Just keep slicing:</a:t>
+            </a:r>
+          </a:p>
+        </p:txBody>
+      </p:sp>
+      <p:sp>
+        <p:nvSpPr>
+          <p:cNvPr id="370" name="&quot;Slice&quot; it like a nested list"/>
           <p:cNvSpPr/>
           <p:nvPr/>
         </p:nvSpPr>
@@ -16669,14 +16701,14 @@
           <a:p>
             <a:pPr/>
             <a:r>
-              <a:t>dictionaries can contain ...</a:t>
-            </a:r>
-          </a:p>
-        </p:txBody>
-      </p:sp>
-      <p:sp>
-        <p:nvSpPr>
-          <p:cNvPr id="372" name="Slide Number"/>
+              <a:t>"Slice" it like a nested list</a:t>
+            </a:r>
+          </a:p>
+        </p:txBody>
+      </p:sp>
+      <p:sp>
+        <p:nvSpPr>
+          <p:cNvPr id="371" name="Slide Number"/>
           <p:cNvSpPr txBox="1"/>
           <p:nvPr>
             <p:ph type="sldNum" sz="quarter" idx="2"/>
@@ -16707,7 +16739,7 @@
       </p:sp>
       <p:pic>
         <p:nvPicPr>
-          <p:cNvPr id="373" name="dict-nested.png" descr="dict-nested.png"/>
+          <p:cNvPr id="372" name="contacts-1.png" descr="contacts-1.png"/>
           <p:cNvPicPr>
             <a:picLocks noChangeAspect="1"/>
           </p:cNvPicPr>
@@ -16723,8 +16755,37 @@
         </p:blipFill>
         <p:spPr>
           <a:xfrm>
-            <a:off x="941614" y="1949254"/>
-            <a:ext cx="7281591" cy="3799498"/>
+            <a:off x="-1" y="2079803"/>
+            <a:ext cx="9144001" cy="1459069"/>
+          </a:xfrm>
+          <a:prstGeom prst="rect">
+            <a:avLst/>
+          </a:prstGeom>
+          <a:ln w="12700">
+            <a:miter lim="400000"/>
+          </a:ln>
+        </p:spPr>
+      </p:pic>
+      <p:pic>
+        <p:nvPicPr>
+          <p:cNvPr id="373" name="contacts-2.png" descr="contacts-2.png"/>
+          <p:cNvPicPr>
+            <a:picLocks noChangeAspect="1"/>
+          </p:cNvPicPr>
+          <p:nvPr/>
+        </p:nvPicPr>
+        <p:blipFill>
+          <a:blip r:embed="rId4">
+            <a:extLst/>
+          </a:blip>
+          <a:stretch>
+            <a:fillRect/>
+          </a:stretch>
+        </p:blipFill>
+        <p:spPr>
+          <a:xfrm>
+            <a:off x="10409" y="4512356"/>
+            <a:ext cx="9144001" cy="931943"/>
           </a:xfrm>
           <a:prstGeom prst="rect">
             <a:avLst/>
@@ -16975,17 +17036,13 @@
       </p:grpSpPr>
       <p:sp>
         <p:nvSpPr>
-          <p:cNvPr id="377" name="Body"/>
+          <p:cNvPr id="377" name="... strings, lists, even other dictionaries!"/>
           <p:cNvSpPr txBox="1"/>
           <p:nvPr>
             <p:ph type="body" idx="1"/>
           </p:nvPr>
         </p:nvSpPr>
         <p:spPr>
-          <a:xfrm>
-            <a:off x="457200" y="1521081"/>
-            <a:ext cx="8229600" cy="4394211"/>
-          </a:xfrm>
           <a:prstGeom prst="rect">
             <a:avLst/>
           </a:prstGeom>
@@ -16996,14 +17053,28 @@
           </a:bodyPr>
           <a:lstStyle/>
           <a:p>
-            <a:pPr marL="0" indent="0">
-              <a:spcBef>
-                <a:spcPts val="1200"/>
+            <a:pPr marL="0" indent="0" defTabSz="416052">
+              <a:spcBef>
+                <a:spcPts val="600"/>
               </a:spcBef>
               <a:buSzTx/>
               <a:buFontTx/>
               <a:buNone/>
-              <a:defRPr b="1">
+              <a:defRPr sz="2912"/>
+            </a:pPr>
+            <a:r>
+              <a:t>... strings, lists, even other dictionaries!</a:t>
+            </a:r>
+          </a:p>
+          <a:p>
+            <a:pPr marL="0" indent="0" defTabSz="416052">
+              <a:spcBef>
+                <a:spcPts val="1000"/>
+              </a:spcBef>
+              <a:buSzTx/>
+              <a:buFontTx/>
+              <a:buNone/>
+              <a:defRPr b="1" sz="2912">
                 <a:latin typeface="Courier New"/>
                 <a:ea typeface="Courier New"/>
                 <a:cs typeface="Courier New"/>
@@ -17012,14 +17083,14 @@
             </a:pPr>
           </a:p>
           <a:p>
-            <a:pPr marL="0" indent="0">
-              <a:spcBef>
-                <a:spcPts val="1200"/>
+            <a:pPr marL="0" indent="0" defTabSz="416052">
+              <a:spcBef>
+                <a:spcPts val="1000"/>
               </a:spcBef>
               <a:buSzTx/>
               <a:buFontTx/>
               <a:buNone/>
-              <a:defRPr b="1">
+              <a:defRPr b="1" sz="2912">
                 <a:latin typeface="Courier New"/>
                 <a:ea typeface="Courier New"/>
                 <a:cs typeface="Courier New"/>
@@ -17028,14 +17099,14 @@
             </a:pPr>
           </a:p>
           <a:p>
-            <a:pPr marL="0" indent="0">
-              <a:spcBef>
-                <a:spcPts val="1200"/>
+            <a:pPr marL="0" indent="0" defTabSz="416052">
+              <a:spcBef>
+                <a:spcPts val="1000"/>
               </a:spcBef>
               <a:buSzTx/>
               <a:buFontTx/>
               <a:buNone/>
-              <a:defRPr b="1">
+              <a:defRPr b="1" sz="2912">
                 <a:latin typeface="Courier New"/>
                 <a:ea typeface="Courier New"/>
                 <a:cs typeface="Courier New"/>
@@ -17044,14 +17115,14 @@
             </a:pPr>
           </a:p>
           <a:p>
-            <a:pPr marL="0" indent="0">
-              <a:spcBef>
-                <a:spcPts val="1200"/>
+            <a:pPr marL="0" indent="0" defTabSz="416052">
+              <a:spcBef>
+                <a:spcPts val="1000"/>
               </a:spcBef>
               <a:buSzTx/>
               <a:buFontTx/>
               <a:buNone/>
-              <a:defRPr b="1">
+              <a:defRPr b="1" sz="2912">
                 <a:latin typeface="Courier New"/>
                 <a:ea typeface="Courier New"/>
                 <a:cs typeface="Courier New"/>
@@ -17060,14 +17131,14 @@
             </a:pPr>
           </a:p>
           <a:p>
-            <a:pPr marL="0" indent="0">
-              <a:spcBef>
-                <a:spcPts val="1200"/>
+            <a:pPr marL="0" indent="0" defTabSz="416052">
+              <a:spcBef>
+                <a:spcPts val="1000"/>
               </a:spcBef>
               <a:buSzTx/>
               <a:buFontTx/>
               <a:buNone/>
-              <a:defRPr b="1">
+              <a:defRPr b="1" sz="2912">
                 <a:latin typeface="Courier New"/>
                 <a:ea typeface="Courier New"/>
                 <a:cs typeface="Courier New"/>
@@ -17076,14 +17147,14 @@
             </a:pPr>
           </a:p>
           <a:p>
-            <a:pPr marL="0" indent="0">
-              <a:spcBef>
-                <a:spcPts val="1200"/>
+            <a:pPr marL="0" indent="0" defTabSz="416052">
+              <a:spcBef>
+                <a:spcPts val="1000"/>
               </a:spcBef>
               <a:buSzTx/>
               <a:buFontTx/>
               <a:buNone/>
-              <a:defRPr b="1">
+              <a:defRPr b="1" sz="2912">
                 <a:latin typeface="Courier New"/>
                 <a:ea typeface="Courier New"/>
                 <a:cs typeface="Courier New"/>
@@ -17095,7 +17166,7 @@
       </p:sp>
       <p:sp>
         <p:nvSpPr>
-          <p:cNvPr id="378" name="Let's visualize it differently"/>
+          <p:cNvPr id="378" name="dictionaries can contain ..."/>
           <p:cNvSpPr/>
           <p:nvPr/>
         </p:nvSpPr>
@@ -17141,7 +17212,7 @@
           <a:p>
             <a:pPr/>
             <a:r>
-              <a:t>Let's visualize it differently</a:t>
+              <a:t>dictionaries can contain ...</a:t>
             </a:r>
           </a:p>
         </p:txBody>
@@ -17179,7 +17250,7 @@
       </p:sp>
       <p:pic>
         <p:nvPicPr>
-          <p:cNvPr id="380" name="Lesson 3 Dictionary Chart.png" descr="Lesson 3 Dictionary Chart.png"/>
+          <p:cNvPr id="380" name="dict-nested.png" descr="dict-nested.png"/>
           <p:cNvPicPr>
             <a:picLocks noChangeAspect="1"/>
           </p:cNvPicPr>
@@ -17195,8 +17266,8 @@
         </p:blipFill>
         <p:spPr>
           <a:xfrm>
-            <a:off x="-148013" y="1693625"/>
-            <a:ext cx="9144001" cy="3132752"/>
+            <a:off x="941614" y="1949254"/>
+            <a:ext cx="7281591" cy="3799498"/>
           </a:xfrm>
           <a:prstGeom prst="rect">
             <a:avLst/>
@@ -17234,13 +17305,17 @@
       </p:grpSpPr>
       <p:sp>
         <p:nvSpPr>
-          <p:cNvPr id="384" name="Save these exercise instructions to your computer, open it in Sublime/IDLE and work from there!"/>
+          <p:cNvPr id="384" name="Body"/>
           <p:cNvSpPr txBox="1"/>
           <p:nvPr>
             <p:ph type="body" idx="1"/>
           </p:nvPr>
         </p:nvSpPr>
         <p:spPr>
+          <a:xfrm>
+            <a:off x="457200" y="1521081"/>
+            <a:ext cx="8229600" cy="4394211"/>
+          </a:xfrm>
           <a:prstGeom prst="rect">
             <a:avLst/>
           </a:prstGeom>
@@ -17251,137 +17326,106 @@
           </a:bodyPr>
           <a:lstStyle/>
           <a:p>
-            <a:pPr marL="0" indent="0" defTabSz="374904">
-              <a:spcBef>
-                <a:spcPts val="500"/>
+            <a:pPr marL="0" indent="0">
+              <a:spcBef>
+                <a:spcPts val="1200"/>
               </a:spcBef>
               <a:buSzTx/>
               <a:buFontTx/>
               <a:buNone/>
-              <a:defRPr sz="2624"/>
-            </a:pPr>
-            <a:r>
-              <a:t>Save these </a:t>
-            </a:r>
-            <a:r>
-              <a:rPr b="1" u="sng">
-                <a:solidFill>
-                  <a:srgbClr val="0000FF"/>
-                </a:solidFill>
-                <a:uFill>
-                  <a:solidFill>
-                    <a:srgbClr val="0000FF"/>
-                  </a:solidFill>
-                </a:uFill>
-                <a:hlinkClick r:id="rId3" invalidUrl="" action="" tgtFrame="" tooltip="" history="1" highlightClick="0" endSnd="0"/>
-              </a:rPr>
-              <a:t>exercise instructions</a:t>
-            </a:r>
-            <a:r>
-              <a:t> to your computer, open it in Sublime/IDLE and work from there!</a:t>
-            </a:r>
-          </a:p>
-          <a:p>
-            <a:pPr marL="0" indent="0" defTabSz="374904">
-              <a:spcBef>
-                <a:spcPts val="500"/>
+              <a:defRPr b="1">
+                <a:latin typeface="Courier New"/>
+                <a:ea typeface="Courier New"/>
+                <a:cs typeface="Courier New"/>
+                <a:sym typeface="Courier New"/>
+              </a:defRPr>
+            </a:pPr>
+          </a:p>
+          <a:p>
+            <a:pPr marL="0" indent="0">
+              <a:spcBef>
+                <a:spcPts val="1200"/>
               </a:spcBef>
               <a:buSzTx/>
               <a:buFontTx/>
               <a:buNone/>
-              <a:defRPr sz="2624">
-                <a:latin typeface="Gill Sans Light"/>
-                <a:ea typeface="Gill Sans Light"/>
-                <a:cs typeface="Gill Sans Light"/>
-                <a:sym typeface="Gill Sans Light"/>
+              <a:defRPr b="1">
+                <a:latin typeface="Courier New"/>
+                <a:ea typeface="Courier New"/>
+                <a:cs typeface="Courier New"/>
+                <a:sym typeface="Courier New"/>
               </a:defRPr>
             </a:pPr>
           </a:p>
           <a:p>
-            <a:pPr marL="0" indent="0" defTabSz="374904">
-              <a:spcBef>
-                <a:spcPts val="500"/>
+            <a:pPr marL="0" indent="0">
+              <a:spcBef>
+                <a:spcPts val="1200"/>
               </a:spcBef>
               <a:buSzTx/>
               <a:buFontTx/>
               <a:buNone/>
-              <a:defRPr sz="2624">
-                <a:latin typeface="Gill Sans Light"/>
-                <a:ea typeface="Gill Sans Light"/>
-                <a:cs typeface="Gill Sans Light"/>
-                <a:sym typeface="Gill Sans Light"/>
+              <a:defRPr b="1">
+                <a:latin typeface="Courier New"/>
+                <a:ea typeface="Courier New"/>
+                <a:cs typeface="Courier New"/>
+                <a:sym typeface="Courier New"/>
               </a:defRPr>
             </a:pPr>
           </a:p>
           <a:p>
-            <a:pPr marL="0" indent="0" defTabSz="374904">
-              <a:spcBef>
-                <a:spcPts val="500"/>
+            <a:pPr marL="0" indent="0">
+              <a:spcBef>
+                <a:spcPts val="1200"/>
               </a:spcBef>
               <a:buSzTx/>
               <a:buFontTx/>
               <a:buNone/>
-              <a:defRPr sz="2624">
-                <a:latin typeface="Gill Sans Light"/>
-                <a:ea typeface="Gill Sans Light"/>
-                <a:cs typeface="Gill Sans Light"/>
-                <a:sym typeface="Gill Sans Light"/>
+              <a:defRPr b="1">
+                <a:latin typeface="Courier New"/>
+                <a:ea typeface="Courier New"/>
+                <a:cs typeface="Courier New"/>
+                <a:sym typeface="Courier New"/>
               </a:defRPr>
             </a:pPr>
           </a:p>
           <a:p>
-            <a:pPr marL="0" indent="0" defTabSz="374904">
-              <a:spcBef>
-                <a:spcPts val="500"/>
+            <a:pPr marL="0" indent="0">
+              <a:spcBef>
+                <a:spcPts val="1200"/>
               </a:spcBef>
               <a:buSzTx/>
               <a:buFontTx/>
               <a:buNone/>
-              <a:defRPr sz="2624">
-                <a:latin typeface="Gill Sans Light"/>
-                <a:ea typeface="Gill Sans Light"/>
-                <a:cs typeface="Gill Sans Light"/>
-                <a:sym typeface="Gill Sans Light"/>
+              <a:defRPr b="1">
+                <a:latin typeface="Courier New"/>
+                <a:ea typeface="Courier New"/>
+                <a:cs typeface="Courier New"/>
+                <a:sym typeface="Courier New"/>
               </a:defRPr>
             </a:pPr>
           </a:p>
           <a:p>
-            <a:pPr marL="0" indent="0" defTabSz="374904">
-              <a:spcBef>
-                <a:spcPts val="500"/>
+            <a:pPr marL="0" indent="0">
+              <a:spcBef>
+                <a:spcPts val="1200"/>
               </a:spcBef>
               <a:buSzTx/>
               <a:buFontTx/>
               <a:buNone/>
-              <a:defRPr sz="2624">
-                <a:latin typeface="Gill Sans Light"/>
-                <a:ea typeface="Gill Sans Light"/>
-                <a:cs typeface="Gill Sans Light"/>
-                <a:sym typeface="Gill Sans Light"/>
+              <a:defRPr b="1">
+                <a:latin typeface="Courier New"/>
+                <a:ea typeface="Courier New"/>
+                <a:cs typeface="Courier New"/>
+                <a:sym typeface="Courier New"/>
               </a:defRPr>
             </a:pPr>
           </a:p>
-          <a:p>
-            <a:pPr marL="0" indent="0" defTabSz="374904">
-              <a:spcBef>
-                <a:spcPts val="500"/>
-              </a:spcBef>
-              <a:buSzTx/>
-              <a:buFontTx/>
-              <a:buNone/>
-              <a:defRPr sz="2624">
-                <a:latin typeface="Gill Sans Light"/>
-                <a:ea typeface="Gill Sans Light"/>
-                <a:cs typeface="Gill Sans Light"/>
-                <a:sym typeface="Gill Sans Light"/>
-              </a:defRPr>
-            </a:pPr>
-          </a:p>
-        </p:txBody>
-      </p:sp>
-      <p:sp>
-        <p:nvSpPr>
-          <p:cNvPr id="385" name="exercise"/>
+        </p:txBody>
+      </p:sp>
+      <p:sp>
+        <p:nvSpPr>
+          <p:cNvPr id="385" name="Let's visualize it differently"/>
           <p:cNvSpPr/>
           <p:nvPr/>
         </p:nvSpPr>
@@ -17427,7 +17471,7 @@
           <a:p>
             <a:pPr/>
             <a:r>
-              <a:t>exercise</a:t>
+              <a:t>Let's visualize it differently</a:t>
             </a:r>
           </a:p>
         </p:txBody>
@@ -17465,14 +17509,14 @@
       </p:sp>
       <p:pic>
         <p:nvPicPr>
-          <p:cNvPr id="387" name="dict-nested.png" descr="dict-nested.png"/>
+          <p:cNvPr id="387" name="Lesson 3 Dictionary Chart.png" descr="Lesson 3 Dictionary Chart.png"/>
           <p:cNvPicPr>
             <a:picLocks noChangeAspect="1"/>
           </p:cNvPicPr>
           <p:nvPr/>
         </p:nvPicPr>
         <p:blipFill>
-          <a:blip r:embed="rId4">
+          <a:blip r:embed="rId3">
             <a:extLst/>
           </a:blip>
           <a:stretch>
@@ -17481,8 +17525,8 @@
         </p:blipFill>
         <p:spPr>
           <a:xfrm>
-            <a:off x="1143732" y="2329274"/>
-            <a:ext cx="6399336" cy="3339141"/>
+            <a:off x="-148013" y="1693625"/>
+            <a:ext cx="9144001" cy="3132752"/>
           </a:xfrm>
           <a:prstGeom prst="rect">
             <a:avLst/>
@@ -17520,7 +17564,7 @@
       </p:grpSpPr>
       <p:sp>
         <p:nvSpPr>
-          <p:cNvPr id="391" name="We just met Carla, so we don't have as many details about her in our phonebook as we do for Shannon."/>
+          <p:cNvPr id="391" name="Save these exercise instructions to your computer, open it in Sublime/IDLE and work from there!"/>
           <p:cNvSpPr txBox="1"/>
           <p:nvPr>
             <p:ph type="body" idx="1"/>
@@ -17535,27 +17579,139 @@
           <a:bodyPr>
             <a:normAutofit fontScale="100000" lnSpcReduction="0"/>
           </a:bodyPr>
-          <a:lstStyle>
-            <a:lvl1pPr marL="0" indent="0">
-              <a:spcBef>
-                <a:spcPts val="600"/>
+          <a:lstStyle/>
+          <a:p>
+            <a:pPr marL="0" indent="0" defTabSz="374904">
+              <a:spcBef>
+                <a:spcPts val="500"/>
               </a:spcBef>
               <a:buSzTx/>
               <a:buFontTx/>
               <a:buNone/>
-            </a:lvl1pPr>
-          </a:lstStyle>
-          <a:p>
-            <a:pPr/>
-            <a:r>
-              <a:t>We just met Carla, so we don't have as many details about her in our phonebook as we do for Shannon.</a:t>
-            </a:r>
-          </a:p>
-        </p:txBody>
-      </p:sp>
-      <p:sp>
-        <p:nvSpPr>
-          <p:cNvPr id="392" name="Dictionaries are flexible"/>
+              <a:defRPr sz="2624"/>
+            </a:pPr>
+            <a:r>
+              <a:t>Save these </a:t>
+            </a:r>
+            <a:r>
+              <a:rPr b="1" u="sng">
+                <a:solidFill>
+                  <a:srgbClr val="0000FF"/>
+                </a:solidFill>
+                <a:uFill>
+                  <a:solidFill>
+                    <a:srgbClr val="0000FF"/>
+                  </a:solidFill>
+                </a:uFill>
+                <a:hlinkClick r:id="rId3" invalidUrl="" action="" tgtFrame="" tooltip="" history="1" highlightClick="0" endSnd="0"/>
+              </a:rPr>
+              <a:t>exercise instructions</a:t>
+            </a:r>
+            <a:r>
+              <a:t> to your computer, open it in Sublime/IDLE and work from there!</a:t>
+            </a:r>
+          </a:p>
+          <a:p>
+            <a:pPr marL="0" indent="0" defTabSz="374904">
+              <a:spcBef>
+                <a:spcPts val="500"/>
+              </a:spcBef>
+              <a:buSzTx/>
+              <a:buFontTx/>
+              <a:buNone/>
+              <a:defRPr sz="2624">
+                <a:latin typeface="Gill Sans Light"/>
+                <a:ea typeface="Gill Sans Light"/>
+                <a:cs typeface="Gill Sans Light"/>
+                <a:sym typeface="Gill Sans Light"/>
+              </a:defRPr>
+            </a:pPr>
+          </a:p>
+          <a:p>
+            <a:pPr marL="0" indent="0" defTabSz="374904">
+              <a:spcBef>
+                <a:spcPts val="500"/>
+              </a:spcBef>
+              <a:buSzTx/>
+              <a:buFontTx/>
+              <a:buNone/>
+              <a:defRPr sz="2624">
+                <a:latin typeface="Gill Sans Light"/>
+                <a:ea typeface="Gill Sans Light"/>
+                <a:cs typeface="Gill Sans Light"/>
+                <a:sym typeface="Gill Sans Light"/>
+              </a:defRPr>
+            </a:pPr>
+          </a:p>
+          <a:p>
+            <a:pPr marL="0" indent="0" defTabSz="374904">
+              <a:spcBef>
+                <a:spcPts val="500"/>
+              </a:spcBef>
+              <a:buSzTx/>
+              <a:buFontTx/>
+              <a:buNone/>
+              <a:defRPr sz="2624">
+                <a:latin typeface="Gill Sans Light"/>
+                <a:ea typeface="Gill Sans Light"/>
+                <a:cs typeface="Gill Sans Light"/>
+                <a:sym typeface="Gill Sans Light"/>
+              </a:defRPr>
+            </a:pPr>
+          </a:p>
+          <a:p>
+            <a:pPr marL="0" indent="0" defTabSz="374904">
+              <a:spcBef>
+                <a:spcPts val="500"/>
+              </a:spcBef>
+              <a:buSzTx/>
+              <a:buFontTx/>
+              <a:buNone/>
+              <a:defRPr sz="2624">
+                <a:latin typeface="Gill Sans Light"/>
+                <a:ea typeface="Gill Sans Light"/>
+                <a:cs typeface="Gill Sans Light"/>
+                <a:sym typeface="Gill Sans Light"/>
+              </a:defRPr>
+            </a:pPr>
+          </a:p>
+          <a:p>
+            <a:pPr marL="0" indent="0" defTabSz="374904">
+              <a:spcBef>
+                <a:spcPts val="500"/>
+              </a:spcBef>
+              <a:buSzTx/>
+              <a:buFontTx/>
+              <a:buNone/>
+              <a:defRPr sz="2624">
+                <a:latin typeface="Gill Sans Light"/>
+                <a:ea typeface="Gill Sans Light"/>
+                <a:cs typeface="Gill Sans Light"/>
+                <a:sym typeface="Gill Sans Light"/>
+              </a:defRPr>
+            </a:pPr>
+          </a:p>
+          <a:p>
+            <a:pPr marL="0" indent="0" defTabSz="374904">
+              <a:spcBef>
+                <a:spcPts val="500"/>
+              </a:spcBef>
+              <a:buSzTx/>
+              <a:buFontTx/>
+              <a:buNone/>
+              <a:defRPr sz="2624">
+                <a:latin typeface="Gill Sans Light"/>
+                <a:ea typeface="Gill Sans Light"/>
+                <a:cs typeface="Gill Sans Light"/>
+                <a:sym typeface="Gill Sans Light"/>
+              </a:defRPr>
+            </a:pPr>
+          </a:p>
+        </p:txBody>
+      </p:sp>
+      <p:sp>
+        <p:nvSpPr>
+          <p:cNvPr id="392" name="exercise"/>
           <p:cNvSpPr/>
           <p:nvPr/>
         </p:nvSpPr>
@@ -17601,7 +17757,7 @@
           <a:p>
             <a:pPr/>
             <a:r>
-              <a:t>Dictionaries are flexible</a:t>
+              <a:t>exercise</a:t>
             </a:r>
           </a:p>
         </p:txBody>
@@ -17639,14 +17795,14 @@
       </p:sp>
       <p:pic>
         <p:nvPicPr>
-          <p:cNvPr id="394" name="contacts-3.png" descr="contacts-3.png"/>
+          <p:cNvPr id="394" name="dict-nested.png" descr="dict-nested.png"/>
           <p:cNvPicPr>
             <a:picLocks noChangeAspect="1"/>
           </p:cNvPicPr>
           <p:nvPr/>
         </p:nvPicPr>
         <p:blipFill>
-          <a:blip r:embed="rId3">
+          <a:blip r:embed="rId4">
             <a:extLst/>
           </a:blip>
           <a:stretch>
@@ -17655,8 +17811,8 @@
         </p:blipFill>
         <p:spPr>
           <a:xfrm>
-            <a:off x="425450" y="3069020"/>
-            <a:ext cx="8293100" cy="2552701"/>
+            <a:off x="1143732" y="2329274"/>
+            <a:ext cx="6399336" cy="3339141"/>
           </a:xfrm>
           <a:prstGeom prst="rect">
             <a:avLst/>
@@ -17694,7 +17850,7 @@
       </p:grpSpPr>
       <p:sp>
         <p:nvSpPr>
-          <p:cNvPr id="398" name="Body"/>
+          <p:cNvPr id="398" name="We just met Carla, so we don't have as many details about her in our phonebook as we do for Shannon."/>
           <p:cNvSpPr txBox="1"/>
           <p:nvPr>
             <p:ph type="body" idx="1"/>
@@ -17709,22 +17865,27 @@
           <a:bodyPr>
             <a:normAutofit fontScale="100000" lnSpcReduction="0"/>
           </a:bodyPr>
-          <a:lstStyle/>
-          <a:p>
-            <a:pPr marL="0" indent="0">
+          <a:lstStyle>
+            <a:lvl1pPr marL="0" indent="0">
               <a:spcBef>
                 <a:spcPts val="600"/>
               </a:spcBef>
               <a:buSzTx/>
               <a:buFontTx/>
               <a:buNone/>
-            </a:pPr>
-          </a:p>
-        </p:txBody>
-      </p:sp>
-      <p:sp>
-        <p:nvSpPr>
-          <p:cNvPr id="399" name="I don't have that key"/>
+            </a:lvl1pPr>
+          </a:lstStyle>
+          <a:p>
+            <a:pPr/>
+            <a:r>
+              <a:t>We just met Carla, so we don't have as many details about her in our phonebook as we do for Shannon.</a:t>
+            </a:r>
+          </a:p>
+        </p:txBody>
+      </p:sp>
+      <p:sp>
+        <p:nvSpPr>
+          <p:cNvPr id="399" name="Dictionaries are flexible"/>
           <p:cNvSpPr/>
           <p:nvPr/>
         </p:nvSpPr>
@@ -17770,7 +17931,7 @@
           <a:p>
             <a:pPr/>
             <a:r>
-              <a:t>I don't have that key</a:t>
+              <a:t>Dictionaries are flexible</a:t>
             </a:r>
           </a:p>
         </p:txBody>
@@ -17824,37 +17985,8 @@
         </p:blipFill>
         <p:spPr>
           <a:xfrm>
-            <a:off x="425450" y="1280619"/>
+            <a:off x="425450" y="3069020"/>
             <a:ext cx="8293100" cy="2552701"/>
-          </a:xfrm>
-          <a:prstGeom prst="rect">
-            <a:avLst/>
-          </a:prstGeom>
-          <a:ln w="12700">
-            <a:miter lim="400000"/>
-          </a:ln>
-        </p:spPr>
-      </p:pic>
-      <p:pic>
-        <p:nvPicPr>
-          <p:cNvPr id="402" name="contacts-4-keyerror.png" descr="contacts-4-keyerror.png"/>
-          <p:cNvPicPr>
-            <a:picLocks noChangeAspect="1"/>
-          </p:cNvPicPr>
-          <p:nvPr/>
-        </p:nvPicPr>
-        <p:blipFill>
-          <a:blip r:embed="rId4">
-            <a:extLst/>
-          </a:blip>
-          <a:stretch>
-            <a:fillRect/>
-          </a:stretch>
-        </p:blipFill>
-        <p:spPr>
-          <a:xfrm>
-            <a:off x="10409" y="4213840"/>
-            <a:ext cx="9144001" cy="1379221"/>
           </a:xfrm>
           <a:prstGeom prst="rect">
             <a:avLst/>
@@ -17892,7 +18024,7 @@
       </p:grpSpPr>
       <p:sp>
         <p:nvSpPr>
-          <p:cNvPr id="406" name="When you get a KeyError, your program stops. That's not always what you want."/>
+          <p:cNvPr id="405" name="Body"/>
           <p:cNvSpPr txBox="1"/>
           <p:nvPr>
             <p:ph type="body" idx="1"/>
@@ -17907,27 +18039,22 @@
           <a:bodyPr>
             <a:normAutofit fontScale="100000" lnSpcReduction="0"/>
           </a:bodyPr>
-          <a:lstStyle>
-            <a:lvl1pPr marL="0" indent="0">
+          <a:lstStyle/>
+          <a:p>
+            <a:pPr marL="0" indent="0">
               <a:spcBef>
                 <a:spcPts val="600"/>
               </a:spcBef>
               <a:buSzTx/>
               <a:buFontTx/>
               <a:buNone/>
-            </a:lvl1pPr>
-          </a:lstStyle>
-          <a:p>
-            <a:pPr/>
-            <a:r>
-              <a:t>When you get a KeyError, your program stops. That's not always what you want.</a:t>
-            </a:r>
-          </a:p>
-        </p:txBody>
-      </p:sp>
-      <p:sp>
-        <p:nvSpPr>
-          <p:cNvPr id="407" name="use .get( ) to keep going"/>
+            </a:pPr>
+          </a:p>
+        </p:txBody>
+      </p:sp>
+      <p:sp>
+        <p:nvSpPr>
+          <p:cNvPr id="406" name="I don't have that key"/>
           <p:cNvSpPr/>
           <p:nvPr/>
         </p:nvSpPr>
@@ -17973,14 +18100,14 @@
           <a:p>
             <a:pPr/>
             <a:r>
-              <a:t>use .get( ) to keep going</a:t>
-            </a:r>
-          </a:p>
-        </p:txBody>
-      </p:sp>
-      <p:sp>
-        <p:nvSpPr>
-          <p:cNvPr id="408" name="Slide Number"/>
+              <a:t>I don't have that key</a:t>
+            </a:r>
+          </a:p>
+        </p:txBody>
+      </p:sp>
+      <p:sp>
+        <p:nvSpPr>
+          <p:cNvPr id="407" name="Slide Number"/>
           <p:cNvSpPr txBox="1"/>
           <p:nvPr>
             <p:ph type="sldNum" sz="quarter" idx="2"/>
@@ -18011,7 +18138,7 @@
       </p:sp>
       <p:pic>
         <p:nvPicPr>
-          <p:cNvPr id="409" name="contacts-5.png" descr="contacts-5.png"/>
+          <p:cNvPr id="408" name="contacts-3.png" descr="contacts-3.png"/>
           <p:cNvPicPr>
             <a:picLocks noChangeAspect="1"/>
           </p:cNvPicPr>
@@ -18027,8 +18154,37 @@
         </p:blipFill>
         <p:spPr>
           <a:xfrm>
-            <a:off x="-1" y="2735641"/>
-            <a:ext cx="9144001" cy="2539571"/>
+            <a:off x="425450" y="1280619"/>
+            <a:ext cx="8293100" cy="2552701"/>
+          </a:xfrm>
+          <a:prstGeom prst="rect">
+            <a:avLst/>
+          </a:prstGeom>
+          <a:ln w="12700">
+            <a:miter lim="400000"/>
+          </a:ln>
+        </p:spPr>
+      </p:pic>
+      <p:pic>
+        <p:nvPicPr>
+          <p:cNvPr id="409" name="contacts-4-keyerror.png" descr="contacts-4-keyerror.png"/>
+          <p:cNvPicPr>
+            <a:picLocks noChangeAspect="1"/>
+          </p:cNvPicPr>
+          <p:nvPr/>
+        </p:nvPicPr>
+        <p:blipFill>
+          <a:blip r:embed="rId4">
+            <a:extLst/>
+          </a:blip>
+          <a:stretch>
+            <a:fillRect/>
+          </a:stretch>
+        </p:blipFill>
+        <p:spPr>
+          <a:xfrm>
+            <a:off x="10409" y="4213840"/>
+            <a:ext cx="9144001" cy="1379221"/>
           </a:xfrm>
           <a:prstGeom prst="rect">
             <a:avLst/>
@@ -18066,7 +18222,7 @@
       </p:grpSpPr>
       <p:sp>
         <p:nvSpPr>
-          <p:cNvPr id="413" name="Save these exercise instructions to your computer,  open it in Sublime/IDLE and work from there!…"/>
+          <p:cNvPr id="413" name="When you get a KeyError, your program stops. That's not always what you want."/>
           <p:cNvSpPr txBox="1"/>
           <p:nvPr>
             <p:ph type="body" idx="1"/>
@@ -18081,136 +18237,27 @@
           <a:bodyPr>
             <a:normAutofit fontScale="100000" lnSpcReduction="0"/>
           </a:bodyPr>
-          <a:lstStyle/>
-          <a:p>
-            <a:pPr marL="0" indent="0" defTabSz="315468">
-              <a:spcBef>
-                <a:spcPts val="400"/>
+          <a:lstStyle>
+            <a:lvl1pPr marL="0" indent="0">
+              <a:spcBef>
+                <a:spcPts val="600"/>
               </a:spcBef>
               <a:buSzTx/>
               <a:buFontTx/>
               <a:buNone/>
-              <a:defRPr sz="2208"/>
-            </a:pPr>
-            <a:r>
-              <a:t>Save these </a:t>
-            </a:r>
-            <a:r>
-              <a:rPr b="1" u="sng">
-                <a:solidFill>
-                  <a:srgbClr val="0000FF"/>
-                </a:solidFill>
-                <a:uFill>
-                  <a:solidFill>
-                    <a:srgbClr val="0000FF"/>
-                  </a:solidFill>
-                </a:uFill>
-                <a:hlinkClick r:id="rId2" invalidUrl="" action="" tgtFrame="" tooltip="" history="1" highlightClick="0" endSnd="0"/>
-              </a:rPr>
-              <a:t>exercise instructions</a:t>
-            </a:r>
-            <a:r>
-              <a:t> to your computer,  open it in Sublime/IDLE and work from there!</a:t>
-            </a:r>
-          </a:p>
-          <a:p>
-            <a:pPr marL="0" indent="0" defTabSz="315468">
-              <a:spcBef>
-                <a:spcPts val="400"/>
-              </a:spcBef>
-              <a:buSzTx/>
-              <a:buFontTx/>
-              <a:buNone/>
-              <a:defRPr sz="2208"/>
-            </a:pPr>
-          </a:p>
-          <a:p>
-            <a:pPr marL="0" indent="0" defTabSz="315468">
-              <a:spcBef>
-                <a:spcPts val="400"/>
-              </a:spcBef>
-              <a:buSzTx/>
-              <a:buFontTx/>
-              <a:buNone/>
-              <a:defRPr sz="2208"/>
-            </a:pPr>
-            <a:r>
-              <a:rPr b="1"/>
-              <a:t>Just do #1 for now.</a:t>
-            </a:r>
-            <a:r>
-              <a:t> Once we've added items to our dictionary, we'll see how to loop through it in the next slides.</a:t>
-            </a:r>
-          </a:p>
-          <a:p>
-            <a:pPr marL="0" indent="0" defTabSz="315468">
-              <a:spcBef>
-                <a:spcPts val="800"/>
-              </a:spcBef>
-              <a:buSzTx/>
-              <a:buFontTx/>
-              <a:buNone/>
-              <a:defRPr b="1" sz="2208">
-                <a:latin typeface="Courier New"/>
-                <a:ea typeface="Courier New"/>
-                <a:cs typeface="Courier New"/>
-                <a:sym typeface="Courier New"/>
-              </a:defRPr>
-            </a:pPr>
-          </a:p>
-          <a:p>
-            <a:pPr marL="0" indent="0" defTabSz="315468">
-              <a:spcBef>
-                <a:spcPts val="800"/>
-              </a:spcBef>
-              <a:buSzTx/>
-              <a:buFontTx/>
-              <a:buNone/>
-              <a:defRPr b="1" sz="2208">
-                <a:latin typeface="Courier New"/>
-                <a:ea typeface="Courier New"/>
-                <a:cs typeface="Courier New"/>
-                <a:sym typeface="Courier New"/>
-              </a:defRPr>
-            </a:pPr>
-          </a:p>
-          <a:p>
-            <a:pPr marL="0" indent="0" defTabSz="315468">
-              <a:spcBef>
-                <a:spcPts val="800"/>
-              </a:spcBef>
-              <a:buSzTx/>
-              <a:buFontTx/>
-              <a:buNone/>
-              <a:defRPr b="1" sz="2208">
-                <a:latin typeface="Courier New"/>
-                <a:ea typeface="Courier New"/>
-                <a:cs typeface="Courier New"/>
-                <a:sym typeface="Courier New"/>
-              </a:defRPr>
-            </a:pPr>
-          </a:p>
-          <a:p>
-            <a:pPr marL="0" indent="0" defTabSz="315468">
-              <a:spcBef>
-                <a:spcPts val="800"/>
-              </a:spcBef>
-              <a:buSzTx/>
-              <a:buFontTx/>
-              <a:buNone/>
-              <a:defRPr b="1" sz="2208">
-                <a:latin typeface="Courier New"/>
-                <a:ea typeface="Courier New"/>
-                <a:cs typeface="Courier New"/>
-                <a:sym typeface="Courier New"/>
-              </a:defRPr>
-            </a:pPr>
-          </a:p>
-        </p:txBody>
-      </p:sp>
-      <p:sp>
-        <p:nvSpPr>
-          <p:cNvPr id="414" name="exercise"/>
+            </a:lvl1pPr>
+          </a:lstStyle>
+          <a:p>
+            <a:pPr/>
+            <a:r>
+              <a:t>When you get a KeyError, your program stops. That's not always what you want.</a:t>
+            </a:r>
+          </a:p>
+        </p:txBody>
+      </p:sp>
+      <p:sp>
+        <p:nvSpPr>
+          <p:cNvPr id="414" name="use .get( ) to keep going"/>
           <p:cNvSpPr/>
           <p:nvPr/>
         </p:nvSpPr>
@@ -18256,7 +18303,7 @@
           <a:p>
             <a:pPr/>
             <a:r>
-              <a:t>exercise</a:t>
+              <a:t>use .get( ) to keep going</a:t>
             </a:r>
           </a:p>
         </p:txBody>
@@ -18294,7 +18341,7 @@
       </p:sp>
       <p:pic>
         <p:nvPicPr>
-          <p:cNvPr id="416" name="contacts-6.png" descr="contacts-6.png"/>
+          <p:cNvPr id="416" name="contacts-5.png" descr="contacts-5.png"/>
           <p:cNvPicPr>
             <a:picLocks noChangeAspect="1"/>
           </p:cNvPicPr>
@@ -18310,8 +18357,8 @@
         </p:blipFill>
         <p:spPr>
           <a:xfrm>
-            <a:off x="1352339" y="3350729"/>
-            <a:ext cx="6439322" cy="2359615"/>
+            <a:off x="-1" y="2735641"/>
+            <a:ext cx="9144001" cy="2539571"/>
           </a:xfrm>
           <a:prstGeom prst="rect">
             <a:avLst/>
@@ -18349,7 +18396,7 @@
       </p:grpSpPr>
       <p:sp>
         <p:nvSpPr>
-          <p:cNvPr id="418" name="Let's loop through the contacts list we just created.  We have a handful of ways to do this.…"/>
+          <p:cNvPr id="420" name="Save these exercise instructions to your computer,  open it in Sublime/IDLE and work from there!…"/>
           <p:cNvSpPr txBox="1"/>
           <p:nvPr>
             <p:ph type="body" idx="1"/>
@@ -18366,56 +18413,134 @@
           </a:bodyPr>
           <a:lstStyle/>
           <a:p>
-            <a:pPr marL="0" indent="0">
-              <a:spcBef>
-                <a:spcPts val="600"/>
+            <a:pPr marL="0" indent="0" defTabSz="315468">
+              <a:spcBef>
+                <a:spcPts val="400"/>
               </a:spcBef>
               <a:buSzTx/>
               <a:buFontTx/>
               <a:buNone/>
-            </a:pPr>
-            <a:r>
-              <a:t>Let's loop through the contacts list we just created.  We have a handful of ways to do this.</a:t>
-            </a:r>
-          </a:p>
-          <a:p>
-            <a:pPr marL="0" indent="0">
-              <a:spcBef>
-                <a:spcPts val="600"/>
+              <a:defRPr sz="2208"/>
+            </a:pPr>
+            <a:r>
+              <a:t>Save these </a:t>
+            </a:r>
+            <a:r>
+              <a:rPr b="1" u="sng">
+                <a:solidFill>
+                  <a:srgbClr val="0000FF"/>
+                </a:solidFill>
+                <a:uFill>
+                  <a:solidFill>
+                    <a:srgbClr val="0000FF"/>
+                  </a:solidFill>
+                </a:uFill>
+                <a:hlinkClick r:id="rId2" invalidUrl="" action="" tgtFrame="" tooltip="" history="1" highlightClick="0" endSnd="0"/>
+              </a:rPr>
+              <a:t>exercise instructions</a:t>
+            </a:r>
+            <a:r>
+              <a:t> to your computer,  open it in Sublime/IDLE and work from there!</a:t>
+            </a:r>
+          </a:p>
+          <a:p>
+            <a:pPr marL="0" indent="0" defTabSz="315468">
+              <a:spcBef>
+                <a:spcPts val="400"/>
               </a:spcBef>
               <a:buSzTx/>
               <a:buFontTx/>
               <a:buNone/>
-            </a:pPr>
-          </a:p>
-          <a:p>
-            <a:pPr marL="228600" indent="-228600">
-              <a:spcBef>
-                <a:spcPts val="600"/>
-              </a:spcBef>
-              <a:buAutoNum type="arabicPeriod" startAt="1"/>
-            </a:pPr>
-            <a:r>
-              <a:t>  Looping by keys (Shannon, Hear Me Code, everyone else at your table…)</a:t>
-            </a:r>
-            <a:br/>
-          </a:p>
-          <a:p>
-            <a:pPr marL="228600" indent="-228600">
-              <a:spcBef>
-                <a:spcPts val="600"/>
-              </a:spcBef>
-              <a:buAutoNum type="arabicPeriod" startAt="1"/>
-            </a:pPr>
-            <a:r>
-              <a:t> Looping by key / value pairs together</a:t>
-            </a:r>
-          </a:p>
-        </p:txBody>
-      </p:sp>
-      <p:sp>
-        <p:nvSpPr>
-          <p:cNvPr id="419" name="looping through a dictionary"/>
+              <a:defRPr sz="2208"/>
+            </a:pPr>
+          </a:p>
+          <a:p>
+            <a:pPr marL="0" indent="0" defTabSz="315468">
+              <a:spcBef>
+                <a:spcPts val="400"/>
+              </a:spcBef>
+              <a:buSzTx/>
+              <a:buFontTx/>
+              <a:buNone/>
+              <a:defRPr sz="2208"/>
+            </a:pPr>
+            <a:r>
+              <a:rPr b="1"/>
+              <a:t>Just do #1 for now.</a:t>
+            </a:r>
+            <a:r>
+              <a:t> Once we've added items to our dictionary, we'll see how to loop through it in the next slides.</a:t>
+            </a:r>
+          </a:p>
+          <a:p>
+            <a:pPr marL="0" indent="0" defTabSz="315468">
+              <a:spcBef>
+                <a:spcPts val="800"/>
+              </a:spcBef>
+              <a:buSzTx/>
+              <a:buFontTx/>
+              <a:buNone/>
+              <a:defRPr b="1" sz="2208">
+                <a:latin typeface="Courier New"/>
+                <a:ea typeface="Courier New"/>
+                <a:cs typeface="Courier New"/>
+                <a:sym typeface="Courier New"/>
+              </a:defRPr>
+            </a:pPr>
+          </a:p>
+          <a:p>
+            <a:pPr marL="0" indent="0" defTabSz="315468">
+              <a:spcBef>
+                <a:spcPts val="800"/>
+              </a:spcBef>
+              <a:buSzTx/>
+              <a:buFontTx/>
+              <a:buNone/>
+              <a:defRPr b="1" sz="2208">
+                <a:latin typeface="Courier New"/>
+                <a:ea typeface="Courier New"/>
+                <a:cs typeface="Courier New"/>
+                <a:sym typeface="Courier New"/>
+              </a:defRPr>
+            </a:pPr>
+          </a:p>
+          <a:p>
+            <a:pPr marL="0" indent="0" defTabSz="315468">
+              <a:spcBef>
+                <a:spcPts val="800"/>
+              </a:spcBef>
+              <a:buSzTx/>
+              <a:buFontTx/>
+              <a:buNone/>
+              <a:defRPr b="1" sz="2208">
+                <a:latin typeface="Courier New"/>
+                <a:ea typeface="Courier New"/>
+                <a:cs typeface="Courier New"/>
+                <a:sym typeface="Courier New"/>
+              </a:defRPr>
+            </a:pPr>
+          </a:p>
+          <a:p>
+            <a:pPr marL="0" indent="0" defTabSz="315468">
+              <a:spcBef>
+                <a:spcPts val="800"/>
+              </a:spcBef>
+              <a:buSzTx/>
+              <a:buFontTx/>
+              <a:buNone/>
+              <a:defRPr b="1" sz="2208">
+                <a:latin typeface="Courier New"/>
+                <a:ea typeface="Courier New"/>
+                <a:cs typeface="Courier New"/>
+                <a:sym typeface="Courier New"/>
+              </a:defRPr>
+            </a:pPr>
+          </a:p>
+        </p:txBody>
+      </p:sp>
+      <p:sp>
+        <p:nvSpPr>
+          <p:cNvPr id="421" name="exercise"/>
           <p:cNvSpPr/>
           <p:nvPr/>
         </p:nvSpPr>
@@ -18446,11 +18571,11 @@
             <a:normAutofit fontScale="100000" lnSpcReduction="0"/>
           </a:bodyPr>
           <a:lstStyle>
-            <a:lvl1pPr defTabSz="448055">
+            <a:lvl1pPr>
               <a:spcBef>
                 <a:spcPts val="900"/>
               </a:spcBef>
-              <a:defRPr cap="all" sz="3920">
+              <a:defRPr cap="all" sz="4000">
                 <a:latin typeface="+mn-lt"/>
                 <a:ea typeface="+mn-ea"/>
                 <a:cs typeface="+mn-cs"/>
@@ -18461,14 +18586,14 @@
           <a:p>
             <a:pPr/>
             <a:r>
-              <a:t>looping through a dictionary</a:t>
-            </a:r>
-          </a:p>
-        </p:txBody>
-      </p:sp>
-      <p:sp>
-        <p:nvSpPr>
-          <p:cNvPr id="420" name="Slide Number"/>
+              <a:t>exercise</a:t>
+            </a:r>
+          </a:p>
+        </p:txBody>
+      </p:sp>
+      <p:sp>
+        <p:nvSpPr>
+          <p:cNvPr id="422" name="Slide Number"/>
           <p:cNvSpPr txBox="1"/>
           <p:nvPr>
             <p:ph type="sldNum" sz="quarter" idx="2"/>
@@ -18497,6 +18622,35 @@
           </a:p>
         </p:txBody>
       </p:sp>
+      <p:pic>
+        <p:nvPicPr>
+          <p:cNvPr id="423" name="contacts-6.png" descr="contacts-6.png"/>
+          <p:cNvPicPr>
+            <a:picLocks noChangeAspect="1"/>
+          </p:cNvPicPr>
+          <p:nvPr/>
+        </p:nvPicPr>
+        <p:blipFill>
+          <a:blip r:embed="rId3">
+            <a:extLst/>
+          </a:blip>
+          <a:stretch>
+            <a:fillRect/>
+          </a:stretch>
+        </p:blipFill>
+        <p:spPr>
+          <a:xfrm>
+            <a:off x="1352339" y="3350729"/>
+            <a:ext cx="6439322" cy="2359615"/>
+          </a:xfrm>
+          <a:prstGeom prst="rect">
+            <a:avLst/>
+          </a:prstGeom>
+          <a:ln w="12700">
+            <a:miter lim="400000"/>
+          </a:ln>
+        </p:spPr>
+      </p:pic>
     </p:spTree>
   </p:cSld>
   <p:clrMapOvr>
@@ -18525,7 +18679,7 @@
       </p:grpSpPr>
       <p:sp>
         <p:nvSpPr>
-          <p:cNvPr id="422" name=".keys() creates a list of all of the keys in your dictionary.…"/>
+          <p:cNvPr id="425" name="Let's loop through the contacts list we just created.  We have a handful of ways to do this.…"/>
           <p:cNvSpPr txBox="1"/>
           <p:nvPr>
             <p:ph type="body" idx="1"/>
@@ -18549,40 +18703,10 @@
               <a:buSzTx/>
               <a:buFontTx/>
               <a:buNone/>
-              <a:defRPr>
-                <a:latin typeface="Gill Sans Light"/>
-                <a:ea typeface="Gill Sans Light"/>
-                <a:cs typeface="Gill Sans Light"/>
-                <a:sym typeface="Gill Sans Light"/>
-              </a:defRPr>
-            </a:pPr>
-            <a:r>
-              <a:rPr b="1">
-                <a:latin typeface="Courier New"/>
-                <a:ea typeface="Courier New"/>
-                <a:cs typeface="Courier New"/>
-                <a:sym typeface="Courier New"/>
-              </a:rPr>
-              <a:t>.keys()</a:t>
-            </a:r>
-            <a:r>
-              <a:t> </a:t>
-            </a:r>
-            <a:r>
-              <a:rPr>
-                <a:latin typeface="+mn-lt"/>
-                <a:ea typeface="+mn-ea"/>
-                <a:cs typeface="+mn-cs"/>
-                <a:sym typeface="Century Gothic"/>
-              </a:rPr>
-              <a:t>creates a list of all of the keys in your dictionary.</a:t>
-            </a:r>
-            <a:endParaRPr>
-              <a:latin typeface="+mn-lt"/>
-              <a:ea typeface="+mn-ea"/>
-              <a:cs typeface="+mn-cs"/>
-              <a:sym typeface="Century Gothic"/>
-            </a:endParaRPr>
+            </a:pPr>
+            <a:r>
+              <a:t>Let's loop through the contacts list we just created.  We have a handful of ways to do this.</a:t>
+            </a:r>
           </a:p>
           <a:p>
             <a:pPr marL="0" indent="0">
@@ -18595,40 +18719,33 @@
             </a:pPr>
           </a:p>
           <a:p>
-            <a:pPr marL="0" indent="0">
+            <a:pPr marL="228600" indent="-228600">
               <a:spcBef>
                 <a:spcPts val="600"/>
               </a:spcBef>
-              <a:buSzTx/>
-              <a:buFontTx/>
-              <a:buNone/>
-            </a:pPr>
-          </a:p>
-          <a:p>
-            <a:pPr marL="0" indent="0">
+              <a:buAutoNum type="arabicPeriod" startAt="1"/>
+            </a:pPr>
+            <a:r>
+              <a:t>  Looping by keys (Shannon, Hear Me Code, everyone else at your table…)</a:t>
+            </a:r>
+            <a:br/>
+          </a:p>
+          <a:p>
+            <a:pPr marL="228600" indent="-228600">
               <a:spcBef>
                 <a:spcPts val="600"/>
               </a:spcBef>
-              <a:buSzTx/>
-              <a:buFontTx/>
-              <a:buNone/>
-            </a:pPr>
-            <a:r>
-              <a:t>Because </a:t>
-            </a:r>
-            <a:r>
-              <a:rPr b="1"/>
-              <a:t>dictionaries are unordered,</a:t>
-            </a:r>
-            <a:r>
-              <a:t> you might get keys in a different order than you see below, or a different order than you put them in.  That's okay.</a:t>
-            </a:r>
-          </a:p>
-        </p:txBody>
-      </p:sp>
-      <p:sp>
-        <p:nvSpPr>
-          <p:cNvPr id="423" name=".keys( ) creates a list"/>
+              <a:buAutoNum type="arabicPeriod" startAt="1"/>
+            </a:pPr>
+            <a:r>
+              <a:t> Looping by key / value pairs together</a:t>
+            </a:r>
+          </a:p>
+        </p:txBody>
+      </p:sp>
+      <p:sp>
+        <p:nvSpPr>
+          <p:cNvPr id="426" name="looping through a dictionary"/>
           <p:cNvSpPr/>
           <p:nvPr/>
         </p:nvSpPr>
@@ -18659,11 +18776,11 @@
             <a:normAutofit fontScale="100000" lnSpcReduction="0"/>
           </a:bodyPr>
           <a:lstStyle>
-            <a:lvl1pPr>
+            <a:lvl1pPr defTabSz="448055">
               <a:spcBef>
                 <a:spcPts val="900"/>
               </a:spcBef>
-              <a:defRPr cap="all" sz="4000">
+              <a:defRPr cap="all" sz="3920">
                 <a:latin typeface="+mn-lt"/>
                 <a:ea typeface="+mn-ea"/>
                 <a:cs typeface="+mn-cs"/>
@@ -18674,14 +18791,14 @@
           <a:p>
             <a:pPr/>
             <a:r>
-              <a:t>.keys( ) creates a list</a:t>
-            </a:r>
-          </a:p>
-        </p:txBody>
-      </p:sp>
-      <p:sp>
-        <p:nvSpPr>
-          <p:cNvPr id="424" name="Slide Number"/>
+              <a:t>looping through a dictionary</a:t>
+            </a:r>
+          </a:p>
+        </p:txBody>
+      </p:sp>
+      <p:sp>
+        <p:nvSpPr>
+          <p:cNvPr id="427" name="Slide Number"/>
           <p:cNvSpPr txBox="1"/>
           <p:nvPr>
             <p:ph type="sldNum" sz="quarter" idx="2"/>
@@ -18710,35 +18827,6 @@
           </a:p>
         </p:txBody>
       </p:sp>
-      <p:pic>
-        <p:nvPicPr>
-          <p:cNvPr id="425" name="contacts-7.png" descr="contacts-7.png"/>
-          <p:cNvPicPr>
-            <a:picLocks noChangeAspect="1"/>
-          </p:cNvPicPr>
-          <p:nvPr/>
-        </p:nvPicPr>
-        <p:blipFill>
-          <a:blip r:embed="rId2">
-            <a:extLst/>
-          </a:blip>
-          <a:stretch>
-            <a:fillRect/>
-          </a:stretch>
-        </p:blipFill>
-        <p:spPr>
-          <a:xfrm>
-            <a:off x="1117600" y="2534635"/>
-            <a:ext cx="6908800" cy="990601"/>
-          </a:xfrm>
-          <a:prstGeom prst="rect">
-            <a:avLst/>
-          </a:prstGeom>
-          <a:ln w="12700">
-            <a:miter lim="400000"/>
-          </a:ln>
-        </p:spPr>
-      </p:pic>
     </p:spTree>
   </p:cSld>
   <p:clrMapOvr>
@@ -18767,7 +18855,7 @@
       </p:grpSpPr>
       <p:sp>
         <p:nvSpPr>
-          <p:cNvPr id="427" name=".keys() will create a list of all of the keys in your dictionary.…"/>
+          <p:cNvPr id="429" name=".keys() creates a list of all of the keys in your dictionary.…"/>
           <p:cNvSpPr txBox="1"/>
           <p:nvPr>
             <p:ph type="body" idx="1"/>
@@ -18817,7 +18905,7 @@
                 <a:cs typeface="+mn-cs"/>
                 <a:sym typeface="Century Gothic"/>
               </a:rPr>
-              <a:t>will create a list of all of the keys in your dictionary.</a:t>
+              <a:t>creates a list of all of the keys in your dictionary.</a:t>
             </a:r>
             <a:endParaRPr>
               <a:latin typeface="+mn-lt"/>
@@ -18856,14 +18944,21 @@
               <a:buNone/>
             </a:pPr>
             <a:r>
-              <a:t>If you have a list, you can loop over it!</a:t>
-            </a:r>
-          </a:p>
-        </p:txBody>
-      </p:sp>
-      <p:sp>
-        <p:nvSpPr>
-          <p:cNvPr id="428" name="we can loop over a list!"/>
+              <a:t>Because </a:t>
+            </a:r>
+            <a:r>
+              <a:rPr b="1"/>
+              <a:t>dictionaries are unordered,</a:t>
+            </a:r>
+            <a:r>
+              <a:t> you might get keys in a different order than you see below, or a different order than you put them in.  That's okay.</a:t>
+            </a:r>
+          </a:p>
+        </p:txBody>
+      </p:sp>
+      <p:sp>
+        <p:nvSpPr>
+          <p:cNvPr id="430" name=".keys( ) creates a list"/>
           <p:cNvSpPr/>
           <p:nvPr/>
         </p:nvSpPr>
@@ -18909,14 +19004,14 @@
           <a:p>
             <a:pPr/>
             <a:r>
-              <a:t>we can loop over a list!</a:t>
-            </a:r>
-          </a:p>
-        </p:txBody>
-      </p:sp>
-      <p:sp>
-        <p:nvSpPr>
-          <p:cNvPr id="429" name="Slide Number"/>
+              <a:t>.keys( ) creates a list</a:t>
+            </a:r>
+          </a:p>
+        </p:txBody>
+      </p:sp>
+      <p:sp>
+        <p:nvSpPr>
+          <p:cNvPr id="431" name="Slide Number"/>
           <p:cNvSpPr txBox="1"/>
           <p:nvPr>
             <p:ph type="sldNum" sz="quarter" idx="2"/>
@@ -18947,7 +19042,7 @@
       </p:sp>
       <p:pic>
         <p:nvPicPr>
-          <p:cNvPr id="430" name="contacts-7.png" descr="contacts-7.png"/>
+          <p:cNvPr id="432" name="contacts-7.png" descr="contacts-7.png"/>
           <p:cNvPicPr>
             <a:picLocks noChangeAspect="1"/>
           </p:cNvPicPr>
@@ -18963,37 +19058,8 @@
         </p:blipFill>
         <p:spPr>
           <a:xfrm>
-            <a:off x="1117600" y="2561162"/>
+            <a:off x="1117600" y="2534635"/>
             <a:ext cx="6908800" cy="990601"/>
-          </a:xfrm>
-          <a:prstGeom prst="rect">
-            <a:avLst/>
-          </a:prstGeom>
-          <a:ln w="12700">
-            <a:miter lim="400000"/>
-          </a:ln>
-        </p:spPr>
-      </p:pic>
-      <p:pic>
-        <p:nvPicPr>
-          <p:cNvPr id="431" name="contacts-8.png" descr="contacts-8.png"/>
-          <p:cNvPicPr>
-            <a:picLocks noChangeAspect="1"/>
-          </p:cNvPicPr>
-          <p:nvPr/>
-        </p:nvPicPr>
-        <p:blipFill>
-          <a:blip r:embed="rId3">
-            <a:extLst/>
-          </a:blip>
-          <a:stretch>
-            <a:fillRect/>
-          </a:stretch>
-        </p:blipFill>
-        <p:spPr>
-          <a:xfrm>
-            <a:off x="1653318" y="4196934"/>
-            <a:ext cx="5837364" cy="1677278"/>
           </a:xfrm>
           <a:prstGeom prst="rect">
             <a:avLst/>
@@ -19031,7 +19097,7 @@
       </p:grpSpPr>
       <p:sp>
         <p:nvSpPr>
-          <p:cNvPr id="433" name=".keys() will create a list of all of the keys in your dictionary.…"/>
+          <p:cNvPr id="434" name=".keys() will create a list of all of the keys in your dictionary.…"/>
           <p:cNvSpPr txBox="1"/>
           <p:nvPr>
             <p:ph type="body" idx="1"/>
@@ -19127,7 +19193,7 @@
       </p:sp>
       <p:sp>
         <p:nvSpPr>
-          <p:cNvPr id="434" name="we can loop over a list!"/>
+          <p:cNvPr id="435" name="we can loop over a list!"/>
           <p:cNvSpPr/>
           <p:nvPr/>
         </p:nvSpPr>
@@ -19180,7 +19246,7 @@
       </p:sp>
       <p:sp>
         <p:nvSpPr>
-          <p:cNvPr id="435" name="Slide Number"/>
+          <p:cNvPr id="436" name="Slide Number"/>
           <p:cNvSpPr txBox="1"/>
           <p:nvPr>
             <p:ph type="sldNum" sz="quarter" idx="2"/>
@@ -19211,7 +19277,36 @@
       </p:sp>
       <p:pic>
         <p:nvPicPr>
-          <p:cNvPr id="436" name="contacts-7.png" descr="contacts-7.png"/>
+          <p:cNvPr id="437" name="contacts-7.png" descr="contacts-7.png"/>
+          <p:cNvPicPr>
+            <a:picLocks noChangeAspect="1"/>
+          </p:cNvPicPr>
+          <p:nvPr/>
+        </p:nvPicPr>
+        <p:blipFill>
+          <a:blip r:embed="rId2">
+            <a:extLst/>
+          </a:blip>
+          <a:stretch>
+            <a:fillRect/>
+          </a:stretch>
+        </p:blipFill>
+        <p:spPr>
+          <a:xfrm>
+            <a:off x="1117600" y="2561162"/>
+            <a:ext cx="6908800" cy="990601"/>
+          </a:xfrm>
+          <a:prstGeom prst="rect">
+            <a:avLst/>
+          </a:prstGeom>
+          <a:ln w="12700">
+            <a:miter lim="400000"/>
+          </a:ln>
+        </p:spPr>
+      </p:pic>
+      <p:pic>
+        <p:nvPicPr>
+          <p:cNvPr id="438" name="contacts-8.png" descr="contacts-8.png"/>
           <p:cNvPicPr>
             <a:picLocks noChangeAspect="1"/>
           </p:cNvPicPr>
@@ -19227,37 +19322,8 @@
         </p:blipFill>
         <p:spPr>
           <a:xfrm>
-            <a:off x="1117600" y="2561162"/>
-            <a:ext cx="6908800" cy="990601"/>
-          </a:xfrm>
-          <a:prstGeom prst="rect">
-            <a:avLst/>
-          </a:prstGeom>
-          <a:ln w="12700">
-            <a:miter lim="400000"/>
-          </a:ln>
-        </p:spPr>
-      </p:pic>
-      <p:pic>
-        <p:nvPicPr>
-          <p:cNvPr id="437" name="contacts-9.png" descr="contacts-9.png"/>
-          <p:cNvPicPr>
-            <a:picLocks noChangeAspect="1"/>
-          </p:cNvPicPr>
-          <p:nvPr/>
-        </p:nvPicPr>
-        <p:blipFill>
-          <a:blip r:embed="rId4">
-            <a:extLst/>
-          </a:blip>
-          <a:stretch>
-            <a:fillRect/>
-          </a:stretch>
-        </p:blipFill>
-        <p:spPr>
-          <a:xfrm>
-            <a:off x="-1" y="4382647"/>
-            <a:ext cx="9144001" cy="1204252"/>
+            <a:off x="1653318" y="4196934"/>
+            <a:ext cx="5837364" cy="1677278"/>
           </a:xfrm>
           <a:prstGeom prst="rect">
             <a:avLst/>
@@ -19480,7 +19546,7 @@
       </p:grpSpPr>
       <p:sp>
         <p:nvSpPr>
-          <p:cNvPr id="441" name="Dictionaries themselves have no ordering, but we can order their keys:…"/>
+          <p:cNvPr id="440" name=".keys() will create a list of all of the keys in your dictionary.…"/>
           <p:cNvSpPr txBox="1"/>
           <p:nvPr>
             <p:ph type="body" idx="1"/>
@@ -19497,120 +19563,86 @@
           </a:bodyPr>
           <a:lstStyle/>
           <a:p>
-            <a:pPr marL="0" indent="0" defTabSz="429768">
+            <a:pPr marL="0" indent="0">
               <a:spcBef>
                 <a:spcPts val="600"/>
               </a:spcBef>
               <a:buSzTx/>
               <a:buFontTx/>
               <a:buNone/>
-              <a:defRPr sz="3008"/>
-            </a:pPr>
-            <a:r>
-              <a:rPr b="1"/>
-              <a:t>Dictionaries themselves have no ordering</a:t>
-            </a:r>
-            <a:r>
-              <a:t>, but we can order their keys:</a:t>
-            </a:r>
-          </a:p>
-          <a:p>
-            <a:pPr marL="0" indent="0" defTabSz="429768">
-              <a:spcBef>
-                <a:spcPts val="1100"/>
-              </a:spcBef>
-              <a:buSzTx/>
-              <a:buFontTx/>
-              <a:buNone/>
-              <a:defRPr b="1" sz="3008">
+              <a:defRPr>
+                <a:latin typeface="Gill Sans Light"/>
+                <a:ea typeface="Gill Sans Light"/>
+                <a:cs typeface="Gill Sans Light"/>
+                <a:sym typeface="Gill Sans Light"/>
+              </a:defRPr>
+            </a:pPr>
+            <a:r>
+              <a:rPr b="1">
                 <a:latin typeface="Courier New"/>
                 <a:ea typeface="Courier New"/>
                 <a:cs typeface="Courier New"/>
                 <a:sym typeface="Courier New"/>
-              </a:defRPr>
-            </a:pPr>
-          </a:p>
-          <a:p>
-            <a:pPr marL="0" indent="0" defTabSz="429768">
-              <a:spcBef>
-                <a:spcPts val="1100"/>
-              </a:spcBef>
-              <a:buSzTx/>
-              <a:buFontTx/>
-              <a:buNone/>
-              <a:defRPr b="1" sz="3008">
-                <a:latin typeface="Courier New"/>
-                <a:ea typeface="Courier New"/>
-                <a:cs typeface="Courier New"/>
-                <a:sym typeface="Courier New"/>
-              </a:defRPr>
-            </a:pPr>
-          </a:p>
-          <a:p>
-            <a:pPr marL="0" indent="0" defTabSz="429768">
-              <a:spcBef>
-                <a:spcPts val="1100"/>
-              </a:spcBef>
-              <a:buSzTx/>
-              <a:buFontTx/>
-              <a:buNone/>
-              <a:defRPr b="1" sz="3008">
-                <a:latin typeface="Courier New"/>
-                <a:ea typeface="Courier New"/>
-                <a:cs typeface="Courier New"/>
-                <a:sym typeface="Courier New"/>
-              </a:defRPr>
-            </a:pPr>
-          </a:p>
-          <a:p>
-            <a:pPr marL="0" indent="0" defTabSz="429768">
-              <a:spcBef>
-                <a:spcPts val="1100"/>
-              </a:spcBef>
-              <a:buSzTx/>
-              <a:buFontTx/>
-              <a:buNone/>
-              <a:defRPr b="1" sz="3008">
-                <a:latin typeface="Courier New"/>
-                <a:ea typeface="Courier New"/>
-                <a:cs typeface="Courier New"/>
-                <a:sym typeface="Courier New"/>
-              </a:defRPr>
-            </a:pPr>
-          </a:p>
-          <a:p>
-            <a:pPr marL="0" indent="0" defTabSz="429768">
-              <a:spcBef>
-                <a:spcPts val="1100"/>
-              </a:spcBef>
-              <a:buSzTx/>
-              <a:buFontTx/>
-              <a:buNone/>
-              <a:defRPr b="1" sz="3008">
-                <a:latin typeface="Courier New"/>
-                <a:ea typeface="Courier New"/>
-                <a:cs typeface="Courier New"/>
-                <a:sym typeface="Courier New"/>
-              </a:defRPr>
-            </a:pPr>
-            <a:r>
-              <a:t>sorted()</a:t>
-            </a:r>
-            <a:r>
-              <a:rPr b="0">
+              </a:rPr>
+              <a:t>.keys()</a:t>
+            </a:r>
+            <a:r>
+              <a:t> </a:t>
+            </a:r>
+            <a:r>
+              <a:rPr>
                 <a:latin typeface="+mn-lt"/>
                 <a:ea typeface="+mn-ea"/>
                 <a:cs typeface="+mn-cs"/>
                 <a:sym typeface="Century Gothic"/>
               </a:rPr>
-              <a:t>is a built-in function that sorts a list.</a:t>
-            </a:r>
-          </a:p>
-        </p:txBody>
-      </p:sp>
-      <p:sp>
-        <p:nvSpPr>
-          <p:cNvPr id="442" name="dictionaries are unordered"/>
+              <a:t>will create a list of all of the keys in your dictionary.</a:t>
+            </a:r>
+            <a:endParaRPr>
+              <a:latin typeface="+mn-lt"/>
+              <a:ea typeface="+mn-ea"/>
+              <a:cs typeface="+mn-cs"/>
+              <a:sym typeface="Century Gothic"/>
+            </a:endParaRPr>
+          </a:p>
+          <a:p>
+            <a:pPr marL="0" indent="0">
+              <a:spcBef>
+                <a:spcPts val="600"/>
+              </a:spcBef>
+              <a:buSzTx/>
+              <a:buFontTx/>
+              <a:buNone/>
+            </a:pPr>
+          </a:p>
+          <a:p>
+            <a:pPr marL="0" indent="0">
+              <a:spcBef>
+                <a:spcPts val="600"/>
+              </a:spcBef>
+              <a:buSzTx/>
+              <a:buFontTx/>
+              <a:buNone/>
+            </a:pPr>
+          </a:p>
+          <a:p>
+            <a:pPr marL="0" indent="0">
+              <a:spcBef>
+                <a:spcPts val="600"/>
+              </a:spcBef>
+              <a:buSzTx/>
+              <a:buFontTx/>
+              <a:buNone/>
+            </a:pPr>
+            <a:r>
+              <a:t>If you have a list, you can loop over it!</a:t>
+            </a:r>
+          </a:p>
+        </p:txBody>
+      </p:sp>
+      <p:sp>
+        <p:nvSpPr>
+          <p:cNvPr id="441" name="we can loop over a list!"/>
           <p:cNvSpPr/>
           <p:nvPr/>
         </p:nvSpPr>
@@ -19656,14 +19688,14 @@
           <a:p>
             <a:pPr/>
             <a:r>
-              <a:t>dictionaries are unordered</a:t>
-            </a:r>
-          </a:p>
-        </p:txBody>
-      </p:sp>
-      <p:sp>
-        <p:nvSpPr>
-          <p:cNvPr id="443" name="Slide Number"/>
+              <a:t>we can loop over a list!</a:t>
+            </a:r>
+          </a:p>
+        </p:txBody>
+      </p:sp>
+      <p:sp>
+        <p:nvSpPr>
+          <p:cNvPr id="442" name="Slide Number"/>
           <p:cNvSpPr txBox="1"/>
           <p:nvPr>
             <p:ph type="sldNum" sz="quarter" idx="2"/>
@@ -19694,7 +19726,7 @@
       </p:sp>
       <p:pic>
         <p:nvPicPr>
-          <p:cNvPr id="444" name="contacts-10.png" descr="contacts-10.png"/>
+          <p:cNvPr id="443" name="contacts-7.png" descr="contacts-7.png"/>
           <p:cNvPicPr>
             <a:picLocks noChangeAspect="1"/>
           </p:cNvPicPr>
@@ -19710,8 +19742,37 @@
         </p:blipFill>
         <p:spPr>
           <a:xfrm>
-            <a:off x="889000" y="2965450"/>
-            <a:ext cx="7366000" cy="927100"/>
+            <a:off x="1117600" y="2561162"/>
+            <a:ext cx="6908800" cy="990601"/>
+          </a:xfrm>
+          <a:prstGeom prst="rect">
+            <a:avLst/>
+          </a:prstGeom>
+          <a:ln w="12700">
+            <a:miter lim="400000"/>
+          </a:ln>
+        </p:spPr>
+      </p:pic>
+      <p:pic>
+        <p:nvPicPr>
+          <p:cNvPr id="444" name="contacts-9.png" descr="contacts-9.png"/>
+          <p:cNvPicPr>
+            <a:picLocks noChangeAspect="1"/>
+          </p:cNvPicPr>
+          <p:nvPr/>
+        </p:nvPicPr>
+        <p:blipFill>
+          <a:blip r:embed="rId4">
+            <a:extLst/>
+          </a:blip>
+          <a:stretch>
+            <a:fillRect/>
+          </a:stretch>
+        </p:blipFill>
+        <p:spPr>
+          <a:xfrm>
+            <a:off x="-1" y="4382647"/>
+            <a:ext cx="9144001" cy="1204252"/>
           </a:xfrm>
           <a:prstGeom prst="rect">
             <a:avLst/>
@@ -19749,7 +19810,7 @@
       </p:grpSpPr>
       <p:sp>
         <p:nvSpPr>
-          <p:cNvPr id="448" name=".items() will create a list of all of the key/value pairs in your dictionary.…"/>
+          <p:cNvPr id="448" name="Dictionaries themselves have no ordering, but we can order their keys:…"/>
           <p:cNvSpPr txBox="1"/>
           <p:nvPr>
             <p:ph type="body" idx="1"/>
@@ -19773,122 +19834,113 @@
               <a:buSzTx/>
               <a:buFontTx/>
               <a:buNone/>
-              <a:defRPr sz="3008">
-                <a:latin typeface="Gill Sans Light"/>
-                <a:ea typeface="Gill Sans Light"/>
-                <a:cs typeface="Gill Sans Light"/>
-                <a:sym typeface="Gill Sans Light"/>
-              </a:defRPr>
-            </a:pPr>
-            <a:r>
-              <a:rPr b="1">
+              <a:defRPr sz="3008"/>
+            </a:pPr>
+            <a:r>
+              <a:rPr b="1"/>
+              <a:t>Dictionaries themselves have no ordering</a:t>
+            </a:r>
+            <a:r>
+              <a:t>, but we can order their keys:</a:t>
+            </a:r>
+          </a:p>
+          <a:p>
+            <a:pPr marL="0" indent="0" defTabSz="429768">
+              <a:spcBef>
+                <a:spcPts val="1100"/>
+              </a:spcBef>
+              <a:buSzTx/>
+              <a:buFontTx/>
+              <a:buNone/>
+              <a:defRPr b="1" sz="3008">
                 <a:latin typeface="Courier New"/>
                 <a:ea typeface="Courier New"/>
                 <a:cs typeface="Courier New"/>
                 <a:sym typeface="Courier New"/>
-              </a:rPr>
-              <a:t>.items()</a:t>
-            </a:r>
-            <a:r>
-              <a:t> will create a list of all of the key/value pairs in your dictionary.</a:t>
-            </a:r>
+              </a:defRPr>
+            </a:pPr>
           </a:p>
           <a:p>
             <a:pPr marL="0" indent="0" defTabSz="429768">
               <a:spcBef>
-                <a:spcPts val="600"/>
+                <a:spcPts val="1100"/>
               </a:spcBef>
               <a:buSzTx/>
               <a:buFontTx/>
               <a:buNone/>
-              <a:defRPr sz="3008">
-                <a:latin typeface="Gill Sans Light"/>
-                <a:ea typeface="Gill Sans Light"/>
-                <a:cs typeface="Gill Sans Light"/>
-                <a:sym typeface="Gill Sans Light"/>
-              </a:defRPr>
-            </a:pPr>
-          </a:p>
-          <a:p>
-            <a:pPr marL="0" indent="0" defTabSz="429768">
-              <a:spcBef>
-                <a:spcPts val="600"/>
-              </a:spcBef>
-              <a:buSzTx/>
-              <a:buFontTx/>
-              <a:buNone/>
-              <a:defRPr sz="3008">
-                <a:latin typeface="Gill Sans Light"/>
-                <a:ea typeface="Gill Sans Light"/>
-                <a:cs typeface="Gill Sans Light"/>
-                <a:sym typeface="Gill Sans Light"/>
-              </a:defRPr>
-            </a:pPr>
-          </a:p>
-          <a:p>
-            <a:pPr marL="0" indent="0" defTabSz="429768">
-              <a:spcBef>
-                <a:spcPts val="600"/>
-              </a:spcBef>
-              <a:buSzTx/>
-              <a:buFontTx/>
-              <a:buNone/>
-              <a:defRPr sz="3008">
-                <a:latin typeface="Gill Sans Light"/>
-                <a:ea typeface="Gill Sans Light"/>
-                <a:cs typeface="Gill Sans Light"/>
-                <a:sym typeface="Gill Sans Light"/>
-              </a:defRPr>
-            </a:pPr>
-          </a:p>
-          <a:p>
-            <a:pPr marL="0" indent="0" defTabSz="429768">
-              <a:spcBef>
-                <a:spcPts val="600"/>
-              </a:spcBef>
-              <a:buSzTx/>
-              <a:buFontTx/>
-              <a:buNone/>
-              <a:defRPr sz="3008">
-                <a:latin typeface="Gill Sans Light"/>
-                <a:ea typeface="Gill Sans Light"/>
-                <a:cs typeface="Gill Sans Light"/>
-                <a:sym typeface="Gill Sans Light"/>
-              </a:defRPr>
-            </a:pPr>
-            <a:r>
-              <a:t>As with </a:t>
-            </a:r>
-            <a:r>
-              <a:rPr b="1">
+              <a:defRPr b="1" sz="3008">
                 <a:latin typeface="Courier New"/>
                 <a:ea typeface="Courier New"/>
                 <a:cs typeface="Courier New"/>
                 <a:sym typeface="Courier New"/>
-              </a:rPr>
-              <a:t>.keys()</a:t>
-            </a:r>
-            <a:r>
-              <a:t>, if we have a list, we can loop over it.  </a:t>
-            </a:r>
-            <a:r>
-              <a:rPr b="1">
+              </a:defRPr>
+            </a:pPr>
+          </a:p>
+          <a:p>
+            <a:pPr marL="0" indent="0" defTabSz="429768">
+              <a:spcBef>
+                <a:spcPts val="1100"/>
+              </a:spcBef>
+              <a:buSzTx/>
+              <a:buFontTx/>
+              <a:buNone/>
+              <a:defRPr b="1" sz="3008">
                 <a:latin typeface="Courier New"/>
                 <a:ea typeface="Courier New"/>
                 <a:cs typeface="Courier New"/>
                 <a:sym typeface="Courier New"/>
+              </a:defRPr>
+            </a:pPr>
+          </a:p>
+          <a:p>
+            <a:pPr marL="0" indent="0" defTabSz="429768">
+              <a:spcBef>
+                <a:spcPts val="1100"/>
+              </a:spcBef>
+              <a:buSzTx/>
+              <a:buFontTx/>
+              <a:buNone/>
+              <a:defRPr b="1" sz="3008">
+                <a:latin typeface="Courier New"/>
+                <a:ea typeface="Courier New"/>
+                <a:cs typeface="Courier New"/>
+                <a:sym typeface="Courier New"/>
+              </a:defRPr>
+            </a:pPr>
+          </a:p>
+          <a:p>
+            <a:pPr marL="0" indent="0" defTabSz="429768">
+              <a:spcBef>
+                <a:spcPts val="1100"/>
+              </a:spcBef>
+              <a:buSzTx/>
+              <a:buFontTx/>
+              <a:buNone/>
+              <a:defRPr b="1" sz="3008">
+                <a:latin typeface="Courier New"/>
+                <a:ea typeface="Courier New"/>
+                <a:cs typeface="Courier New"/>
+                <a:sym typeface="Courier New"/>
+              </a:defRPr>
+            </a:pPr>
+            <a:r>
+              <a:t>sorted()</a:t>
+            </a:r>
+            <a:r>
+              <a:rPr b="0">
+                <a:latin typeface="+mn-lt"/>
+                <a:ea typeface="+mn-ea"/>
+                <a:cs typeface="+mn-cs"/>
+                <a:sym typeface="Century Gothic"/>
               </a:rPr>
-              <a:t>.items()</a:t>
-            </a:r>
-            <a:r>
-              <a:t> gives us a list of lists!</a:t>
-            </a:r>
-          </a:p>
-        </p:txBody>
-      </p:sp>
-      <p:sp>
-        <p:nvSpPr>
-          <p:cNvPr id="449" name=".items( ) creates a list of key/value pairs"/>
+              <a:t>is a built-in function that sorts a list.</a:t>
+            </a:r>
+          </a:p>
+        </p:txBody>
+      </p:sp>
+      <p:sp>
+        <p:nvSpPr>
+          <p:cNvPr id="449" name="dictionaries are unordered"/>
           <p:cNvSpPr/>
           <p:nvPr/>
         </p:nvSpPr>
@@ -19919,11 +19971,11 @@
             <a:normAutofit fontScale="100000" lnSpcReduction="0"/>
           </a:bodyPr>
           <a:lstStyle>
-            <a:lvl1pPr defTabSz="361188">
-              <a:spcBef>
-                <a:spcPts val="700"/>
-              </a:spcBef>
-              <a:defRPr cap="all" sz="3160">
+            <a:lvl1pPr>
+              <a:spcBef>
+                <a:spcPts val="900"/>
+              </a:spcBef>
+              <a:defRPr cap="all" sz="4000">
                 <a:latin typeface="+mn-lt"/>
                 <a:ea typeface="+mn-ea"/>
                 <a:cs typeface="+mn-cs"/>
@@ -19934,7 +19986,7 @@
           <a:p>
             <a:pPr/>
             <a:r>
-              <a:t>.items( ) creates a list of key/value pairs</a:t>
+              <a:t>dictionaries are unordered</a:t>
             </a:r>
           </a:p>
         </p:txBody>
@@ -19972,7 +20024,7 @@
       </p:sp>
       <p:pic>
         <p:nvPicPr>
-          <p:cNvPr id="451" name="contacts-11.png" descr="contacts-11.png"/>
+          <p:cNvPr id="451" name="contacts-10.png" descr="contacts-10.png"/>
           <p:cNvPicPr>
             <a:picLocks noChangeAspect="1"/>
           </p:cNvPicPr>
@@ -19988,8 +20040,8 @@
         </p:blipFill>
         <p:spPr>
           <a:xfrm>
-            <a:off x="-1" y="2651472"/>
-            <a:ext cx="9144001" cy="1145809"/>
+            <a:off x="889000" y="2965450"/>
+            <a:ext cx="7366000" cy="927100"/>
           </a:xfrm>
           <a:prstGeom prst="rect">
             <a:avLst/>
@@ -20027,7 +20079,7 @@
       </p:grpSpPr>
       <p:sp>
         <p:nvSpPr>
-          <p:cNvPr id="455" name=".items() will create a list of all of the key/value pairs in your dictionary."/>
+          <p:cNvPr id="455" name=".items() will create a list of all of the key/value pairs in your dictionary.…"/>
           <p:cNvSpPr txBox="1"/>
           <p:nvPr>
             <p:ph type="body" idx="1"/>
@@ -20068,23 +20120,8 @@
               <a:t>.items()</a:t>
             </a:r>
             <a:r>
-              <a:t> </a:t>
-            </a:r>
-            <a:r>
-              <a:rPr>
-                <a:latin typeface="+mn-lt"/>
-                <a:ea typeface="+mn-ea"/>
-                <a:cs typeface="+mn-cs"/>
-                <a:sym typeface="Century Gothic"/>
-              </a:rPr>
-              <a:t>will create a list of all of the key/value pairs in your dictionary.</a:t>
-            </a:r>
-            <a:endParaRPr>
-              <a:latin typeface="+mn-lt"/>
-              <a:ea typeface="+mn-ea"/>
-              <a:cs typeface="+mn-cs"/>
-              <a:sym typeface="Century Gothic"/>
-            </a:endParaRPr>
+              <a:t> will create a list of all of the key/value pairs in your dictionary.</a:t>
+            </a:r>
           </a:p>
           <a:p>
             <a:pPr marL="0" indent="0" defTabSz="429768">
@@ -20094,7 +20131,12 @@
               <a:buSzTx/>
               <a:buFontTx/>
               <a:buNone/>
-              <a:defRPr sz="3008"/>
+              <a:defRPr sz="3008">
+                <a:latin typeface="Gill Sans Light"/>
+                <a:ea typeface="Gill Sans Light"/>
+                <a:cs typeface="Gill Sans Light"/>
+                <a:sym typeface="Gill Sans Light"/>
+              </a:defRPr>
             </a:pPr>
           </a:p>
           <a:p>
@@ -20105,7 +20147,12 @@
               <a:buSzTx/>
               <a:buFontTx/>
               <a:buNone/>
-              <a:defRPr sz="3008"/>
+              <a:defRPr sz="3008">
+                <a:latin typeface="Gill Sans Light"/>
+                <a:ea typeface="Gill Sans Light"/>
+                <a:cs typeface="Gill Sans Light"/>
+                <a:sym typeface="Gill Sans Light"/>
+              </a:defRPr>
             </a:pPr>
           </a:p>
           <a:p>
@@ -20116,7 +20163,12 @@
               <a:buSzTx/>
               <a:buFontTx/>
               <a:buNone/>
-              <a:defRPr sz="3008"/>
+              <a:defRPr sz="3008">
+                <a:latin typeface="Gill Sans Light"/>
+                <a:ea typeface="Gill Sans Light"/>
+                <a:cs typeface="Gill Sans Light"/>
+                <a:sym typeface="Gill Sans Light"/>
+              </a:defRPr>
             </a:pPr>
           </a:p>
           <a:p>
@@ -20127,25 +20179,46 @@
               <a:buSzTx/>
               <a:buFontTx/>
               <a:buNone/>
-              <a:defRPr sz="3008"/>
-            </a:pPr>
-          </a:p>
-          <a:p>
-            <a:pPr marL="0" indent="0" defTabSz="429768">
-              <a:spcBef>
-                <a:spcPts val="600"/>
-              </a:spcBef>
-              <a:buSzTx/>
-              <a:buFontTx/>
-              <a:buNone/>
-              <a:defRPr sz="3008"/>
-            </a:pPr>
-          </a:p>
-        </p:txBody>
-      </p:sp>
-      <p:sp>
-        <p:nvSpPr>
-          <p:cNvPr id="456" name=".items( ) creates a nested list"/>
+              <a:defRPr sz="3008">
+                <a:latin typeface="Gill Sans Light"/>
+                <a:ea typeface="Gill Sans Light"/>
+                <a:cs typeface="Gill Sans Light"/>
+                <a:sym typeface="Gill Sans Light"/>
+              </a:defRPr>
+            </a:pPr>
+            <a:r>
+              <a:t>As with </a:t>
+            </a:r>
+            <a:r>
+              <a:rPr b="1">
+                <a:latin typeface="Courier New"/>
+                <a:ea typeface="Courier New"/>
+                <a:cs typeface="Courier New"/>
+                <a:sym typeface="Courier New"/>
+              </a:rPr>
+              <a:t>.keys()</a:t>
+            </a:r>
+            <a:r>
+              <a:t>, if we have a list, we can loop over it.  </a:t>
+            </a:r>
+            <a:r>
+              <a:rPr b="1">
+                <a:latin typeface="Courier New"/>
+                <a:ea typeface="Courier New"/>
+                <a:cs typeface="Courier New"/>
+                <a:sym typeface="Courier New"/>
+              </a:rPr>
+              <a:t>.items()</a:t>
+            </a:r>
+            <a:r>
+              <a:t> gives us a list of lists!</a:t>
+            </a:r>
+          </a:p>
+        </p:txBody>
+      </p:sp>
+      <p:sp>
+        <p:nvSpPr>
+          <p:cNvPr id="456" name=".items( ) creates a list of key/value pairs"/>
           <p:cNvSpPr/>
           <p:nvPr/>
         </p:nvSpPr>
@@ -20176,11 +20249,11 @@
             <a:normAutofit fontScale="100000" lnSpcReduction="0"/>
           </a:bodyPr>
           <a:lstStyle>
-            <a:lvl1pPr>
-              <a:spcBef>
-                <a:spcPts val="900"/>
-              </a:spcBef>
-              <a:defRPr cap="all" sz="4000">
+            <a:lvl1pPr defTabSz="361188">
+              <a:spcBef>
+                <a:spcPts val="700"/>
+              </a:spcBef>
+              <a:defRPr cap="all" sz="3160">
                 <a:latin typeface="+mn-lt"/>
                 <a:ea typeface="+mn-ea"/>
                 <a:cs typeface="+mn-cs"/>
@@ -20191,7 +20264,7 @@
           <a:p>
             <a:pPr/>
             <a:r>
-              <a:t>.items( ) creates a nested list</a:t>
+              <a:t>.items( ) creates a list of key/value pairs</a:t>
             </a:r>
           </a:p>
         </p:txBody>
@@ -20229,7 +20302,7 @@
       </p:sp>
       <p:pic>
         <p:nvPicPr>
-          <p:cNvPr id="458" name="contacts-12.png" descr="contacts-12.png"/>
+          <p:cNvPr id="458" name="contacts-11.png" descr="contacts-11.png"/>
           <p:cNvPicPr>
             <a:picLocks noChangeAspect="1"/>
           </p:cNvPicPr>
@@ -20245,8 +20318,8 @@
         </p:blipFill>
         <p:spPr>
           <a:xfrm>
-            <a:off x="-1" y="3112449"/>
-            <a:ext cx="9144001" cy="1726835"/>
+            <a:off x="-1" y="2651472"/>
+            <a:ext cx="9144001" cy="1145809"/>
           </a:xfrm>
           <a:prstGeom prst="rect">
             <a:avLst/>
@@ -20486,7 +20559,7 @@
       </p:sp>
       <p:pic>
         <p:nvPicPr>
-          <p:cNvPr id="465" name="contacts-13.png" descr="contacts-13.png"/>
+          <p:cNvPr id="465" name="contacts-12.png" descr="contacts-12.png"/>
           <p:cNvPicPr>
             <a:picLocks noChangeAspect="1"/>
           </p:cNvPicPr>
@@ -20502,8 +20575,8 @@
         </p:blipFill>
         <p:spPr>
           <a:xfrm>
-            <a:off x="-1" y="3115635"/>
-            <a:ext cx="9144001" cy="1690902"/>
+            <a:off x="-1" y="3112449"/>
+            <a:ext cx="9144001" cy="1726835"/>
           </a:xfrm>
           <a:prstGeom prst="rect">
             <a:avLst/>
@@ -20541,7 +20614,7 @@
       </p:grpSpPr>
       <p:sp>
         <p:nvSpPr>
-          <p:cNvPr id="469" name="Loop through the contacts dictionary to display everyone's contact information, like this:"/>
+          <p:cNvPr id="469" name=".items() will create a list of all of the key/value pairs in your dictionary."/>
           <p:cNvSpPr txBox="1"/>
           <p:nvPr>
             <p:ph type="body" idx="1"/>
@@ -20558,63 +20631,108 @@
           </a:bodyPr>
           <a:lstStyle/>
           <a:p>
-            <a:pPr marL="0" indent="0">
+            <a:pPr marL="0" indent="0" defTabSz="429768">
               <a:spcBef>
                 <a:spcPts val="600"/>
               </a:spcBef>
               <a:buSzTx/>
               <a:buFontTx/>
               <a:buNone/>
-            </a:pPr>
-            <a:r>
-              <a:t>Loop through the </a:t>
-            </a:r>
-            <a:r>
-              <a:rPr b="1"/>
-              <a:t>contacts</a:t>
-            </a:r>
-            <a:r>
-              <a:t> dictionary to display everyone's contact information, like this:</a:t>
-            </a:r>
-          </a:p>
-          <a:p>
-            <a:pPr marL="0" indent="0">
-              <a:spcBef>
-                <a:spcPts val="1200"/>
-              </a:spcBef>
-              <a:buSzTx/>
-              <a:buFontTx/>
-              <a:buNone/>
-              <a:defRPr b="1">
+              <a:defRPr sz="3008">
+                <a:latin typeface="Gill Sans Light"/>
+                <a:ea typeface="Gill Sans Light"/>
+                <a:cs typeface="Gill Sans Light"/>
+                <a:sym typeface="Gill Sans Light"/>
+              </a:defRPr>
+            </a:pPr>
+            <a:r>
+              <a:rPr b="1">
                 <a:latin typeface="Courier New"/>
                 <a:ea typeface="Courier New"/>
                 <a:cs typeface="Courier New"/>
                 <a:sym typeface="Courier New"/>
-              </a:defRPr>
-            </a:pPr>
-          </a:p>
-          <a:p>
-            <a:pPr marL="0" indent="0">
-              <a:spcBef>
-                <a:spcPts val="1200"/>
+              </a:rPr>
+              <a:t>.items()</a:t>
+            </a:r>
+            <a:r>
+              <a:t> </a:t>
+            </a:r>
+            <a:r>
+              <a:rPr>
+                <a:latin typeface="+mn-lt"/>
+                <a:ea typeface="+mn-ea"/>
+                <a:cs typeface="+mn-cs"/>
+                <a:sym typeface="Century Gothic"/>
+              </a:rPr>
+              <a:t>will create a list of all of the key/value pairs in your dictionary.</a:t>
+            </a:r>
+            <a:endParaRPr>
+              <a:latin typeface="+mn-lt"/>
+              <a:ea typeface="+mn-ea"/>
+              <a:cs typeface="+mn-cs"/>
+              <a:sym typeface="Century Gothic"/>
+            </a:endParaRPr>
+          </a:p>
+          <a:p>
+            <a:pPr marL="0" indent="0" defTabSz="429768">
+              <a:spcBef>
+                <a:spcPts val="600"/>
               </a:spcBef>
               <a:buSzTx/>
               <a:buFontTx/>
               <a:buNone/>
-              <a:defRPr b="1">
-                <a:latin typeface="Courier New"/>
-                <a:ea typeface="Courier New"/>
-                <a:cs typeface="Courier New"/>
-                <a:sym typeface="Courier New"/>
-              </a:defRPr>
-            </a:pPr>
-            <a:br/>
-          </a:p>
-        </p:txBody>
-      </p:sp>
-      <p:sp>
-        <p:nvSpPr>
-          <p:cNvPr id="470" name="Exercise: part 2"/>
+              <a:defRPr sz="3008"/>
+            </a:pPr>
+          </a:p>
+          <a:p>
+            <a:pPr marL="0" indent="0" defTabSz="429768">
+              <a:spcBef>
+                <a:spcPts val="600"/>
+              </a:spcBef>
+              <a:buSzTx/>
+              <a:buFontTx/>
+              <a:buNone/>
+              <a:defRPr sz="3008"/>
+            </a:pPr>
+          </a:p>
+          <a:p>
+            <a:pPr marL="0" indent="0" defTabSz="429768">
+              <a:spcBef>
+                <a:spcPts val="600"/>
+              </a:spcBef>
+              <a:buSzTx/>
+              <a:buFontTx/>
+              <a:buNone/>
+              <a:defRPr sz="3008"/>
+            </a:pPr>
+          </a:p>
+          <a:p>
+            <a:pPr marL="0" indent="0" defTabSz="429768">
+              <a:spcBef>
+                <a:spcPts val="600"/>
+              </a:spcBef>
+              <a:buSzTx/>
+              <a:buFontTx/>
+              <a:buNone/>
+              <a:defRPr sz="3008"/>
+            </a:pPr>
+          </a:p>
+          <a:p>
+            <a:pPr marL="0" indent="0" defTabSz="429768">
+              <a:spcBef>
+                <a:spcPts val="600"/>
+              </a:spcBef>
+              <a:buSzTx/>
+              <a:buFontTx/>
+              <a:buNone/>
+              <a:defRPr sz="3008"/>
+            </a:pPr>
+          </a:p>
+        </p:txBody>
+      </p:sp>
+      <p:sp>
+        <p:nvSpPr>
+          <p:cNvPr id="470" name=".items( ) creates a nested list"/>
           <p:cNvSpPr/>
           <p:nvPr/>
         </p:nvSpPr>
@@ -20660,7 +20778,7 @@
           <a:p>
             <a:pPr/>
             <a:r>
-              <a:t>Exercise: part 2</a:t>
+              <a:t>.items( ) creates a nested list</a:t>
             </a:r>
           </a:p>
         </p:txBody>
@@ -20698,7 +20816,7 @@
       </p:sp>
       <p:pic>
         <p:nvPicPr>
-          <p:cNvPr id="472" name="conatcts-14.png" descr="conatcts-14.png"/>
+          <p:cNvPr id="472" name="contacts-13.png" descr="contacts-13.png"/>
           <p:cNvPicPr>
             <a:picLocks noChangeAspect="1"/>
           </p:cNvPicPr>
@@ -20714,8 +20832,8 @@
         </p:blipFill>
         <p:spPr>
           <a:xfrm>
-            <a:off x="133350" y="3143031"/>
-            <a:ext cx="8877300" cy="2463801"/>
+            <a:off x="-1" y="3115635"/>
+            <a:ext cx="9144001" cy="1690902"/>
           </a:xfrm>
           <a:prstGeom prst="rect">
             <a:avLst/>
@@ -20753,7 +20871,7 @@
       </p:grpSpPr>
       <p:sp>
         <p:nvSpPr>
-          <p:cNvPr id="476" name="Check out the Hear Me Code slides repo for practical examples, code samples, and more!…"/>
+          <p:cNvPr id="476" name="Loop through the contacts dictionary to display everyone's contact information, like this:"/>
           <p:cNvSpPr txBox="1"/>
           <p:nvPr>
             <p:ph type="body" idx="1"/>
@@ -20777,123 +20895,56 @@
               <a:buSzTx/>
               <a:buFontTx/>
               <a:buNone/>
-              <a:defRPr sz="2800"/>
-            </a:pPr>
-            <a:r>
-              <a:t>Check out the </a:t>
-            </a:r>
-            <a:r>
-              <a:rPr b="1" u="sng">
-                <a:solidFill>
-                  <a:srgbClr val="0000FF"/>
-                </a:solidFill>
-                <a:uFill>
-                  <a:solidFill>
-                    <a:srgbClr val="0000FF"/>
-                  </a:solidFill>
-                </a:uFill>
-                <a:hlinkClick r:id="rId2" invalidUrl="" action="" tgtFrame="" tooltip="" history="1" highlightClick="0" endSnd="0"/>
-              </a:rPr>
-              <a:t>Hear Me Code slides</a:t>
-            </a:r>
-            <a:r>
-              <a:t> repo for practical examples, code samples, and more!</a:t>
+            </a:pPr>
+            <a:r>
+              <a:t>Loop through the </a:t>
+            </a:r>
+            <a:r>
+              <a:rPr b="1"/>
+              <a:t>contacts</a:t>
+            </a:r>
+            <a:r>
+              <a:t> dictionary to display everyone's contact information, like this:</a:t>
             </a:r>
           </a:p>
           <a:p>
             <a:pPr marL="0" indent="0">
               <a:spcBef>
-                <a:spcPts val="600"/>
+                <a:spcPts val="1200"/>
               </a:spcBef>
               <a:buSzTx/>
               <a:buFontTx/>
               <a:buNone/>
-              <a:defRPr b="1" sz="2800"/>
-            </a:pPr>
-          </a:p>
-          <a:p>
-            <a:pPr lvl="1" marL="661736" indent="-280736">
-              <a:spcBef>
-                <a:spcPts val="600"/>
-              </a:spcBef>
-              <a:buChar char="•"/>
-              <a:defRPr sz="2800"/>
-            </a:pPr>
-            <a:r>
-              <a:t>Beginner: </a:t>
-            </a:r>
-            <a:r>
-              <a:rPr u="sng">
-                <a:solidFill>
-                  <a:srgbClr val="0000FF"/>
-                </a:solidFill>
-                <a:uFill>
-                  <a:solidFill>
-                    <a:srgbClr val="0000FF"/>
-                  </a:solidFill>
-                </a:uFill>
-                <a:hlinkClick r:id="rId3" invalidUrl="" action="" tgtFrame="" tooltip="" history="1" highlightClick="0" endSnd="0"/>
-              </a:rPr>
-              <a:t>US States tables</a:t>
-            </a:r>
-          </a:p>
-          <a:p>
-            <a:pPr lvl="1" marL="661736" indent="-280736">
-              <a:spcBef>
-                <a:spcPts val="600"/>
-              </a:spcBef>
-              <a:buChar char="•"/>
-              <a:defRPr sz="2800"/>
-            </a:pPr>
-            <a:r>
-              <a:t>Beginner: </a:t>
-            </a:r>
-            <a:r>
-              <a:rPr u="sng">
-                <a:solidFill>
-                  <a:srgbClr val="0000FF"/>
-                </a:solidFill>
-                <a:uFill>
-                  <a:solidFill>
-                    <a:srgbClr val="0000FF"/>
-                  </a:solidFill>
-                </a:uFill>
-                <a:hlinkClick r:id="rId4" invalidUrl="" action="" tgtFrame="" tooltip="" history="1" highlightClick="0" endSnd="0"/>
-              </a:rPr>
-              <a:t>Contacts list</a:t>
-            </a:r>
-          </a:p>
-          <a:p>
-            <a:pPr lvl="1" marL="661736" indent="-280736">
-              <a:spcBef>
-                <a:spcPts val="600"/>
-              </a:spcBef>
-              <a:buChar char="•"/>
-              <a:defRPr sz="2800"/>
-            </a:pPr>
-            <a:r>
-              <a:t>Advanced: </a:t>
-            </a:r>
-            <a:r>
-              <a:rPr u="sng">
-                <a:solidFill>
-                  <a:srgbClr val="0000FF"/>
-                </a:solidFill>
-                <a:uFill>
-                  <a:solidFill>
-                    <a:srgbClr val="0000FF"/>
-                  </a:solidFill>
-                </a:uFill>
-                <a:hlinkClick r:id="rId5" invalidUrl="" action="" tgtFrame="" tooltip="" history="1" highlightClick="0" endSnd="0"/>
-              </a:rPr>
-              <a:t>Comparing two CSVs</a:t>
-            </a:r>
-          </a:p>
-        </p:txBody>
-      </p:sp>
-      <p:sp>
-        <p:nvSpPr>
-          <p:cNvPr id="477" name="playtime!"/>
+              <a:defRPr b="1">
+                <a:latin typeface="Courier New"/>
+                <a:ea typeface="Courier New"/>
+                <a:cs typeface="Courier New"/>
+                <a:sym typeface="Courier New"/>
+              </a:defRPr>
+            </a:pPr>
+          </a:p>
+          <a:p>
+            <a:pPr marL="0" indent="0">
+              <a:spcBef>
+                <a:spcPts val="1200"/>
+              </a:spcBef>
+              <a:buSzTx/>
+              <a:buFontTx/>
+              <a:buNone/>
+              <a:defRPr b="1">
+                <a:latin typeface="Courier New"/>
+                <a:ea typeface="Courier New"/>
+                <a:cs typeface="Courier New"/>
+                <a:sym typeface="Courier New"/>
+              </a:defRPr>
+            </a:pPr>
+            <a:br/>
+          </a:p>
+        </p:txBody>
+      </p:sp>
+      <p:sp>
+        <p:nvSpPr>
+          <p:cNvPr id="477" name="Exercise: part 2"/>
           <p:cNvSpPr/>
           <p:nvPr/>
         </p:nvSpPr>
@@ -20939,7 +20990,7 @@
           <a:p>
             <a:pPr/>
             <a:r>
-              <a:t>playtime!</a:t>
+              <a:t>Exercise: part 2</a:t>
             </a:r>
           </a:p>
         </p:txBody>
@@ -20975,6 +21026,35 @@
           </a:p>
         </p:txBody>
       </p:sp>
+      <p:pic>
+        <p:nvPicPr>
+          <p:cNvPr id="479" name="conatcts-14.png" descr="conatcts-14.png"/>
+          <p:cNvPicPr>
+            <a:picLocks noChangeAspect="1"/>
+          </p:cNvPicPr>
+          <p:nvPr/>
+        </p:nvPicPr>
+        <p:blipFill>
+          <a:blip r:embed="rId3">
+            <a:extLst/>
+          </a:blip>
+          <a:stretch>
+            <a:fillRect/>
+          </a:stretch>
+        </p:blipFill>
+        <p:spPr>
+          <a:xfrm>
+            <a:off x="133350" y="3143031"/>
+            <a:ext cx="8877300" cy="2463801"/>
+          </a:xfrm>
+          <a:prstGeom prst="rect">
+            <a:avLst/>
+          </a:prstGeom>
+          <a:ln w="12700">
+            <a:miter lim="400000"/>
+          </a:ln>
+        </p:spPr>
+      </p:pic>
     </p:spTree>
   </p:cSld>
   <p:clrMapOvr>
@@ -21003,7 +21083,7 @@
       </p:grpSpPr>
       <p:sp>
         <p:nvSpPr>
-          <p:cNvPr id="480" name="Lessons 4 &amp; 5…"/>
+          <p:cNvPr id="483" name="Check out the Hear Me Code slides repo for practical examples, code samples, and more!…"/>
           <p:cNvSpPr txBox="1"/>
           <p:nvPr>
             <p:ph type="body" idx="1"/>
@@ -21020,15 +21100,58 @@
           </a:bodyPr>
           <a:lstStyle/>
           <a:p>
-            <a:pPr marL="332613" indent="-332613" defTabSz="443484">
-              <a:spcBef>
-                <a:spcPts val="1100"/>
-              </a:spcBef>
-              <a:buClr>
-                <a:srgbClr val="000000"/>
-              </a:buClr>
-              <a:defRPr sz="3104"/>
-            </a:pPr>
+            <a:pPr marL="0" indent="0">
+              <a:spcBef>
+                <a:spcPts val="600"/>
+              </a:spcBef>
+              <a:buSzTx/>
+              <a:buFontTx/>
+              <a:buNone/>
+              <a:defRPr sz="2800"/>
+            </a:pPr>
+            <a:r>
+              <a:t>Check out the </a:t>
+            </a:r>
+            <a:r>
+              <a:rPr b="1" u="sng">
+                <a:solidFill>
+                  <a:srgbClr val="0000FF"/>
+                </a:solidFill>
+                <a:uFill>
+                  <a:solidFill>
+                    <a:srgbClr val="0000FF"/>
+                  </a:solidFill>
+                </a:uFill>
+                <a:hlinkClick r:id="rId2" invalidUrl="" action="" tgtFrame="" tooltip="" history="1" highlightClick="0" endSnd="0"/>
+              </a:rPr>
+              <a:t>Hear Me Code slides</a:t>
+            </a:r>
+            <a:r>
+              <a:t> repo for practical examples, code samples, and more!</a:t>
+            </a:r>
+          </a:p>
+          <a:p>
+            <a:pPr marL="0" indent="0">
+              <a:spcBef>
+                <a:spcPts val="600"/>
+              </a:spcBef>
+              <a:buSzTx/>
+              <a:buFontTx/>
+              <a:buNone/>
+              <a:defRPr b="1" sz="2800"/>
+            </a:pPr>
+          </a:p>
+          <a:p>
+            <a:pPr lvl="1" marL="661736" indent="-280736">
+              <a:spcBef>
+                <a:spcPts val="600"/>
+              </a:spcBef>
+              <a:buChar char="•"/>
+              <a:defRPr sz="2800"/>
+            </a:pPr>
+            <a:r>
+              <a:t>Beginner: </a:t>
+            </a:r>
             <a:r>
               <a:rPr u="sng">
                 <a:solidFill>
@@ -21041,89 +21164,66 @@
                 </a:uFill>
                 <a:hlinkClick r:id="rId3" invalidUrl="" action="" tgtFrame="" tooltip="" history="1" highlightClick="0" endSnd="0"/>
               </a:rPr>
-              <a:t>Lessons 4 &amp; 5</a:t>
-            </a:r>
-          </a:p>
-          <a:p>
-            <a:pPr marL="332613" indent="-332613" defTabSz="443484">
-              <a:spcBef>
-                <a:spcPts val="1100"/>
-              </a:spcBef>
-              <a:buClr>
-                <a:srgbClr val="000000"/>
-              </a:buClr>
-              <a:defRPr sz="3104"/>
-            </a:pPr>
-          </a:p>
-          <a:p>
-            <a:pPr marL="332613" indent="-332613" defTabSz="443484">
-              <a:spcBef>
-                <a:spcPts val="1100"/>
-              </a:spcBef>
-              <a:buClr>
-                <a:srgbClr val="000000"/>
-              </a:buClr>
-              <a:defRPr sz="3104"/>
-            </a:pPr>
-            <a:r>
-              <a:t>Organize a study group on the listserv</a:t>
-            </a:r>
-          </a:p>
-          <a:p>
-            <a:pPr marL="332613" indent="-332613" defTabSz="443484">
-              <a:spcBef>
-                <a:spcPts val="1100"/>
-              </a:spcBef>
-              <a:buClr>
-                <a:srgbClr val="000000"/>
-              </a:buClr>
-              <a:defRPr sz="3104"/>
-            </a:pPr>
-          </a:p>
-          <a:p>
-            <a:pPr marL="332613" indent="-332613" defTabSz="443484">
-              <a:spcBef>
-                <a:spcPts val="1100"/>
-              </a:spcBef>
-              <a:buClr>
-                <a:srgbClr val="000000"/>
-              </a:buClr>
-              <a:defRPr sz="3104"/>
-            </a:pPr>
-            <a:r>
-              <a:t>Come be a teaching assistant</a:t>
-            </a:r>
-          </a:p>
-          <a:p>
-            <a:pPr marL="332613" indent="-332613" defTabSz="443484">
-              <a:spcBef>
-                <a:spcPts val="1100"/>
-              </a:spcBef>
-              <a:buClr>
-                <a:srgbClr val="000000"/>
-              </a:buClr>
-              <a:defRPr sz="3104"/>
-            </a:pPr>
-          </a:p>
-          <a:p>
-            <a:pPr marL="332613" indent="-332613" defTabSz="443484">
-              <a:spcBef>
-                <a:spcPts val="1100"/>
-              </a:spcBef>
-              <a:buClr>
-                <a:srgbClr val="000000"/>
-              </a:buClr>
-              <a:defRPr sz="3104"/>
-            </a:pPr>
-            <a:r>
-              <a:t>Practice, practice, practice</a:t>
-            </a:r>
-          </a:p>
-        </p:txBody>
-      </p:sp>
-      <p:sp>
-        <p:nvSpPr>
-          <p:cNvPr id="481" name="What now?"/>
+              <a:t>US States tables</a:t>
+            </a:r>
+          </a:p>
+          <a:p>
+            <a:pPr lvl="1" marL="661736" indent="-280736">
+              <a:spcBef>
+                <a:spcPts val="600"/>
+              </a:spcBef>
+              <a:buChar char="•"/>
+              <a:defRPr sz="2800"/>
+            </a:pPr>
+            <a:r>
+              <a:t>Beginner: </a:t>
+            </a:r>
+            <a:r>
+              <a:rPr u="sng">
+                <a:solidFill>
+                  <a:srgbClr val="0000FF"/>
+                </a:solidFill>
+                <a:uFill>
+                  <a:solidFill>
+                    <a:srgbClr val="0000FF"/>
+                  </a:solidFill>
+                </a:uFill>
+                <a:hlinkClick r:id="rId4" invalidUrl="" action="" tgtFrame="" tooltip="" history="1" highlightClick="0" endSnd="0"/>
+              </a:rPr>
+              <a:t>Contacts list</a:t>
+            </a:r>
+          </a:p>
+          <a:p>
+            <a:pPr lvl="1" marL="661736" indent="-280736">
+              <a:spcBef>
+                <a:spcPts val="600"/>
+              </a:spcBef>
+              <a:buChar char="•"/>
+              <a:defRPr sz="2800"/>
+            </a:pPr>
+            <a:r>
+              <a:t>Advanced: </a:t>
+            </a:r>
+            <a:r>
+              <a:rPr u="sng">
+                <a:solidFill>
+                  <a:srgbClr val="0000FF"/>
+                </a:solidFill>
+                <a:uFill>
+                  <a:solidFill>
+                    <a:srgbClr val="0000FF"/>
+                  </a:solidFill>
+                </a:uFill>
+                <a:hlinkClick r:id="rId5" invalidUrl="" action="" tgtFrame="" tooltip="" history="1" highlightClick="0" endSnd="0"/>
+              </a:rPr>
+              <a:t>Comparing two CSVs</a:t>
+            </a:r>
+          </a:p>
+        </p:txBody>
+      </p:sp>
+      <p:sp>
+        <p:nvSpPr>
+          <p:cNvPr id="484" name="playtime!"/>
           <p:cNvSpPr/>
           <p:nvPr/>
         </p:nvSpPr>
@@ -21169,6 +21269,236 @@
           <a:p>
             <a:pPr/>
             <a:r>
+              <a:t>playtime!</a:t>
+            </a:r>
+          </a:p>
+        </p:txBody>
+      </p:sp>
+      <p:sp>
+        <p:nvSpPr>
+          <p:cNvPr id="485" name="Slide Number"/>
+          <p:cNvSpPr txBox="1"/>
+          <p:nvPr>
+            <p:ph type="sldNum" sz="quarter" idx="2"/>
+          </p:nvPr>
+        </p:nvSpPr>
+        <p:spPr>
+          <a:xfrm>
+            <a:off x="5638800" y="6419053"/>
+            <a:ext cx="2133600" cy="368301"/>
+          </a:xfrm>
+          <a:prstGeom prst="rect">
+            <a:avLst/>
+          </a:prstGeom>
+          <a:extLst>
+            <a:ext uri="{C572A759-6A51-4108-AA02-DFA0A04FC94B}">
+              <ma14:wrappingTextBoxFlag xmlns:ma14="http://schemas.microsoft.com/office/mac/drawingml/2011/main" val="1"/>
+            </a:ext>
+          </a:extLst>
+        </p:spPr>
+        <p:txBody>
+          <a:bodyPr/>
+          <a:lstStyle/>
+          <a:p>
+            <a:pPr/>
+            <a:fld id="{86CB4B4D-7CA3-9044-876B-883B54F8677D}" type="slidenum"/>
+          </a:p>
+        </p:txBody>
+      </p:sp>
+    </p:spTree>
+  </p:cSld>
+  <p:clrMapOvr>
+    <a:masterClrMapping/>
+  </p:clrMapOvr>
+  <p:transition xmlns:p14="http://schemas.microsoft.com/office/powerpoint/2010/main" spd="med" advClick="1"/>
+</p:sld>
+</file>
+
+<file path=ppt/slides/slide67.xml><?xml version="1.0" encoding="utf-8"?>
+<p:sld xmlns:a="http://schemas.openxmlformats.org/drawingml/2006/main" xmlns:r="http://schemas.openxmlformats.org/officeDocument/2006/relationships" xmlns:p="http://schemas.openxmlformats.org/presentationml/2006/main" showMasterSp="1" showMasterPhAnim="1">
+  <p:cSld>
+    <p:spTree>
+      <p:nvGrpSpPr>
+        <p:cNvPr id="1" name=""/>
+        <p:cNvGrpSpPr/>
+        <p:nvPr/>
+      </p:nvGrpSpPr>
+      <p:grpSpPr>
+        <a:xfrm>
+          <a:off x="0" y="0"/>
+          <a:ext cx="0" cy="0"/>
+          <a:chOff x="0" y="0"/>
+          <a:chExt cx="0" cy="0"/>
+        </a:xfrm>
+      </p:grpSpPr>
+      <p:sp>
+        <p:nvSpPr>
+          <p:cNvPr id="487" name="Lessons 4 &amp; 5…"/>
+          <p:cNvSpPr txBox="1"/>
+          <p:nvPr>
+            <p:ph type="body" idx="1"/>
+          </p:nvPr>
+        </p:nvSpPr>
+        <p:spPr>
+          <a:prstGeom prst="rect">
+            <a:avLst/>
+          </a:prstGeom>
+        </p:spPr>
+        <p:txBody>
+          <a:bodyPr>
+            <a:normAutofit fontScale="100000" lnSpcReduction="0"/>
+          </a:bodyPr>
+          <a:lstStyle/>
+          <a:p>
+            <a:pPr marL="332613" indent="-332613" defTabSz="443484">
+              <a:spcBef>
+                <a:spcPts val="1100"/>
+              </a:spcBef>
+              <a:buClr>
+                <a:srgbClr val="000000"/>
+              </a:buClr>
+              <a:defRPr sz="3104"/>
+            </a:pPr>
+            <a:r>
+              <a:rPr u="sng">
+                <a:solidFill>
+                  <a:srgbClr val="0000FF"/>
+                </a:solidFill>
+                <a:uFill>
+                  <a:solidFill>
+                    <a:srgbClr val="0000FF"/>
+                  </a:solidFill>
+                </a:uFill>
+                <a:hlinkClick r:id="rId3" invalidUrl="" action="" tgtFrame="" tooltip="" history="1" highlightClick="0" endSnd="0"/>
+              </a:rPr>
+              <a:t>Lessons 4 &amp; 5</a:t>
+            </a:r>
+          </a:p>
+          <a:p>
+            <a:pPr marL="332613" indent="-332613" defTabSz="443484">
+              <a:spcBef>
+                <a:spcPts val="1100"/>
+              </a:spcBef>
+              <a:buClr>
+                <a:srgbClr val="000000"/>
+              </a:buClr>
+              <a:defRPr sz="3104"/>
+            </a:pPr>
+          </a:p>
+          <a:p>
+            <a:pPr marL="332613" indent="-332613" defTabSz="443484">
+              <a:spcBef>
+                <a:spcPts val="1100"/>
+              </a:spcBef>
+              <a:buClr>
+                <a:srgbClr val="000000"/>
+              </a:buClr>
+              <a:defRPr sz="3104"/>
+            </a:pPr>
+            <a:r>
+              <a:t>Organize a study group on the listserv</a:t>
+            </a:r>
+          </a:p>
+          <a:p>
+            <a:pPr marL="332613" indent="-332613" defTabSz="443484">
+              <a:spcBef>
+                <a:spcPts val="1100"/>
+              </a:spcBef>
+              <a:buClr>
+                <a:srgbClr val="000000"/>
+              </a:buClr>
+              <a:defRPr sz="3104"/>
+            </a:pPr>
+          </a:p>
+          <a:p>
+            <a:pPr marL="332613" indent="-332613" defTabSz="443484">
+              <a:spcBef>
+                <a:spcPts val="1100"/>
+              </a:spcBef>
+              <a:buClr>
+                <a:srgbClr val="000000"/>
+              </a:buClr>
+              <a:defRPr sz="3104"/>
+            </a:pPr>
+            <a:r>
+              <a:t>Come be a teaching assistant</a:t>
+            </a:r>
+          </a:p>
+          <a:p>
+            <a:pPr marL="332613" indent="-332613" defTabSz="443484">
+              <a:spcBef>
+                <a:spcPts val="1100"/>
+              </a:spcBef>
+              <a:buClr>
+                <a:srgbClr val="000000"/>
+              </a:buClr>
+              <a:defRPr sz="3104"/>
+            </a:pPr>
+          </a:p>
+          <a:p>
+            <a:pPr marL="332613" indent="-332613" defTabSz="443484">
+              <a:spcBef>
+                <a:spcPts val="1100"/>
+              </a:spcBef>
+              <a:buClr>
+                <a:srgbClr val="000000"/>
+              </a:buClr>
+              <a:defRPr sz="3104"/>
+            </a:pPr>
+            <a:r>
+              <a:t>Practice, practice, practice</a:t>
+            </a:r>
+          </a:p>
+        </p:txBody>
+      </p:sp>
+      <p:sp>
+        <p:nvSpPr>
+          <p:cNvPr id="488" name="What now?"/>
+          <p:cNvSpPr/>
+          <p:nvPr/>
+        </p:nvSpPr>
+        <p:spPr>
+          <a:xfrm>
+            <a:off x="0" y="206107"/>
+            <a:ext cx="8686800" cy="812483"/>
+          </a:xfrm>
+          <a:prstGeom prst="rect">
+            <a:avLst/>
+          </a:prstGeom>
+          <a:solidFill>
+            <a:srgbClr val="FFFFFF">
+              <a:alpha val="70000"/>
+            </a:srgbClr>
+          </a:solidFill>
+          <a:ln w="12700">
+            <a:miter lim="400000"/>
+          </a:ln>
+          <a:extLst>
+            <a:ext uri="{C572A759-6A51-4108-AA02-DFA0A04FC94B}">
+              <ma14:wrappingTextBoxFlag xmlns:ma14="http://schemas.microsoft.com/office/mac/drawingml/2011/main" val="1"/>
+            </a:ext>
+          </a:extLst>
+        </p:spPr>
+        <p:txBody>
+          <a:bodyPr tIns="91439" bIns="91439" anchor="ctr">
+            <a:normAutofit fontScale="100000" lnSpcReduction="0"/>
+          </a:bodyPr>
+          <a:lstStyle>
+            <a:lvl1pPr>
+              <a:spcBef>
+                <a:spcPts val="900"/>
+              </a:spcBef>
+              <a:defRPr cap="all" sz="4000">
+                <a:latin typeface="+mn-lt"/>
+                <a:ea typeface="+mn-ea"/>
+                <a:cs typeface="+mn-cs"/>
+                <a:sym typeface="Century Gothic"/>
+              </a:defRPr>
+            </a:lvl1pPr>
+          </a:lstStyle>
+          <a:p>
+            <a:pPr/>
+            <a:r>
               <a:t>What now?</a:t>
             </a:r>
           </a:p>
@@ -21176,7 +21506,7 @@
       </p:sp>
       <p:sp>
         <p:nvSpPr>
-          <p:cNvPr id="482" name="Slide Number"/>
+          <p:cNvPr id="489" name="Slide Number"/>
           <p:cNvSpPr txBox="1"/>
           <p:nvPr>
             <p:ph type="sldNum" sz="quarter" idx="2"/>

</xml_diff>